<commit_message>
Added information about Arm Fault
</commit_message>
<xml_diff>
--- a/Doxygen/src/images/EventRecorder.pptx
+++ b/Doxygen/src/images/EventRecorder.pptx
@@ -6,10 +6,10 @@
     <p:sldMasterId id="2147483775" r:id="rId7"/>
   </p:sldMasterIdLst>
   <p:notesMasterIdLst>
-    <p:notesMasterId r:id="rId14"/>
+    <p:notesMasterId r:id="rId15"/>
   </p:notesMasterIdLst>
   <p:handoutMasterIdLst>
-    <p:handoutMasterId r:id="rId15"/>
+    <p:handoutMasterId r:id="rId16"/>
   </p:handoutMasterIdLst>
   <p:sldIdLst>
     <p:sldId id="340" r:id="rId8"/>
@@ -18,6 +18,7 @@
     <p:sldId id="344" r:id="rId11"/>
     <p:sldId id="265" r:id="rId12"/>
     <p:sldId id="264" r:id="rId13"/>
+    <p:sldId id="345" r:id="rId14"/>
   </p:sldIdLst>
   <p:sldSz cx="12188825" cy="6858000"/>
   <p:notesSz cx="9926638" cy="6797675"/>
@@ -266,7 +267,7 @@
             <a:fld id="{E72D30EF-8F20-0B47-8B5D-39A8BC29E860}" type="datetimeFigureOut">
               <a:rPr lang="en-US" smtClean="0"/>
               <a:pPr/>
-              <a:t>2018-04-13</a:t>
+              <a:t>3/28/2023</a:t>
             </a:fld>
             <a:endParaRPr lang="en-US"/>
           </a:p>
@@ -434,7 +435,7 @@
             <a:fld id="{77EDD36E-1E02-F241-9611-1F1D9EAAD326}" type="datetimeFigureOut">
               <a:rPr lang="en-US" smtClean="0"/>
               <a:pPr/>
-              <a:t>2018-04-13</a:t>
+              <a:t>3/28/2023</a:t>
             </a:fld>
             <a:endParaRPr lang="en-US"/>
           </a:p>
@@ -4700,7 +4701,6 @@
           <a:ln>
             <a:noFill/>
           </a:ln>
-          <a:extLst/>
         </p:spPr>
         <p:txBody>
           <a:bodyPr lIns="0" tIns="0" rIns="0" bIns="0"/>
@@ -4856,7 +4856,6 @@
           <a:ln>
             <a:noFill/>
           </a:ln>
-          <a:extLst/>
         </p:spPr>
         <p:txBody>
           <a:bodyPr lIns="0" tIns="0" rIns="0" bIns="0"/>
@@ -5361,7 +5360,6 @@
           <a:ln>
             <a:noFill/>
           </a:ln>
-          <a:extLst/>
         </p:spPr>
         <p:txBody>
           <a:bodyPr lIns="0" tIns="0" rIns="0" bIns="0">
@@ -5559,9 +5557,7 @@
       </p:pic>
       <p:sp>
         <p:nvSpPr>
-          <p:cNvPr id="21" name="Text Placeholder 28">
-            <a:extLst/>
-          </p:cNvPr>
+          <p:cNvPr id="21" name="Text Placeholder 28"/>
           <p:cNvSpPr>
             <a:spLocks noGrp="1"/>
           </p:cNvSpPr>
@@ -5600,9 +5596,7 @@
       </p:sp>
       <p:sp>
         <p:nvSpPr>
-          <p:cNvPr id="22" name="Text Placeholder 28">
-            <a:extLst/>
-          </p:cNvPr>
+          <p:cNvPr id="22" name="Text Placeholder 28"/>
           <p:cNvSpPr>
             <a:spLocks noGrp="1"/>
           </p:cNvSpPr>
@@ -5641,9 +5635,7 @@
       </p:sp>
       <p:sp>
         <p:nvSpPr>
-          <p:cNvPr id="26" name="Title 1">
-            <a:extLst/>
-          </p:cNvPr>
+          <p:cNvPr id="26" name="Title 1"/>
           <p:cNvSpPr>
             <a:spLocks noGrp="1"/>
           </p:cNvSpPr>
@@ -5718,9 +5710,7 @@
       </p:sp>
       <p:sp>
         <p:nvSpPr>
-          <p:cNvPr id="20" name="Subtitle 2">
-            <a:extLst/>
-          </p:cNvPr>
+          <p:cNvPr id="20" name="Subtitle 2"/>
           <p:cNvSpPr>
             <a:spLocks noGrp="1"/>
           </p:cNvSpPr>
@@ -6000,7 +5990,6 @@
           <a:ln>
             <a:noFill/>
           </a:ln>
-          <a:extLst/>
         </p:spPr>
         <p:txBody>
           <a:bodyPr lIns="0" tIns="0" rIns="0" bIns="0"/>
@@ -6156,7 +6145,6 @@
           <a:ln>
             <a:noFill/>
           </a:ln>
-          <a:extLst/>
         </p:spPr>
         <p:txBody>
           <a:bodyPr lIns="0" tIns="0" rIns="0" bIns="0"/>
@@ -6661,7 +6649,6 @@
           <a:ln>
             <a:noFill/>
           </a:ln>
-          <a:extLst/>
         </p:spPr>
         <p:txBody>
           <a:bodyPr lIns="0" tIns="0" rIns="0" bIns="0">
@@ -6859,9 +6846,7 @@
       </p:pic>
       <p:sp>
         <p:nvSpPr>
-          <p:cNvPr id="21" name="Text Placeholder 28">
-            <a:extLst/>
-          </p:cNvPr>
+          <p:cNvPr id="21" name="Text Placeholder 28"/>
           <p:cNvSpPr>
             <a:spLocks noGrp="1"/>
           </p:cNvSpPr>
@@ -6900,9 +6885,7 @@
       </p:sp>
       <p:sp>
         <p:nvSpPr>
-          <p:cNvPr id="22" name="Text Placeholder 28">
-            <a:extLst/>
-          </p:cNvPr>
+          <p:cNvPr id="22" name="Text Placeholder 28"/>
           <p:cNvSpPr>
             <a:spLocks noGrp="1"/>
           </p:cNvSpPr>
@@ -6941,9 +6924,7 @@
       </p:sp>
       <p:sp>
         <p:nvSpPr>
-          <p:cNvPr id="26" name="Title 1">
-            <a:extLst/>
-          </p:cNvPr>
+          <p:cNvPr id="26" name="Title 1"/>
           <p:cNvSpPr>
             <a:spLocks noGrp="1"/>
           </p:cNvSpPr>
@@ -7018,9 +6999,7 @@
       </p:sp>
       <p:sp>
         <p:nvSpPr>
-          <p:cNvPr id="17" name="Subtitle 2">
-            <a:extLst/>
-          </p:cNvPr>
+          <p:cNvPr id="17" name="Subtitle 2"/>
           <p:cNvSpPr>
             <a:spLocks noGrp="1"/>
           </p:cNvSpPr>
@@ -7300,7 +7279,6 @@
           <a:ln>
             <a:noFill/>
           </a:ln>
-          <a:extLst/>
         </p:spPr>
         <p:txBody>
           <a:bodyPr lIns="0" tIns="0" rIns="0" bIns="0"/>
@@ -7456,7 +7434,6 @@
           <a:ln>
             <a:noFill/>
           </a:ln>
-          <a:extLst/>
         </p:spPr>
         <p:txBody>
           <a:bodyPr lIns="0" tIns="0" rIns="0" bIns="0"/>
@@ -7961,7 +7938,6 @@
           <a:ln>
             <a:noFill/>
           </a:ln>
-          <a:extLst/>
         </p:spPr>
         <p:txBody>
           <a:bodyPr lIns="0" tIns="0" rIns="0" bIns="0">
@@ -8159,9 +8135,7 @@
       </p:pic>
       <p:sp>
         <p:nvSpPr>
-          <p:cNvPr id="21" name="Text Placeholder 28">
-            <a:extLst/>
-          </p:cNvPr>
+          <p:cNvPr id="21" name="Text Placeholder 28"/>
           <p:cNvSpPr>
             <a:spLocks noGrp="1"/>
           </p:cNvSpPr>
@@ -8200,9 +8174,7 @@
       </p:sp>
       <p:sp>
         <p:nvSpPr>
-          <p:cNvPr id="22" name="Text Placeholder 28">
-            <a:extLst/>
-          </p:cNvPr>
+          <p:cNvPr id="22" name="Text Placeholder 28"/>
           <p:cNvSpPr>
             <a:spLocks noGrp="1"/>
           </p:cNvSpPr>
@@ -8241,9 +8213,7 @@
       </p:sp>
       <p:sp>
         <p:nvSpPr>
-          <p:cNvPr id="26" name="Title 1">
-            <a:extLst/>
-          </p:cNvPr>
+          <p:cNvPr id="26" name="Title 1"/>
           <p:cNvSpPr>
             <a:spLocks noGrp="1"/>
           </p:cNvSpPr>
@@ -8318,9 +8288,7 @@
       </p:sp>
       <p:sp>
         <p:nvSpPr>
-          <p:cNvPr id="20" name="Subtitle 2">
-            <a:extLst/>
-          </p:cNvPr>
+          <p:cNvPr id="20" name="Subtitle 2"/>
           <p:cNvSpPr>
             <a:spLocks noGrp="1"/>
           </p:cNvSpPr>
@@ -8486,7 +8454,6 @@
           <a:ln>
             <a:noFill/>
           </a:ln>
-          <a:extLst/>
         </p:spPr>
         <p:txBody>
           <a:bodyPr lIns="0" tIns="0" rIns="0" bIns="0"/>
@@ -8642,7 +8609,6 @@
           <a:ln>
             <a:noFill/>
           </a:ln>
-          <a:extLst/>
         </p:spPr>
         <p:txBody>
           <a:bodyPr lIns="0" tIns="0" rIns="0" bIns="0">
@@ -8840,9 +8806,7 @@
       </p:pic>
       <p:sp>
         <p:nvSpPr>
-          <p:cNvPr id="19" name="Title 1">
-            <a:extLst/>
-          </p:cNvPr>
+          <p:cNvPr id="19" name="Title 1"/>
           <p:cNvSpPr>
             <a:spLocks noGrp="1"/>
           </p:cNvSpPr>
@@ -8881,9 +8845,7 @@
       </p:sp>
       <p:sp>
         <p:nvSpPr>
-          <p:cNvPr id="20" name="Subtitle 2">
-            <a:extLst/>
-          </p:cNvPr>
+          <p:cNvPr id="20" name="Subtitle 2"/>
           <p:cNvSpPr>
             <a:spLocks noGrp="1"/>
           </p:cNvSpPr>
@@ -8986,9 +8948,7 @@
       </p:sp>
       <p:sp>
         <p:nvSpPr>
-          <p:cNvPr id="21" name="Text Placeholder 28">
-            <a:extLst/>
-          </p:cNvPr>
+          <p:cNvPr id="21" name="Text Placeholder 28"/>
           <p:cNvSpPr>
             <a:spLocks noGrp="1"/>
           </p:cNvSpPr>
@@ -9027,9 +8987,7 @@
       </p:sp>
       <p:sp>
         <p:nvSpPr>
-          <p:cNvPr id="22" name="Text Placeholder 28">
-            <a:extLst/>
-          </p:cNvPr>
+          <p:cNvPr id="22" name="Text Placeholder 28"/>
           <p:cNvSpPr>
             <a:spLocks noGrp="1"/>
           </p:cNvSpPr>
@@ -9413,7 +9371,6 @@
           <a:ln>
             <a:noFill/>
           </a:ln>
-          <a:extLst/>
         </p:spPr>
         <p:txBody>
           <a:bodyPr lIns="0" tIns="0" rIns="0" bIns="0">
@@ -9901,7 +9858,6 @@
           <a:ln>
             <a:noFill/>
           </a:ln>
-          <a:extLst/>
         </p:spPr>
         <p:txBody>
           <a:bodyPr lIns="0" tIns="0" rIns="0" bIns="0">
@@ -10387,7 +10343,6 @@
           <a:ln>
             <a:noFill/>
           </a:ln>
-          <a:extLst/>
         </p:spPr>
         <p:txBody>
           <a:bodyPr lIns="0" tIns="0" rIns="0" bIns="0">
@@ -10809,7 +10764,6 @@
           <a:ln>
             <a:noFill/>
           </a:ln>
-          <a:extLst/>
         </p:spPr>
         <p:txBody>
           <a:bodyPr lIns="0" tIns="0" rIns="0" bIns="0">
@@ -11261,9 +11215,7 @@
       </p:grpSpPr>
       <p:sp>
         <p:nvSpPr>
-          <p:cNvPr id="2" name="Title 1">
-            <a:extLst/>
-          </p:cNvPr>
+          <p:cNvPr id="2" name="Title 1"/>
           <p:cNvSpPr>
             <a:spLocks noGrp="1"/>
           </p:cNvSpPr>
@@ -11285,9 +11237,7 @@
       </p:sp>
       <p:sp>
         <p:nvSpPr>
-          <p:cNvPr id="4" name="Text Placeholder 2">
-            <a:extLst/>
-          </p:cNvPr>
+          <p:cNvPr id="4" name="Text Placeholder 2"/>
           <p:cNvSpPr>
             <a:spLocks noGrp="1"/>
           </p:cNvSpPr>
@@ -11644,9 +11594,7 @@
       </p:cxnSp>
       <p:sp>
         <p:nvSpPr>
-          <p:cNvPr id="2" name="Title 1">
-            <a:extLst/>
-          </p:cNvPr>
+          <p:cNvPr id="2" name="Title 1"/>
           <p:cNvSpPr>
             <a:spLocks noGrp="1"/>
           </p:cNvSpPr>
@@ -11668,9 +11616,7 @@
       </p:sp>
       <p:sp>
         <p:nvSpPr>
-          <p:cNvPr id="44" name="Text Placeholder 43">
-            <a:extLst/>
-          </p:cNvPr>
+          <p:cNvPr id="44" name="Text Placeholder 43"/>
           <p:cNvSpPr>
             <a:spLocks noGrp="1"/>
           </p:cNvSpPr>
@@ -11713,9 +11659,7 @@
       </p:sp>
       <p:sp>
         <p:nvSpPr>
-          <p:cNvPr id="9" name="Text Placeholder 131">
-            <a:extLst/>
-          </p:cNvPr>
+          <p:cNvPr id="9" name="Text Placeholder 131"/>
           <p:cNvSpPr>
             <a:spLocks noGrp="1"/>
           </p:cNvSpPr>
@@ -11765,9 +11709,7 @@
       </p:sp>
       <p:sp>
         <p:nvSpPr>
-          <p:cNvPr id="4" name="Content Placeholder 3">
-            <a:extLst/>
-          </p:cNvPr>
+          <p:cNvPr id="4" name="Content Placeholder 3"/>
           <p:cNvSpPr>
             <a:spLocks noGrp="1"/>
           </p:cNvSpPr>
@@ -11857,9 +11799,7 @@
       </p:sp>
       <p:sp>
         <p:nvSpPr>
-          <p:cNvPr id="10" name="Text Placeholder 131">
-            <a:extLst/>
-          </p:cNvPr>
+          <p:cNvPr id="10" name="Text Placeholder 131"/>
           <p:cNvSpPr>
             <a:spLocks noGrp="1"/>
           </p:cNvSpPr>
@@ -11909,9 +11849,7 @@
       </p:sp>
       <p:sp>
         <p:nvSpPr>
-          <p:cNvPr id="8" name="Content Placeholder 7">
-            <a:extLst/>
-          </p:cNvPr>
+          <p:cNvPr id="8" name="Content Placeholder 7"/>
           <p:cNvSpPr>
             <a:spLocks noGrp="1"/>
           </p:cNvSpPr>
@@ -12133,9 +12071,7 @@
       </p:grpSp>
       <p:sp>
         <p:nvSpPr>
-          <p:cNvPr id="2" name="Title 1">
-            <a:extLst/>
-          </p:cNvPr>
+          <p:cNvPr id="2" name="Title 1"/>
           <p:cNvSpPr>
             <a:spLocks noGrp="1"/>
           </p:cNvSpPr>
@@ -12157,9 +12093,7 @@
       </p:sp>
       <p:sp>
         <p:nvSpPr>
-          <p:cNvPr id="44" name="Text Placeholder 43">
-            <a:extLst/>
-          </p:cNvPr>
+          <p:cNvPr id="44" name="Text Placeholder 43"/>
           <p:cNvSpPr>
             <a:spLocks noGrp="1"/>
           </p:cNvSpPr>
@@ -12199,9 +12133,7 @@
       </p:sp>
       <p:sp>
         <p:nvSpPr>
-          <p:cNvPr id="7" name="Text Placeholder 2">
-            <a:extLst/>
-          </p:cNvPr>
+          <p:cNvPr id="7" name="Text Placeholder 2"/>
           <p:cNvSpPr>
             <a:spLocks noGrp="1"/>
           </p:cNvSpPr>
@@ -12272,9 +12204,7 @@
       </p:sp>
       <p:sp>
         <p:nvSpPr>
-          <p:cNvPr id="100" name="Text Placeholder 131">
-            <a:extLst/>
-          </p:cNvPr>
+          <p:cNvPr id="100" name="Text Placeholder 131"/>
           <p:cNvSpPr>
             <a:spLocks noGrp="1"/>
           </p:cNvSpPr>
@@ -12324,9 +12254,7 @@
       </p:sp>
       <p:sp>
         <p:nvSpPr>
-          <p:cNvPr id="13" name="Text Placeholder 2">
-            <a:extLst/>
-          </p:cNvPr>
+          <p:cNvPr id="13" name="Text Placeholder 2"/>
           <p:cNvSpPr>
             <a:spLocks noGrp="1"/>
           </p:cNvSpPr>
@@ -12369,9 +12297,7 @@
       </p:sp>
       <p:sp>
         <p:nvSpPr>
-          <p:cNvPr id="14" name="Text Placeholder 2">
-            <a:extLst/>
-          </p:cNvPr>
+          <p:cNvPr id="14" name="Text Placeholder 2"/>
           <p:cNvSpPr>
             <a:spLocks noGrp="1"/>
           </p:cNvSpPr>
@@ -12421,9 +12347,7 @@
       </p:sp>
       <p:sp>
         <p:nvSpPr>
-          <p:cNvPr id="15" name="Text Placeholder 131">
-            <a:extLst/>
-          </p:cNvPr>
+          <p:cNvPr id="15" name="Text Placeholder 131"/>
           <p:cNvSpPr>
             <a:spLocks noGrp="1"/>
           </p:cNvSpPr>
@@ -12473,9 +12397,7 @@
       </p:sp>
       <p:sp>
         <p:nvSpPr>
-          <p:cNvPr id="16" name="Text Placeholder 131">
-            <a:extLst/>
-          </p:cNvPr>
+          <p:cNvPr id="16" name="Text Placeholder 131"/>
           <p:cNvSpPr>
             <a:spLocks noGrp="1"/>
           </p:cNvSpPr>
@@ -12595,9 +12517,7 @@
       </p:cxnSp>
       <p:sp>
         <p:nvSpPr>
-          <p:cNvPr id="2" name="Title 1">
-            <a:extLst/>
-          </p:cNvPr>
+          <p:cNvPr id="2" name="Title 1"/>
           <p:cNvSpPr>
             <a:spLocks noGrp="1"/>
           </p:cNvSpPr>
@@ -12619,9 +12539,7 @@
       </p:sp>
       <p:sp>
         <p:nvSpPr>
-          <p:cNvPr id="44" name="Text Placeholder 43">
-            <a:extLst/>
-          </p:cNvPr>
+          <p:cNvPr id="44" name="Text Placeholder 43"/>
           <p:cNvSpPr>
             <a:spLocks noGrp="1"/>
           </p:cNvSpPr>
@@ -12661,9 +12579,7 @@
       </p:sp>
       <p:sp>
         <p:nvSpPr>
-          <p:cNvPr id="47" name="Text Placeholder 2">
-            <a:extLst/>
-          </p:cNvPr>
+          <p:cNvPr id="47" name="Text Placeholder 2"/>
           <p:cNvSpPr>
             <a:spLocks noGrp="1"/>
           </p:cNvSpPr>
@@ -12756,9 +12672,7 @@
       </p:sp>
       <p:sp>
         <p:nvSpPr>
-          <p:cNvPr id="18" name="Text Placeholder 2">
-            <a:extLst/>
-          </p:cNvPr>
+          <p:cNvPr id="18" name="Text Placeholder 2"/>
           <p:cNvSpPr>
             <a:spLocks noGrp="1"/>
           </p:cNvSpPr>
@@ -12878,9 +12792,7 @@
       </p:cxnSp>
       <p:sp>
         <p:nvSpPr>
-          <p:cNvPr id="2" name="Title 1">
-            <a:extLst/>
-          </p:cNvPr>
+          <p:cNvPr id="2" name="Title 1"/>
           <p:cNvSpPr>
             <a:spLocks noGrp="1"/>
           </p:cNvSpPr>
@@ -12902,9 +12814,7 @@
       </p:sp>
       <p:sp>
         <p:nvSpPr>
-          <p:cNvPr id="44" name="Text Placeholder 43">
-            <a:extLst/>
-          </p:cNvPr>
+          <p:cNvPr id="44" name="Text Placeholder 43"/>
           <p:cNvSpPr>
             <a:spLocks noGrp="1"/>
           </p:cNvSpPr>
@@ -12944,9 +12854,7 @@
       </p:sp>
       <p:sp>
         <p:nvSpPr>
-          <p:cNvPr id="4" name="Content Placeholder 3">
-            <a:extLst/>
-          </p:cNvPr>
+          <p:cNvPr id="4" name="Content Placeholder 3"/>
           <p:cNvSpPr>
             <a:spLocks noGrp="1"/>
           </p:cNvSpPr>
@@ -13036,9 +12944,7 @@
       </p:sp>
       <p:sp>
         <p:nvSpPr>
-          <p:cNvPr id="6" name="Content Placeholder 5">
-            <a:extLst/>
-          </p:cNvPr>
+          <p:cNvPr id="6" name="Content Placeholder 5"/>
           <p:cNvSpPr>
             <a:spLocks noGrp="1"/>
           </p:cNvSpPr>
@@ -13217,9 +13123,7 @@
       </p:grpSp>
       <p:sp>
         <p:nvSpPr>
-          <p:cNvPr id="2" name="Title 1">
-            <a:extLst/>
-          </p:cNvPr>
+          <p:cNvPr id="2" name="Title 1"/>
           <p:cNvSpPr>
             <a:spLocks noGrp="1"/>
           </p:cNvSpPr>
@@ -13241,9 +13145,7 @@
       </p:sp>
       <p:sp>
         <p:nvSpPr>
-          <p:cNvPr id="44" name="Text Placeholder 43">
-            <a:extLst/>
-          </p:cNvPr>
+          <p:cNvPr id="44" name="Text Placeholder 43"/>
           <p:cNvSpPr>
             <a:spLocks noGrp="1"/>
           </p:cNvSpPr>
@@ -13283,9 +13185,7 @@
       </p:sp>
       <p:sp>
         <p:nvSpPr>
-          <p:cNvPr id="18" name="Text Placeholder 131">
-            <a:extLst/>
-          </p:cNvPr>
+          <p:cNvPr id="18" name="Text Placeholder 131"/>
           <p:cNvSpPr>
             <a:spLocks noGrp="1"/>
           </p:cNvSpPr>
@@ -13335,9 +13235,7 @@
       </p:sp>
       <p:sp>
         <p:nvSpPr>
-          <p:cNvPr id="19" name="Text Placeholder 131">
-            <a:extLst/>
-          </p:cNvPr>
+          <p:cNvPr id="19" name="Text Placeholder 131"/>
           <p:cNvSpPr>
             <a:spLocks noGrp="1"/>
           </p:cNvSpPr>
@@ -13377,9 +13275,7 @@
       </p:sp>
       <p:sp>
         <p:nvSpPr>
-          <p:cNvPr id="20" name="Text Placeholder 131">
-            <a:extLst/>
-          </p:cNvPr>
+          <p:cNvPr id="20" name="Text Placeholder 131"/>
           <p:cNvSpPr>
             <a:spLocks noGrp="1"/>
           </p:cNvSpPr>
@@ -13419,9 +13315,7 @@
       </p:sp>
       <p:sp>
         <p:nvSpPr>
-          <p:cNvPr id="4" name="Content Placeholder 3">
-            <a:extLst/>
-          </p:cNvPr>
+          <p:cNvPr id="4" name="Content Placeholder 3"/>
           <p:cNvSpPr>
             <a:spLocks noGrp="1"/>
           </p:cNvSpPr>
@@ -13482,9 +13376,7 @@
       </p:sp>
       <p:sp>
         <p:nvSpPr>
-          <p:cNvPr id="6" name="Content Placeholder 5">
-            <a:extLst/>
-          </p:cNvPr>
+          <p:cNvPr id="6" name="Content Placeholder 5"/>
           <p:cNvSpPr>
             <a:spLocks noGrp="1"/>
           </p:cNvSpPr>
@@ -13545,9 +13437,7 @@
       </p:sp>
       <p:sp>
         <p:nvSpPr>
-          <p:cNvPr id="9" name="Content Placeholder 8">
-            <a:extLst/>
-          </p:cNvPr>
+          <p:cNvPr id="9" name="Content Placeholder 8"/>
           <p:cNvSpPr>
             <a:spLocks noGrp="1"/>
           </p:cNvSpPr>
@@ -13639,9 +13529,7 @@
       </p:grpSpPr>
       <p:sp>
         <p:nvSpPr>
-          <p:cNvPr id="2" name="Title 1">
-            <a:extLst/>
-          </p:cNvPr>
+          <p:cNvPr id="2" name="Title 1"/>
           <p:cNvSpPr>
             <a:spLocks noGrp="1"/>
           </p:cNvSpPr>
@@ -13663,9 +13551,7 @@
       </p:sp>
       <p:sp>
         <p:nvSpPr>
-          <p:cNvPr id="44" name="Text Placeholder 43">
-            <a:extLst/>
-          </p:cNvPr>
+          <p:cNvPr id="44" name="Text Placeholder 43"/>
           <p:cNvSpPr>
             <a:spLocks noGrp="1"/>
           </p:cNvSpPr>
@@ -13705,9 +13591,7 @@
       </p:sp>
       <p:sp>
         <p:nvSpPr>
-          <p:cNvPr id="6" name="Picture Placeholder 5">
-            <a:extLst/>
-          </p:cNvPr>
+          <p:cNvPr id="6" name="Picture Placeholder 5"/>
           <p:cNvSpPr>
             <a:spLocks noGrp="1"/>
           </p:cNvSpPr>
@@ -13741,9 +13625,7 @@
       </p:sp>
       <p:sp>
         <p:nvSpPr>
-          <p:cNvPr id="104" name="Picture Placeholder 5">
-            <a:extLst/>
-          </p:cNvPr>
+          <p:cNvPr id="104" name="Picture Placeholder 5"/>
           <p:cNvSpPr>
             <a:spLocks noGrp="1"/>
           </p:cNvSpPr>
@@ -13777,9 +13659,7 @@
       </p:sp>
       <p:sp>
         <p:nvSpPr>
-          <p:cNvPr id="105" name="Picture Placeholder 5">
-            <a:extLst/>
-          </p:cNvPr>
+          <p:cNvPr id="105" name="Picture Placeholder 5"/>
           <p:cNvSpPr>
             <a:spLocks noGrp="1"/>
           </p:cNvSpPr>
@@ -13813,9 +13693,7 @@
       </p:sp>
       <p:sp>
         <p:nvSpPr>
-          <p:cNvPr id="106" name="Picture Placeholder 5">
-            <a:extLst/>
-          </p:cNvPr>
+          <p:cNvPr id="106" name="Picture Placeholder 5"/>
           <p:cNvSpPr>
             <a:spLocks noGrp="1"/>
           </p:cNvSpPr>
@@ -13849,9 +13727,7 @@
       </p:sp>
       <p:sp>
         <p:nvSpPr>
-          <p:cNvPr id="14" name="Text Placeholder 7">
-            <a:extLst/>
-          </p:cNvPr>
+          <p:cNvPr id="14" name="Text Placeholder 7"/>
           <p:cNvSpPr>
             <a:spLocks noGrp="1"/>
           </p:cNvSpPr>
@@ -13945,9 +13821,7 @@
       </p:sp>
       <p:sp>
         <p:nvSpPr>
-          <p:cNvPr id="16" name="Text Placeholder 7">
-            <a:extLst/>
-          </p:cNvPr>
+          <p:cNvPr id="16" name="Text Placeholder 7"/>
           <p:cNvSpPr>
             <a:spLocks noGrp="1"/>
           </p:cNvSpPr>
@@ -14068,9 +13942,7 @@
       </p:grpSpPr>
       <p:sp>
         <p:nvSpPr>
-          <p:cNvPr id="2" name="Title 1">
-            <a:extLst/>
-          </p:cNvPr>
+          <p:cNvPr id="2" name="Title 1"/>
           <p:cNvSpPr>
             <a:spLocks noGrp="1"/>
           </p:cNvSpPr>
@@ -14092,9 +13964,7 @@
       </p:sp>
       <p:sp>
         <p:nvSpPr>
-          <p:cNvPr id="44" name="Text Placeholder 43">
-            <a:extLst/>
-          </p:cNvPr>
+          <p:cNvPr id="44" name="Text Placeholder 43"/>
           <p:cNvSpPr>
             <a:spLocks noGrp="1"/>
           </p:cNvSpPr>
@@ -14134,9 +14004,7 @@
       </p:sp>
       <p:sp>
         <p:nvSpPr>
-          <p:cNvPr id="7" name="Text Placeholder 2">
-            <a:extLst/>
-          </p:cNvPr>
+          <p:cNvPr id="7" name="Text Placeholder 2"/>
           <p:cNvSpPr>
             <a:spLocks noGrp="1"/>
           </p:cNvSpPr>
@@ -14200,9 +14068,7 @@
       </p:sp>
       <p:sp>
         <p:nvSpPr>
-          <p:cNvPr id="50" name="Picture Placeholder 5">
-            <a:extLst/>
-          </p:cNvPr>
+          <p:cNvPr id="50" name="Picture Placeholder 5"/>
           <p:cNvSpPr>
             <a:spLocks noGrp="1"/>
           </p:cNvSpPr>
@@ -14267,9 +14133,7 @@
       </p:grpSpPr>
       <p:sp>
         <p:nvSpPr>
-          <p:cNvPr id="2" name="Title 1">
-            <a:extLst/>
-          </p:cNvPr>
+          <p:cNvPr id="2" name="Title 1"/>
           <p:cNvSpPr>
             <a:spLocks noGrp="1"/>
           </p:cNvSpPr>
@@ -14298,9 +14162,7 @@
       </p:sp>
       <p:sp>
         <p:nvSpPr>
-          <p:cNvPr id="10" name="Table Placeholder 3">
-            <a:extLst/>
-          </p:cNvPr>
+          <p:cNvPr id="10" name="Table Placeholder 3"/>
           <p:cNvSpPr>
             <a:spLocks noGrp="1"/>
           </p:cNvSpPr>
@@ -14365,9 +14227,7 @@
       </p:grpSpPr>
       <p:sp>
         <p:nvSpPr>
-          <p:cNvPr id="2" name="Title 1">
-            <a:extLst/>
-          </p:cNvPr>
+          <p:cNvPr id="2" name="Title 1"/>
           <p:cNvSpPr>
             <a:spLocks noGrp="1"/>
           </p:cNvSpPr>
@@ -14389,9 +14249,7 @@
       </p:sp>
       <p:sp>
         <p:nvSpPr>
-          <p:cNvPr id="44" name="Text Placeholder 43">
-            <a:extLst/>
-          </p:cNvPr>
+          <p:cNvPr id="44" name="Text Placeholder 43"/>
           <p:cNvSpPr>
             <a:spLocks noGrp="1"/>
           </p:cNvSpPr>
@@ -14431,9 +14289,7 @@
       </p:sp>
       <p:sp>
         <p:nvSpPr>
-          <p:cNvPr id="7" name="Text Placeholder 2">
-            <a:extLst/>
-          </p:cNvPr>
+          <p:cNvPr id="7" name="Text Placeholder 2"/>
           <p:cNvSpPr>
             <a:spLocks noGrp="1"/>
           </p:cNvSpPr>
@@ -14612,9 +14468,7 @@
       </p:grpSpPr>
       <p:sp>
         <p:nvSpPr>
-          <p:cNvPr id="2" name="Title 1">
-            <a:extLst/>
-          </p:cNvPr>
+          <p:cNvPr id="2" name="Title 1"/>
           <p:cNvSpPr>
             <a:spLocks noGrp="1"/>
           </p:cNvSpPr>
@@ -14954,7 +14808,6 @@
           <a:ln>
             <a:noFill/>
           </a:ln>
-          <a:extLst/>
         </p:spPr>
         <p:txBody>
           <a:bodyPr lIns="0" tIns="0" rIns="0" bIns="0">
@@ -15192,7 +15045,6 @@
           <a:ln>
             <a:noFill/>
           </a:ln>
-          <a:extLst/>
         </p:spPr>
         <p:txBody>
           <a:bodyPr lIns="0" tIns="0" rIns="0" bIns="0">
@@ -15743,7 +15595,6 @@
           <a:ln>
             <a:noFill/>
           </a:ln>
-          <a:extLst/>
         </p:spPr>
         <p:txBody>
           <a:bodyPr lIns="0" tIns="0" rIns="0" bIns="0">
@@ -15944,7 +15795,6 @@
           <a:ln>
             <a:noFill/>
           </a:ln>
-          <a:extLst/>
         </p:spPr>
         <p:txBody>
           <a:bodyPr lIns="0" tIns="0" rIns="0" bIns="0">
@@ -16122,7 +15972,6 @@
           <a:ln>
             <a:noFill/>
           </a:ln>
-          <a:extLst/>
         </p:spPr>
         <p:txBody>
           <a:bodyPr lIns="0" tIns="0" rIns="0" bIns="0">
@@ -16360,7 +16209,6 @@
           <a:ln>
             <a:noFill/>
           </a:ln>
-          <a:extLst/>
         </p:spPr>
         <p:txBody>
           <a:bodyPr lIns="0" tIns="0" rIns="0" bIns="0">
@@ -16987,9 +16835,7 @@
       </p:pic>
       <p:sp>
         <p:nvSpPr>
-          <p:cNvPr id="2" name="Title 1">
-            <a:extLst/>
-          </p:cNvPr>
+          <p:cNvPr id="2" name="Title 1"/>
           <p:cNvSpPr>
             <a:spLocks noGrp="1"/>
           </p:cNvSpPr>
@@ -17020,9 +16866,7 @@
       </p:sp>
       <p:sp>
         <p:nvSpPr>
-          <p:cNvPr id="7" name="Text Placeholder 43">
-            <a:extLst/>
-          </p:cNvPr>
+          <p:cNvPr id="7" name="Text Placeholder 43"/>
           <p:cNvSpPr>
             <a:spLocks noGrp="1"/>
           </p:cNvSpPr>
@@ -17059,9 +16903,7 @@
       </p:sp>
       <p:sp>
         <p:nvSpPr>
-          <p:cNvPr id="8" name="Text Placeholder 2">
-            <a:extLst/>
-          </p:cNvPr>
+          <p:cNvPr id="8" name="Text Placeholder 2"/>
           <p:cNvSpPr>
             <a:spLocks noGrp="1"/>
           </p:cNvSpPr>
@@ -19786,7 +19628,6 @@
           <a:ln>
             <a:noFill/>
           </a:ln>
-          <a:extLst/>
         </p:spPr>
         <p:txBody>
           <a:bodyPr lIns="0" tIns="0" rIns="0" bIns="0">
@@ -19948,7 +19789,6 @@
           <a:ln>
             <a:noFill/>
           </a:ln>
-          <a:extLst/>
         </p:spPr>
         <p:txBody>
           <a:bodyPr lIns="0" tIns="0" rIns="0" bIns="0">
@@ -24773,6 +24613,1674 @@
     <p:extLst>
       <p:ext uri="{BB962C8B-B14F-4D97-AF65-F5344CB8AC3E}">
         <p14:creationId xmlns:p14="http://schemas.microsoft.com/office/powerpoint/2010/main" val="2508251978"/>
+      </p:ext>
+    </p:extLst>
+  </p:cSld>
+  <p:clrMapOvr>
+    <a:masterClrMapping/>
+  </p:clrMapOvr>
+</p:sld>
+</file>
+
+<file path=ppt/slides/slide7.xml><?xml version="1.0" encoding="utf-8"?>
+<p:sld xmlns:a="http://schemas.openxmlformats.org/drawingml/2006/main" xmlns:r="http://schemas.openxmlformats.org/officeDocument/2006/relationships" xmlns:p="http://schemas.openxmlformats.org/presentationml/2006/main">
+  <p:cSld>
+    <p:spTree>
+      <p:nvGrpSpPr>
+        <p:cNvPr id="1" name=""/>
+        <p:cNvGrpSpPr/>
+        <p:nvPr/>
+      </p:nvGrpSpPr>
+      <p:grpSpPr>
+        <a:xfrm>
+          <a:off x="0" y="0"/>
+          <a:ext cx="0" cy="0"/>
+          <a:chOff x="0" y="0"/>
+          <a:chExt cx="0" cy="0"/>
+        </a:xfrm>
+      </p:grpSpPr>
+      <p:sp>
+        <p:nvSpPr>
+          <p:cNvPr id="5" name="Rectangle 4">
+            <a:extLst>
+              <a:ext uri="{FF2B5EF4-FFF2-40B4-BE49-F238E27FC236}">
+                <a16:creationId xmlns:a16="http://schemas.microsoft.com/office/drawing/2014/main" id="{55357FC9-9A32-09E3-3D49-2B944964E476}"/>
+              </a:ext>
+            </a:extLst>
+          </p:cNvPr>
+          <p:cNvSpPr/>
+          <p:nvPr/>
+        </p:nvSpPr>
+        <p:spPr>
+          <a:xfrm>
+            <a:off x="470325" y="517726"/>
+            <a:ext cx="3226322" cy="378650"/>
+          </a:xfrm>
+          <a:prstGeom prst="rect">
+            <a:avLst/>
+          </a:prstGeom>
+          <a:solidFill>
+            <a:schemeClr val="bg1">
+              <a:lumMod val="50000"/>
+            </a:schemeClr>
+          </a:solidFill>
+          <a:ln w="6350" cmpd="sng">
+            <a:noFill/>
+          </a:ln>
+          <a:effectLst/>
+        </p:spPr>
+        <p:style>
+          <a:lnRef idx="1">
+            <a:schemeClr val="accent1"/>
+          </a:lnRef>
+          <a:fillRef idx="3">
+            <a:schemeClr val="accent1"/>
+          </a:fillRef>
+          <a:effectRef idx="2">
+            <a:schemeClr val="accent1"/>
+          </a:effectRef>
+          <a:fontRef idx="minor">
+            <a:schemeClr val="lt1"/>
+          </a:fontRef>
+        </p:style>
+        <p:txBody>
+          <a:bodyPr rtlCol="0" anchor="ctr"/>
+          <a:lstStyle/>
+          <a:p>
+            <a:pPr algn="ctr">
+              <a:spcAft>
+                <a:spcPts val="600"/>
+              </a:spcAft>
+            </a:pPr>
+            <a:r>
+              <a:rPr lang="en-US" sz="1600" b="1" dirty="0">
+                <a:solidFill>
+                  <a:schemeClr val="bg1"/>
+                </a:solidFill>
+              </a:rPr>
+              <a:t>Fault Exception</a:t>
+            </a:r>
+            <a:endParaRPr lang="en-US" sz="1600" b="1" dirty="0">
+              <a:solidFill>
+                <a:schemeClr val="bg1"/>
+              </a:solidFill>
+              <a:latin typeface="Courier New" panose="02070309020205020404" pitchFamily="49" charset="0"/>
+              <a:cs typeface="Courier New" panose="02070309020205020404" pitchFamily="49" charset="0"/>
+            </a:endParaRPr>
+          </a:p>
+        </p:txBody>
+      </p:sp>
+      <p:sp>
+        <p:nvSpPr>
+          <p:cNvPr id="6" name="Rectangle 5">
+            <a:extLst>
+              <a:ext uri="{FF2B5EF4-FFF2-40B4-BE49-F238E27FC236}">
+                <a16:creationId xmlns:a16="http://schemas.microsoft.com/office/drawing/2014/main" id="{669F36A3-B89D-1245-61B1-BC626F74CE96}"/>
+              </a:ext>
+            </a:extLst>
+          </p:cNvPr>
+          <p:cNvSpPr/>
+          <p:nvPr/>
+        </p:nvSpPr>
+        <p:spPr>
+          <a:xfrm>
+            <a:off x="4523213" y="517725"/>
+            <a:ext cx="2869135" cy="5759873"/>
+          </a:xfrm>
+          <a:prstGeom prst="rect">
+            <a:avLst/>
+          </a:prstGeom>
+          <a:solidFill>
+            <a:srgbClr val="00A960">
+              <a:alpha val="40000"/>
+            </a:srgbClr>
+          </a:solidFill>
+          <a:ln w="6350" cmpd="sng">
+            <a:noFill/>
+          </a:ln>
+          <a:effectLst/>
+        </p:spPr>
+        <p:style>
+          <a:lnRef idx="1">
+            <a:schemeClr val="accent1"/>
+          </a:lnRef>
+          <a:fillRef idx="3">
+            <a:schemeClr val="accent1"/>
+          </a:fillRef>
+          <a:effectRef idx="2">
+            <a:schemeClr val="accent1"/>
+          </a:effectRef>
+          <a:fontRef idx="minor">
+            <a:schemeClr val="lt1"/>
+          </a:fontRef>
+        </p:style>
+        <p:txBody>
+          <a:bodyPr rtlCol="0" anchor="t" anchorCtr="0"/>
+          <a:lstStyle/>
+          <a:p>
+            <a:pPr algn="ctr">
+              <a:spcAft>
+                <a:spcPts val="600"/>
+              </a:spcAft>
+            </a:pPr>
+            <a:r>
+              <a:rPr lang="en-US" sz="1800" b="1" dirty="0">
+                <a:solidFill>
+                  <a:schemeClr val="bg1">
+                    <a:lumMod val="50000"/>
+                  </a:schemeClr>
+                </a:solidFill>
+                <a:cs typeface="Courier New" panose="02070309020205020404" pitchFamily="49" charset="0"/>
+              </a:rPr>
+              <a:t>Memory (uninitialized)</a:t>
+            </a:r>
+          </a:p>
+        </p:txBody>
+      </p:sp>
+      <p:sp>
+        <p:nvSpPr>
+          <p:cNvPr id="19" name="Rectangle 18">
+            <a:extLst>
+              <a:ext uri="{FF2B5EF4-FFF2-40B4-BE49-F238E27FC236}">
+                <a16:creationId xmlns:a16="http://schemas.microsoft.com/office/drawing/2014/main" id="{85695119-F823-C8F5-F057-C2CBA16317D8}"/>
+              </a:ext>
+            </a:extLst>
+          </p:cNvPr>
+          <p:cNvSpPr/>
+          <p:nvPr/>
+        </p:nvSpPr>
+        <p:spPr>
+          <a:xfrm>
+            <a:off x="470325" y="1190826"/>
+            <a:ext cx="3226322" cy="378650"/>
+          </a:xfrm>
+          <a:prstGeom prst="rect">
+            <a:avLst/>
+          </a:prstGeom>
+          <a:solidFill>
+            <a:srgbClr val="128CAB"/>
+          </a:solidFill>
+          <a:ln w="6350" cmpd="sng">
+            <a:noFill/>
+          </a:ln>
+          <a:effectLst/>
+        </p:spPr>
+        <p:style>
+          <a:lnRef idx="1">
+            <a:schemeClr val="accent1"/>
+          </a:lnRef>
+          <a:fillRef idx="3">
+            <a:schemeClr val="accent1"/>
+          </a:fillRef>
+          <a:effectRef idx="2">
+            <a:schemeClr val="accent1"/>
+          </a:effectRef>
+          <a:fontRef idx="minor">
+            <a:schemeClr val="lt1"/>
+          </a:fontRef>
+        </p:style>
+        <p:txBody>
+          <a:bodyPr rtlCol="0" anchor="ctr"/>
+          <a:lstStyle/>
+          <a:p>
+            <a:pPr algn="ctr">
+              <a:spcAft>
+                <a:spcPts val="600"/>
+              </a:spcAft>
+            </a:pPr>
+            <a:r>
+              <a:rPr lang="en-US" sz="1200" b="1" dirty="0" err="1">
+                <a:solidFill>
+                  <a:schemeClr val="bg1"/>
+                </a:solidFill>
+                <a:latin typeface="Courier New" panose="02070309020205020404" pitchFamily="49" charset="0"/>
+                <a:cs typeface="Courier New" panose="02070309020205020404" pitchFamily="49" charset="0"/>
+              </a:rPr>
+              <a:t>ARM_FaultStore</a:t>
+            </a:r>
+            <a:r>
+              <a:rPr lang="en-US" sz="1200" b="1" dirty="0">
+                <a:solidFill>
+                  <a:schemeClr val="bg1"/>
+                </a:solidFill>
+                <a:latin typeface="Courier New" panose="02070309020205020404" pitchFamily="49" charset="0"/>
+                <a:cs typeface="Courier New" panose="02070309020205020404" pitchFamily="49" charset="0"/>
+              </a:rPr>
+              <a:t>()</a:t>
+            </a:r>
+          </a:p>
+        </p:txBody>
+      </p:sp>
+      <p:cxnSp>
+        <p:nvCxnSpPr>
+          <p:cNvPr id="21" name="Straight Arrow Connector 20">
+            <a:extLst>
+              <a:ext uri="{FF2B5EF4-FFF2-40B4-BE49-F238E27FC236}">
+                <a16:creationId xmlns:a16="http://schemas.microsoft.com/office/drawing/2014/main" id="{C5CCBE0B-CAC6-2D0F-E78A-5D39846BDF5E}"/>
+              </a:ext>
+            </a:extLst>
+          </p:cNvPr>
+          <p:cNvCxnSpPr>
+            <a:cxnSpLocks/>
+            <a:stCxn id="5" idx="2"/>
+          </p:cNvCxnSpPr>
+          <p:nvPr/>
+        </p:nvCxnSpPr>
+        <p:spPr>
+          <a:xfrm>
+            <a:off x="2083486" y="896376"/>
+            <a:ext cx="0" cy="300387"/>
+          </a:xfrm>
+          <a:prstGeom prst="straightConnector1">
+            <a:avLst/>
+          </a:prstGeom>
+          <a:ln w="28575">
+            <a:solidFill>
+              <a:schemeClr val="tx1">
+                <a:lumMod val="65000"/>
+                <a:lumOff val="35000"/>
+              </a:schemeClr>
+            </a:solidFill>
+            <a:tailEnd type="triangle"/>
+          </a:ln>
+        </p:spPr>
+        <p:style>
+          <a:lnRef idx="1">
+            <a:schemeClr val="accent1"/>
+          </a:lnRef>
+          <a:fillRef idx="0">
+            <a:schemeClr val="accent1"/>
+          </a:fillRef>
+          <a:effectRef idx="0">
+            <a:schemeClr val="accent1"/>
+          </a:effectRef>
+          <a:fontRef idx="minor">
+            <a:schemeClr val="tx1"/>
+          </a:fontRef>
+        </p:style>
+      </p:cxnSp>
+      <p:cxnSp>
+        <p:nvCxnSpPr>
+          <p:cNvPr id="23" name="Straight Arrow Connector 22">
+            <a:extLst>
+              <a:ext uri="{FF2B5EF4-FFF2-40B4-BE49-F238E27FC236}">
+                <a16:creationId xmlns:a16="http://schemas.microsoft.com/office/drawing/2014/main" id="{08D420A0-245A-8C0C-CB01-BD7DDF8B0919}"/>
+              </a:ext>
+            </a:extLst>
+          </p:cNvPr>
+          <p:cNvCxnSpPr>
+            <a:cxnSpLocks/>
+            <a:stCxn id="19" idx="3"/>
+          </p:cNvCxnSpPr>
+          <p:nvPr/>
+        </p:nvCxnSpPr>
+        <p:spPr>
+          <a:xfrm>
+            <a:off x="3696647" y="1380151"/>
+            <a:ext cx="922076" cy="0"/>
+          </a:xfrm>
+          <a:prstGeom prst="straightConnector1">
+            <a:avLst/>
+          </a:prstGeom>
+          <a:ln w="28575">
+            <a:solidFill>
+              <a:schemeClr val="tx1">
+                <a:lumMod val="65000"/>
+                <a:lumOff val="35000"/>
+              </a:schemeClr>
+            </a:solidFill>
+            <a:tailEnd type="triangle"/>
+          </a:ln>
+        </p:spPr>
+        <p:style>
+          <a:lnRef idx="1">
+            <a:schemeClr val="accent1"/>
+          </a:lnRef>
+          <a:fillRef idx="0">
+            <a:schemeClr val="accent1"/>
+          </a:fillRef>
+          <a:effectRef idx="0">
+            <a:schemeClr val="accent1"/>
+          </a:effectRef>
+          <a:fontRef idx="minor">
+            <a:schemeClr val="tx1"/>
+          </a:fontRef>
+        </p:style>
+      </p:cxnSp>
+      <p:sp>
+        <p:nvSpPr>
+          <p:cNvPr id="27" name="Rectangle 26">
+            <a:extLst>
+              <a:ext uri="{FF2B5EF4-FFF2-40B4-BE49-F238E27FC236}">
+                <a16:creationId xmlns:a16="http://schemas.microsoft.com/office/drawing/2014/main" id="{7DB74C61-D274-6D51-9C96-40ABF878CB98}"/>
+              </a:ext>
+            </a:extLst>
+          </p:cNvPr>
+          <p:cNvSpPr/>
+          <p:nvPr/>
+        </p:nvSpPr>
+        <p:spPr>
+          <a:xfrm>
+            <a:off x="470325" y="1864517"/>
+            <a:ext cx="3226322" cy="378650"/>
+          </a:xfrm>
+          <a:prstGeom prst="rect">
+            <a:avLst/>
+          </a:prstGeom>
+          <a:solidFill>
+            <a:srgbClr val="128CAB"/>
+          </a:solidFill>
+          <a:ln w="6350" cmpd="sng">
+            <a:noFill/>
+          </a:ln>
+          <a:effectLst/>
+        </p:spPr>
+        <p:style>
+          <a:lnRef idx="1">
+            <a:schemeClr val="accent1"/>
+          </a:lnRef>
+          <a:fillRef idx="3">
+            <a:schemeClr val="accent1"/>
+          </a:fillRef>
+          <a:effectRef idx="2">
+            <a:schemeClr val="accent1"/>
+          </a:effectRef>
+          <a:fontRef idx="minor">
+            <a:schemeClr val="lt1"/>
+          </a:fontRef>
+        </p:style>
+        <p:txBody>
+          <a:bodyPr rtlCol="0" anchor="ctr"/>
+          <a:lstStyle/>
+          <a:p>
+            <a:pPr algn="ctr">
+              <a:spcAft>
+                <a:spcPts val="600"/>
+              </a:spcAft>
+            </a:pPr>
+            <a:r>
+              <a:rPr lang="en-US" sz="1200" b="1" dirty="0" err="1">
+                <a:solidFill>
+                  <a:schemeClr val="bg1"/>
+                </a:solidFill>
+                <a:latin typeface="Courier New" panose="02070309020205020404" pitchFamily="49" charset="0"/>
+                <a:cs typeface="Courier New" panose="02070309020205020404" pitchFamily="49" charset="0"/>
+              </a:rPr>
+              <a:t>ARM_FaultRestart</a:t>
+            </a:r>
+            <a:r>
+              <a:rPr lang="en-US" sz="1200" b="1" dirty="0">
+                <a:solidFill>
+                  <a:schemeClr val="bg1"/>
+                </a:solidFill>
+                <a:latin typeface="Courier New" panose="02070309020205020404" pitchFamily="49" charset="0"/>
+                <a:cs typeface="Courier New" panose="02070309020205020404" pitchFamily="49" charset="0"/>
+              </a:rPr>
+              <a:t>()</a:t>
+            </a:r>
+          </a:p>
+        </p:txBody>
+      </p:sp>
+      <p:sp>
+        <p:nvSpPr>
+          <p:cNvPr id="31" name="Rectangle 30">
+            <a:extLst>
+              <a:ext uri="{FF2B5EF4-FFF2-40B4-BE49-F238E27FC236}">
+                <a16:creationId xmlns:a16="http://schemas.microsoft.com/office/drawing/2014/main" id="{9BEB5540-7860-823D-2D3F-3AB8F7A48693}"/>
+              </a:ext>
+            </a:extLst>
+          </p:cNvPr>
+          <p:cNvSpPr/>
+          <p:nvPr/>
+        </p:nvSpPr>
+        <p:spPr>
+          <a:xfrm>
+            <a:off x="470325" y="2538208"/>
+            <a:ext cx="3226322" cy="378650"/>
+          </a:xfrm>
+          <a:prstGeom prst="rect">
+            <a:avLst/>
+          </a:prstGeom>
+          <a:solidFill>
+            <a:schemeClr val="bg1">
+              <a:lumMod val="50000"/>
+            </a:schemeClr>
+          </a:solidFill>
+          <a:ln w="6350" cmpd="sng">
+            <a:noFill/>
+          </a:ln>
+          <a:effectLst/>
+        </p:spPr>
+        <p:style>
+          <a:lnRef idx="1">
+            <a:schemeClr val="accent1"/>
+          </a:lnRef>
+          <a:fillRef idx="3">
+            <a:schemeClr val="accent1"/>
+          </a:fillRef>
+          <a:effectRef idx="2">
+            <a:schemeClr val="accent1"/>
+          </a:effectRef>
+          <a:fontRef idx="minor">
+            <a:schemeClr val="lt1"/>
+          </a:fontRef>
+        </p:style>
+        <p:txBody>
+          <a:bodyPr rtlCol="0" anchor="ctr"/>
+          <a:lstStyle/>
+          <a:p>
+            <a:pPr algn="ctr">
+              <a:spcAft>
+                <a:spcPts val="600"/>
+              </a:spcAft>
+            </a:pPr>
+            <a:r>
+              <a:rPr lang="en-US" sz="1600" b="1" dirty="0">
+                <a:solidFill>
+                  <a:schemeClr val="bg1"/>
+                </a:solidFill>
+              </a:rPr>
+              <a:t>System Restart</a:t>
+            </a:r>
+            <a:endParaRPr lang="en-US" sz="1600" b="1" dirty="0">
+              <a:solidFill>
+                <a:schemeClr val="bg1"/>
+              </a:solidFill>
+              <a:latin typeface="Courier New" panose="02070309020205020404" pitchFamily="49" charset="0"/>
+              <a:cs typeface="Courier New" panose="02070309020205020404" pitchFamily="49" charset="0"/>
+            </a:endParaRPr>
+          </a:p>
+        </p:txBody>
+      </p:sp>
+      <p:cxnSp>
+        <p:nvCxnSpPr>
+          <p:cNvPr id="36" name="Straight Arrow Connector 35">
+            <a:extLst>
+              <a:ext uri="{FF2B5EF4-FFF2-40B4-BE49-F238E27FC236}">
+                <a16:creationId xmlns:a16="http://schemas.microsoft.com/office/drawing/2014/main" id="{838E65CB-EC80-4B76-0B1F-1BA70E1EB824}"/>
+              </a:ext>
+            </a:extLst>
+          </p:cNvPr>
+          <p:cNvCxnSpPr>
+            <a:cxnSpLocks/>
+          </p:cNvCxnSpPr>
+          <p:nvPr/>
+        </p:nvCxnSpPr>
+        <p:spPr>
+          <a:xfrm>
+            <a:off x="2077398" y="1569476"/>
+            <a:ext cx="0" cy="300387"/>
+          </a:xfrm>
+          <a:prstGeom prst="straightConnector1">
+            <a:avLst/>
+          </a:prstGeom>
+          <a:ln w="28575">
+            <a:solidFill>
+              <a:schemeClr val="tx1">
+                <a:lumMod val="65000"/>
+                <a:lumOff val="35000"/>
+              </a:schemeClr>
+            </a:solidFill>
+            <a:tailEnd type="triangle"/>
+          </a:ln>
+        </p:spPr>
+        <p:style>
+          <a:lnRef idx="1">
+            <a:schemeClr val="accent1"/>
+          </a:lnRef>
+          <a:fillRef idx="0">
+            <a:schemeClr val="accent1"/>
+          </a:fillRef>
+          <a:effectRef idx="0">
+            <a:schemeClr val="accent1"/>
+          </a:effectRef>
+          <a:fontRef idx="minor">
+            <a:schemeClr val="tx1"/>
+          </a:fontRef>
+        </p:style>
+      </p:cxnSp>
+      <p:cxnSp>
+        <p:nvCxnSpPr>
+          <p:cNvPr id="37" name="Straight Arrow Connector 36">
+            <a:extLst>
+              <a:ext uri="{FF2B5EF4-FFF2-40B4-BE49-F238E27FC236}">
+                <a16:creationId xmlns:a16="http://schemas.microsoft.com/office/drawing/2014/main" id="{146659F1-89E1-A7D8-F5A7-1B0BB4405463}"/>
+              </a:ext>
+            </a:extLst>
+          </p:cNvPr>
+          <p:cNvCxnSpPr>
+            <a:cxnSpLocks/>
+          </p:cNvCxnSpPr>
+          <p:nvPr/>
+        </p:nvCxnSpPr>
+        <p:spPr>
+          <a:xfrm>
+            <a:off x="2077922" y="2243167"/>
+            <a:ext cx="0" cy="300387"/>
+          </a:xfrm>
+          <a:prstGeom prst="straightConnector1">
+            <a:avLst/>
+          </a:prstGeom>
+          <a:ln w="28575">
+            <a:solidFill>
+              <a:schemeClr val="tx1">
+                <a:lumMod val="65000"/>
+                <a:lumOff val="35000"/>
+              </a:schemeClr>
+            </a:solidFill>
+            <a:tailEnd type="triangle"/>
+          </a:ln>
+        </p:spPr>
+        <p:style>
+          <a:lnRef idx="1">
+            <a:schemeClr val="accent1"/>
+          </a:lnRef>
+          <a:fillRef idx="0">
+            <a:schemeClr val="accent1"/>
+          </a:fillRef>
+          <a:effectRef idx="0">
+            <a:schemeClr val="accent1"/>
+          </a:effectRef>
+          <a:fontRef idx="minor">
+            <a:schemeClr val="tx1"/>
+          </a:fontRef>
+        </p:style>
+      </p:cxnSp>
+      <p:cxnSp>
+        <p:nvCxnSpPr>
+          <p:cNvPr id="39" name="Straight Arrow Connector 38">
+            <a:extLst>
+              <a:ext uri="{FF2B5EF4-FFF2-40B4-BE49-F238E27FC236}">
+                <a16:creationId xmlns:a16="http://schemas.microsoft.com/office/drawing/2014/main" id="{730D394D-6787-A09F-D447-3F0143047109}"/>
+              </a:ext>
+            </a:extLst>
+          </p:cNvPr>
+          <p:cNvCxnSpPr>
+            <a:cxnSpLocks/>
+          </p:cNvCxnSpPr>
+          <p:nvPr/>
+        </p:nvCxnSpPr>
+        <p:spPr>
+          <a:xfrm>
+            <a:off x="2077398" y="2916858"/>
+            <a:ext cx="0" cy="300387"/>
+          </a:xfrm>
+          <a:prstGeom prst="straightConnector1">
+            <a:avLst/>
+          </a:prstGeom>
+          <a:ln w="28575">
+            <a:solidFill>
+              <a:schemeClr val="tx1">
+                <a:lumMod val="65000"/>
+                <a:lumOff val="35000"/>
+              </a:schemeClr>
+            </a:solidFill>
+            <a:tailEnd type="triangle"/>
+          </a:ln>
+        </p:spPr>
+        <p:style>
+          <a:lnRef idx="1">
+            <a:schemeClr val="accent1"/>
+          </a:lnRef>
+          <a:fillRef idx="0">
+            <a:schemeClr val="accent1"/>
+          </a:fillRef>
+          <a:effectRef idx="0">
+            <a:schemeClr val="accent1"/>
+          </a:effectRef>
+          <a:fontRef idx="minor">
+            <a:schemeClr val="tx1"/>
+          </a:fontRef>
+        </p:style>
+      </p:cxnSp>
+      <p:sp>
+        <p:nvSpPr>
+          <p:cNvPr id="41" name="Rectangle 40">
+            <a:extLst>
+              <a:ext uri="{FF2B5EF4-FFF2-40B4-BE49-F238E27FC236}">
+                <a16:creationId xmlns:a16="http://schemas.microsoft.com/office/drawing/2014/main" id="{40563FFA-CBF0-943D-8089-4A771FA3ECA0}"/>
+              </a:ext>
+            </a:extLst>
+          </p:cNvPr>
+          <p:cNvSpPr/>
+          <p:nvPr/>
+        </p:nvSpPr>
+        <p:spPr>
+          <a:xfrm>
+            <a:off x="470325" y="3211308"/>
+            <a:ext cx="3226322" cy="378650"/>
+          </a:xfrm>
+          <a:prstGeom prst="rect">
+            <a:avLst/>
+          </a:prstGeom>
+          <a:solidFill>
+            <a:srgbClr val="128CAB"/>
+          </a:solidFill>
+          <a:ln w="6350" cmpd="sng">
+            <a:noFill/>
+          </a:ln>
+          <a:effectLst/>
+        </p:spPr>
+        <p:style>
+          <a:lnRef idx="1">
+            <a:schemeClr val="accent1"/>
+          </a:lnRef>
+          <a:fillRef idx="3">
+            <a:schemeClr val="accent1"/>
+          </a:fillRef>
+          <a:effectRef idx="2">
+            <a:schemeClr val="accent1"/>
+          </a:effectRef>
+          <a:fontRef idx="minor">
+            <a:schemeClr val="lt1"/>
+          </a:fontRef>
+        </p:style>
+        <p:txBody>
+          <a:bodyPr rtlCol="0" anchor="ctr"/>
+          <a:lstStyle/>
+          <a:p>
+            <a:pPr algn="ctr">
+              <a:spcAft>
+                <a:spcPts val="600"/>
+              </a:spcAft>
+            </a:pPr>
+            <a:r>
+              <a:rPr lang="en-US" sz="1200" b="1" dirty="0" err="1">
+                <a:solidFill>
+                  <a:schemeClr val="bg1"/>
+                </a:solidFill>
+                <a:latin typeface="Courier New" panose="02070309020205020404" pitchFamily="49" charset="0"/>
+                <a:cs typeface="Courier New" panose="02070309020205020404" pitchFamily="49" charset="0"/>
+              </a:rPr>
+              <a:t>EventRecorderInitialize</a:t>
+            </a:r>
+            <a:r>
+              <a:rPr lang="en-US" sz="1200" b="1" dirty="0">
+                <a:solidFill>
+                  <a:schemeClr val="bg1"/>
+                </a:solidFill>
+                <a:latin typeface="Courier New" panose="02070309020205020404" pitchFamily="49" charset="0"/>
+                <a:cs typeface="Courier New" panose="02070309020205020404" pitchFamily="49" charset="0"/>
+              </a:rPr>
+              <a:t>()</a:t>
+            </a:r>
+          </a:p>
+        </p:txBody>
+      </p:sp>
+      <p:sp>
+        <p:nvSpPr>
+          <p:cNvPr id="42" name="Rectangle 41">
+            <a:extLst>
+              <a:ext uri="{FF2B5EF4-FFF2-40B4-BE49-F238E27FC236}">
+                <a16:creationId xmlns:a16="http://schemas.microsoft.com/office/drawing/2014/main" id="{9FB855B7-B3ED-00B1-E5EC-0AF80B1C42AD}"/>
+              </a:ext>
+            </a:extLst>
+          </p:cNvPr>
+          <p:cNvSpPr/>
+          <p:nvPr/>
+        </p:nvSpPr>
+        <p:spPr>
+          <a:xfrm>
+            <a:off x="470325" y="3884408"/>
+            <a:ext cx="3226322" cy="378650"/>
+          </a:xfrm>
+          <a:prstGeom prst="rect">
+            <a:avLst/>
+          </a:prstGeom>
+          <a:solidFill>
+            <a:srgbClr val="128CAB"/>
+          </a:solidFill>
+          <a:ln w="6350" cmpd="sng">
+            <a:noFill/>
+          </a:ln>
+          <a:effectLst/>
+        </p:spPr>
+        <p:style>
+          <a:lnRef idx="1">
+            <a:schemeClr val="accent1"/>
+          </a:lnRef>
+          <a:fillRef idx="3">
+            <a:schemeClr val="accent1"/>
+          </a:fillRef>
+          <a:effectRef idx="2">
+            <a:schemeClr val="accent1"/>
+          </a:effectRef>
+          <a:fontRef idx="minor">
+            <a:schemeClr val="lt1"/>
+          </a:fontRef>
+        </p:style>
+        <p:txBody>
+          <a:bodyPr rtlCol="0" anchor="ctr"/>
+          <a:lstStyle/>
+          <a:p>
+            <a:pPr algn="ctr">
+              <a:spcAft>
+                <a:spcPts val="600"/>
+              </a:spcAft>
+            </a:pPr>
+            <a:r>
+              <a:rPr lang="en-US" sz="1200" b="1" dirty="0" err="1">
+                <a:solidFill>
+                  <a:schemeClr val="bg1"/>
+                </a:solidFill>
+                <a:latin typeface="Courier New" panose="02070309020205020404" pitchFamily="49" charset="0"/>
+                <a:cs typeface="Courier New" panose="02070309020205020404" pitchFamily="49" charset="0"/>
+              </a:rPr>
+              <a:t>ARM_FaultOcurred</a:t>
+            </a:r>
+            <a:r>
+              <a:rPr lang="en-US" sz="1200" b="1" dirty="0">
+                <a:solidFill>
+                  <a:schemeClr val="bg1"/>
+                </a:solidFill>
+                <a:latin typeface="Courier New" panose="02070309020205020404" pitchFamily="49" charset="0"/>
+                <a:cs typeface="Courier New" panose="02070309020205020404" pitchFamily="49" charset="0"/>
+              </a:rPr>
+              <a:t>()</a:t>
+            </a:r>
+          </a:p>
+        </p:txBody>
+      </p:sp>
+      <p:cxnSp>
+        <p:nvCxnSpPr>
+          <p:cNvPr id="43" name="Straight Arrow Connector 42">
+            <a:extLst>
+              <a:ext uri="{FF2B5EF4-FFF2-40B4-BE49-F238E27FC236}">
+                <a16:creationId xmlns:a16="http://schemas.microsoft.com/office/drawing/2014/main" id="{8CD786A5-E1ED-A918-4A5C-01AD4B7BF9C9}"/>
+              </a:ext>
+            </a:extLst>
+          </p:cNvPr>
+          <p:cNvCxnSpPr>
+            <a:cxnSpLocks/>
+          </p:cNvCxnSpPr>
+          <p:nvPr/>
+        </p:nvCxnSpPr>
+        <p:spPr>
+          <a:xfrm>
+            <a:off x="2077398" y="3589958"/>
+            <a:ext cx="0" cy="300387"/>
+          </a:xfrm>
+          <a:prstGeom prst="straightConnector1">
+            <a:avLst/>
+          </a:prstGeom>
+          <a:ln w="28575">
+            <a:solidFill>
+              <a:schemeClr val="tx1">
+                <a:lumMod val="65000"/>
+                <a:lumOff val="35000"/>
+              </a:schemeClr>
+            </a:solidFill>
+            <a:tailEnd type="triangle"/>
+          </a:ln>
+        </p:spPr>
+        <p:style>
+          <a:lnRef idx="1">
+            <a:schemeClr val="accent1"/>
+          </a:lnRef>
+          <a:fillRef idx="0">
+            <a:schemeClr val="accent1"/>
+          </a:fillRef>
+          <a:effectRef idx="0">
+            <a:schemeClr val="accent1"/>
+          </a:effectRef>
+          <a:fontRef idx="minor">
+            <a:schemeClr val="tx1"/>
+          </a:fontRef>
+        </p:style>
+      </p:cxnSp>
+      <p:sp>
+        <p:nvSpPr>
+          <p:cNvPr id="44" name="Rectangle 43">
+            <a:extLst>
+              <a:ext uri="{FF2B5EF4-FFF2-40B4-BE49-F238E27FC236}">
+                <a16:creationId xmlns:a16="http://schemas.microsoft.com/office/drawing/2014/main" id="{1804A18C-11EF-0A6A-929B-5D0C542D81F5}"/>
+              </a:ext>
+            </a:extLst>
+          </p:cNvPr>
+          <p:cNvSpPr/>
+          <p:nvPr/>
+        </p:nvSpPr>
+        <p:spPr>
+          <a:xfrm>
+            <a:off x="1190645" y="4557508"/>
+            <a:ext cx="2506002" cy="378650"/>
+          </a:xfrm>
+          <a:prstGeom prst="rect">
+            <a:avLst/>
+          </a:prstGeom>
+          <a:solidFill>
+            <a:srgbClr val="128CAB"/>
+          </a:solidFill>
+          <a:ln w="6350" cmpd="sng">
+            <a:noFill/>
+          </a:ln>
+          <a:effectLst/>
+        </p:spPr>
+        <p:style>
+          <a:lnRef idx="1">
+            <a:schemeClr val="accent1"/>
+          </a:lnRef>
+          <a:fillRef idx="3">
+            <a:schemeClr val="accent1"/>
+          </a:fillRef>
+          <a:effectRef idx="2">
+            <a:schemeClr val="accent1"/>
+          </a:effectRef>
+          <a:fontRef idx="minor">
+            <a:schemeClr val="lt1"/>
+          </a:fontRef>
+        </p:style>
+        <p:txBody>
+          <a:bodyPr rtlCol="0" anchor="ctr"/>
+          <a:lstStyle/>
+          <a:p>
+            <a:pPr algn="ctr">
+              <a:spcAft>
+                <a:spcPts val="600"/>
+              </a:spcAft>
+            </a:pPr>
+            <a:r>
+              <a:rPr lang="en-US" sz="1200" b="1" dirty="0" err="1">
+                <a:solidFill>
+                  <a:schemeClr val="bg1"/>
+                </a:solidFill>
+                <a:latin typeface="Courier New" panose="02070309020205020404" pitchFamily="49" charset="0"/>
+                <a:cs typeface="Courier New" panose="02070309020205020404" pitchFamily="49" charset="0"/>
+              </a:rPr>
+              <a:t>ARM_FaultRecord</a:t>
+            </a:r>
+            <a:r>
+              <a:rPr lang="en-US" sz="1200" b="1" dirty="0">
+                <a:solidFill>
+                  <a:schemeClr val="bg1"/>
+                </a:solidFill>
+                <a:latin typeface="Courier New" panose="02070309020205020404" pitchFamily="49" charset="0"/>
+                <a:cs typeface="Courier New" panose="02070309020205020404" pitchFamily="49" charset="0"/>
+              </a:rPr>
+              <a:t>()</a:t>
+            </a:r>
+          </a:p>
+        </p:txBody>
+      </p:sp>
+      <p:cxnSp>
+        <p:nvCxnSpPr>
+          <p:cNvPr id="47" name="Straight Arrow Connector 46">
+            <a:extLst>
+              <a:ext uri="{FF2B5EF4-FFF2-40B4-BE49-F238E27FC236}">
+                <a16:creationId xmlns:a16="http://schemas.microsoft.com/office/drawing/2014/main" id="{DB603D5F-3BFE-882F-7CA7-97C98A1CE294}"/>
+              </a:ext>
+            </a:extLst>
+          </p:cNvPr>
+          <p:cNvCxnSpPr>
+            <a:cxnSpLocks/>
+          </p:cNvCxnSpPr>
+          <p:nvPr/>
+        </p:nvCxnSpPr>
+        <p:spPr>
+          <a:xfrm>
+            <a:off x="2421726" y="4263058"/>
+            <a:ext cx="0" cy="300387"/>
+          </a:xfrm>
+          <a:prstGeom prst="straightConnector1">
+            <a:avLst/>
+          </a:prstGeom>
+          <a:ln w="28575">
+            <a:solidFill>
+              <a:schemeClr val="tx1">
+                <a:lumMod val="65000"/>
+                <a:lumOff val="35000"/>
+              </a:schemeClr>
+            </a:solidFill>
+            <a:tailEnd type="triangle"/>
+          </a:ln>
+        </p:spPr>
+        <p:style>
+          <a:lnRef idx="1">
+            <a:schemeClr val="accent1"/>
+          </a:lnRef>
+          <a:fillRef idx="0">
+            <a:schemeClr val="accent1"/>
+          </a:fillRef>
+          <a:effectRef idx="0">
+            <a:schemeClr val="accent1"/>
+          </a:effectRef>
+          <a:fontRef idx="minor">
+            <a:schemeClr val="tx1"/>
+          </a:fontRef>
+        </p:style>
+      </p:cxnSp>
+      <p:sp>
+        <p:nvSpPr>
+          <p:cNvPr id="48" name="Rectangle 47">
+            <a:extLst>
+              <a:ext uri="{FF2B5EF4-FFF2-40B4-BE49-F238E27FC236}">
+                <a16:creationId xmlns:a16="http://schemas.microsoft.com/office/drawing/2014/main" id="{7D64E217-CA0E-5749-144C-AB6FC0E67072}"/>
+              </a:ext>
+            </a:extLst>
+          </p:cNvPr>
+          <p:cNvSpPr/>
+          <p:nvPr/>
+        </p:nvSpPr>
+        <p:spPr>
+          <a:xfrm>
+            <a:off x="1190645" y="5231198"/>
+            <a:ext cx="2506002" cy="378650"/>
+          </a:xfrm>
+          <a:prstGeom prst="rect">
+            <a:avLst/>
+          </a:prstGeom>
+          <a:solidFill>
+            <a:srgbClr val="128CAB"/>
+          </a:solidFill>
+          <a:ln w="6350" cmpd="sng">
+            <a:noFill/>
+          </a:ln>
+          <a:effectLst/>
+        </p:spPr>
+        <p:style>
+          <a:lnRef idx="1">
+            <a:schemeClr val="accent1"/>
+          </a:lnRef>
+          <a:fillRef idx="3">
+            <a:schemeClr val="accent1"/>
+          </a:fillRef>
+          <a:effectRef idx="2">
+            <a:schemeClr val="accent1"/>
+          </a:effectRef>
+          <a:fontRef idx="minor">
+            <a:schemeClr val="lt1"/>
+          </a:fontRef>
+        </p:style>
+        <p:txBody>
+          <a:bodyPr rtlCol="0" anchor="ctr"/>
+          <a:lstStyle/>
+          <a:p>
+            <a:pPr algn="ctr">
+              <a:spcAft>
+                <a:spcPts val="600"/>
+              </a:spcAft>
+            </a:pPr>
+            <a:r>
+              <a:rPr lang="en-US" sz="1200" b="1" dirty="0" err="1">
+                <a:solidFill>
+                  <a:schemeClr val="bg1"/>
+                </a:solidFill>
+                <a:latin typeface="Courier New" panose="02070309020205020404" pitchFamily="49" charset="0"/>
+                <a:cs typeface="Courier New" panose="02070309020205020404" pitchFamily="49" charset="0"/>
+              </a:rPr>
+              <a:t>EventRecorderStop</a:t>
+            </a:r>
+            <a:r>
+              <a:rPr lang="en-US" sz="1200" b="1" dirty="0">
+                <a:solidFill>
+                  <a:schemeClr val="bg1"/>
+                </a:solidFill>
+                <a:latin typeface="Courier New" panose="02070309020205020404" pitchFamily="49" charset="0"/>
+                <a:cs typeface="Courier New" panose="02070309020205020404" pitchFamily="49" charset="0"/>
+              </a:rPr>
+              <a:t>()</a:t>
+            </a:r>
+          </a:p>
+        </p:txBody>
+      </p:sp>
+      <p:cxnSp>
+        <p:nvCxnSpPr>
+          <p:cNvPr id="49" name="Straight Arrow Connector 48">
+            <a:extLst>
+              <a:ext uri="{FF2B5EF4-FFF2-40B4-BE49-F238E27FC236}">
+                <a16:creationId xmlns:a16="http://schemas.microsoft.com/office/drawing/2014/main" id="{C29264C7-2233-868B-86CF-B005817BA4DA}"/>
+              </a:ext>
+            </a:extLst>
+          </p:cNvPr>
+          <p:cNvCxnSpPr>
+            <a:cxnSpLocks/>
+          </p:cNvCxnSpPr>
+          <p:nvPr/>
+        </p:nvCxnSpPr>
+        <p:spPr>
+          <a:xfrm>
+            <a:off x="2421726" y="4930811"/>
+            <a:ext cx="0" cy="300387"/>
+          </a:xfrm>
+          <a:prstGeom prst="straightConnector1">
+            <a:avLst/>
+          </a:prstGeom>
+          <a:ln w="28575">
+            <a:solidFill>
+              <a:schemeClr val="tx1">
+                <a:lumMod val="65000"/>
+                <a:lumOff val="35000"/>
+              </a:schemeClr>
+            </a:solidFill>
+            <a:tailEnd type="triangle"/>
+          </a:ln>
+        </p:spPr>
+        <p:style>
+          <a:lnRef idx="1">
+            <a:schemeClr val="accent1"/>
+          </a:lnRef>
+          <a:fillRef idx="0">
+            <a:schemeClr val="accent1"/>
+          </a:fillRef>
+          <a:effectRef idx="0">
+            <a:schemeClr val="accent1"/>
+          </a:effectRef>
+          <a:fontRef idx="minor">
+            <a:schemeClr val="tx1"/>
+          </a:fontRef>
+        </p:style>
+      </p:cxnSp>
+      <p:sp>
+        <p:nvSpPr>
+          <p:cNvPr id="50" name="TextBox 49">
+            <a:extLst>
+              <a:ext uri="{FF2B5EF4-FFF2-40B4-BE49-F238E27FC236}">
+                <a16:creationId xmlns:a16="http://schemas.microsoft.com/office/drawing/2014/main" id="{06824781-009B-C0A3-5417-4F7DAC7EC3EA}"/>
+              </a:ext>
+            </a:extLst>
+          </p:cNvPr>
+          <p:cNvSpPr txBox="1"/>
+          <p:nvPr/>
+        </p:nvSpPr>
+        <p:spPr>
+          <a:xfrm>
+            <a:off x="2492586" y="4293372"/>
+            <a:ext cx="264159" cy="193899"/>
+          </a:xfrm>
+          <a:prstGeom prst="rect">
+            <a:avLst/>
+          </a:prstGeom>
+          <a:noFill/>
+        </p:spPr>
+        <p:txBody>
+          <a:bodyPr wrap="square" lIns="0" tIns="0" rIns="0" bIns="0" rtlCol="0">
+            <a:spAutoFit/>
+          </a:bodyPr>
+          <a:lstStyle/>
+          <a:p>
+            <a:pPr marL="0" indent="0" algn="l" defTabSz="914400" rtl="0" eaLnBrk="1" latinLnBrk="0" hangingPunct="1">
+              <a:lnSpc>
+                <a:spcPct val="90000"/>
+              </a:lnSpc>
+              <a:spcBef>
+                <a:spcPts val="0"/>
+              </a:spcBef>
+              <a:spcAft>
+                <a:spcPts val="600"/>
+              </a:spcAft>
+              <a:buFont typeface="Arial" panose="020B0604020202020204" pitchFamily="34" charset="0"/>
+              <a:buNone/>
+            </a:pPr>
+            <a:r>
+              <a:rPr lang="en-US" sz="1400" i="1" dirty="0">
+                <a:solidFill>
+                  <a:schemeClr val="tx2"/>
+                </a:solidFill>
+              </a:rPr>
+              <a:t>y</a:t>
+            </a:r>
+            <a:r>
+              <a:rPr lang="en-US" sz="1400" i="1" kern="1200" dirty="0">
+                <a:solidFill>
+                  <a:schemeClr val="tx2"/>
+                </a:solidFill>
+                <a:latin typeface="+mn-lt"/>
+                <a:ea typeface="+mn-ea"/>
+                <a:cs typeface="+mn-cs"/>
+              </a:rPr>
+              <a:t>es</a:t>
+            </a:r>
+          </a:p>
+        </p:txBody>
+      </p:sp>
+      <p:cxnSp>
+        <p:nvCxnSpPr>
+          <p:cNvPr id="51" name="Straight Arrow Connector 50">
+            <a:extLst>
+              <a:ext uri="{FF2B5EF4-FFF2-40B4-BE49-F238E27FC236}">
+                <a16:creationId xmlns:a16="http://schemas.microsoft.com/office/drawing/2014/main" id="{03A1740E-D58A-01CF-4484-4872034290E7}"/>
+              </a:ext>
+            </a:extLst>
+          </p:cNvPr>
+          <p:cNvCxnSpPr>
+            <a:cxnSpLocks/>
+          </p:cNvCxnSpPr>
+          <p:nvPr/>
+        </p:nvCxnSpPr>
+        <p:spPr>
+          <a:xfrm>
+            <a:off x="833380" y="4263058"/>
+            <a:ext cx="0" cy="1647177"/>
+          </a:xfrm>
+          <a:prstGeom prst="straightConnector1">
+            <a:avLst/>
+          </a:prstGeom>
+          <a:ln w="28575">
+            <a:solidFill>
+              <a:schemeClr val="tx1">
+                <a:lumMod val="65000"/>
+                <a:lumOff val="35000"/>
+              </a:schemeClr>
+            </a:solidFill>
+            <a:tailEnd type="triangle"/>
+          </a:ln>
+        </p:spPr>
+        <p:style>
+          <a:lnRef idx="1">
+            <a:schemeClr val="accent1"/>
+          </a:lnRef>
+          <a:fillRef idx="0">
+            <a:schemeClr val="accent1"/>
+          </a:fillRef>
+          <a:effectRef idx="0">
+            <a:schemeClr val="accent1"/>
+          </a:effectRef>
+          <a:fontRef idx="minor">
+            <a:schemeClr val="tx1"/>
+          </a:fontRef>
+        </p:style>
+      </p:cxnSp>
+      <p:sp>
+        <p:nvSpPr>
+          <p:cNvPr id="52" name="TextBox 51">
+            <a:extLst>
+              <a:ext uri="{FF2B5EF4-FFF2-40B4-BE49-F238E27FC236}">
+                <a16:creationId xmlns:a16="http://schemas.microsoft.com/office/drawing/2014/main" id="{9E8FE99E-2119-9376-6C9B-05FB263B6C60}"/>
+              </a:ext>
+            </a:extLst>
+          </p:cNvPr>
+          <p:cNvSpPr txBox="1"/>
+          <p:nvPr/>
+        </p:nvSpPr>
+        <p:spPr>
+          <a:xfrm>
+            <a:off x="916063" y="4316850"/>
+            <a:ext cx="264159" cy="193899"/>
+          </a:xfrm>
+          <a:prstGeom prst="rect">
+            <a:avLst/>
+          </a:prstGeom>
+          <a:noFill/>
+        </p:spPr>
+        <p:txBody>
+          <a:bodyPr wrap="square" lIns="0" tIns="0" rIns="0" bIns="0" rtlCol="0">
+            <a:spAutoFit/>
+          </a:bodyPr>
+          <a:lstStyle/>
+          <a:p>
+            <a:pPr marL="0" indent="0" algn="l" defTabSz="914400" rtl="0" eaLnBrk="1" latinLnBrk="0" hangingPunct="1">
+              <a:lnSpc>
+                <a:spcPct val="90000"/>
+              </a:lnSpc>
+              <a:spcBef>
+                <a:spcPts val="0"/>
+              </a:spcBef>
+              <a:spcAft>
+                <a:spcPts val="600"/>
+              </a:spcAft>
+              <a:buFont typeface="Arial" panose="020B0604020202020204" pitchFamily="34" charset="0"/>
+              <a:buNone/>
+            </a:pPr>
+            <a:r>
+              <a:rPr lang="en-US" sz="1400" i="1" kern="1200" dirty="0">
+                <a:solidFill>
+                  <a:schemeClr val="tx2"/>
+                </a:solidFill>
+                <a:latin typeface="+mn-lt"/>
+                <a:ea typeface="+mn-ea"/>
+                <a:cs typeface="+mn-cs"/>
+              </a:rPr>
+              <a:t>no</a:t>
+            </a:r>
+          </a:p>
+        </p:txBody>
+      </p:sp>
+      <p:cxnSp>
+        <p:nvCxnSpPr>
+          <p:cNvPr id="55" name="Straight Arrow Connector 54">
+            <a:extLst>
+              <a:ext uri="{FF2B5EF4-FFF2-40B4-BE49-F238E27FC236}">
+                <a16:creationId xmlns:a16="http://schemas.microsoft.com/office/drawing/2014/main" id="{FF723D88-7856-8D87-E530-418BFF36AFE3}"/>
+              </a:ext>
+            </a:extLst>
+          </p:cNvPr>
+          <p:cNvCxnSpPr>
+            <a:cxnSpLocks/>
+          </p:cNvCxnSpPr>
+          <p:nvPr/>
+        </p:nvCxnSpPr>
+        <p:spPr>
+          <a:xfrm>
+            <a:off x="2421726" y="5609848"/>
+            <a:ext cx="0" cy="300387"/>
+          </a:xfrm>
+          <a:prstGeom prst="straightConnector1">
+            <a:avLst/>
+          </a:prstGeom>
+          <a:ln w="28575">
+            <a:solidFill>
+              <a:schemeClr val="tx1">
+                <a:lumMod val="65000"/>
+                <a:lumOff val="35000"/>
+              </a:schemeClr>
+            </a:solidFill>
+            <a:tailEnd type="triangle"/>
+          </a:ln>
+        </p:spPr>
+        <p:style>
+          <a:lnRef idx="1">
+            <a:schemeClr val="accent1"/>
+          </a:lnRef>
+          <a:fillRef idx="0">
+            <a:schemeClr val="accent1"/>
+          </a:fillRef>
+          <a:effectRef idx="0">
+            <a:schemeClr val="accent1"/>
+          </a:effectRef>
+          <a:fontRef idx="minor">
+            <a:schemeClr val="tx1"/>
+          </a:fontRef>
+        </p:style>
+      </p:cxnSp>
+      <p:sp>
+        <p:nvSpPr>
+          <p:cNvPr id="58" name="Rectangle 57">
+            <a:extLst>
+              <a:ext uri="{FF2B5EF4-FFF2-40B4-BE49-F238E27FC236}">
+                <a16:creationId xmlns:a16="http://schemas.microsoft.com/office/drawing/2014/main" id="{52072EBA-BF6A-B0E5-01EA-9C1DB3AF239A}"/>
+              </a:ext>
+            </a:extLst>
+          </p:cNvPr>
+          <p:cNvSpPr/>
+          <p:nvPr/>
+        </p:nvSpPr>
+        <p:spPr>
+          <a:xfrm>
+            <a:off x="470325" y="5898951"/>
+            <a:ext cx="3226322" cy="378650"/>
+          </a:xfrm>
+          <a:prstGeom prst="rect">
+            <a:avLst/>
+          </a:prstGeom>
+          <a:solidFill>
+            <a:schemeClr val="bg1">
+              <a:lumMod val="50000"/>
+            </a:schemeClr>
+          </a:solidFill>
+          <a:ln w="6350" cmpd="sng">
+            <a:noFill/>
+          </a:ln>
+          <a:effectLst/>
+        </p:spPr>
+        <p:style>
+          <a:lnRef idx="1">
+            <a:schemeClr val="accent1"/>
+          </a:lnRef>
+          <a:fillRef idx="3">
+            <a:schemeClr val="accent1"/>
+          </a:fillRef>
+          <a:effectRef idx="2">
+            <a:schemeClr val="accent1"/>
+          </a:effectRef>
+          <a:fontRef idx="minor">
+            <a:schemeClr val="lt1"/>
+          </a:fontRef>
+        </p:style>
+        <p:txBody>
+          <a:bodyPr rtlCol="0" anchor="ctr"/>
+          <a:lstStyle/>
+          <a:p>
+            <a:pPr algn="ctr">
+              <a:spcAft>
+                <a:spcPts val="600"/>
+              </a:spcAft>
+            </a:pPr>
+            <a:r>
+              <a:rPr lang="en-US" sz="1600" b="1" dirty="0">
+                <a:solidFill>
+                  <a:schemeClr val="bg1"/>
+                </a:solidFill>
+              </a:rPr>
+              <a:t>Resume Normal Operation</a:t>
+            </a:r>
+            <a:endParaRPr lang="en-US" sz="1600" b="1" dirty="0">
+              <a:solidFill>
+                <a:schemeClr val="bg1"/>
+              </a:solidFill>
+              <a:latin typeface="Courier New" panose="02070309020205020404" pitchFamily="49" charset="0"/>
+              <a:cs typeface="Courier New" panose="02070309020205020404" pitchFamily="49" charset="0"/>
+            </a:endParaRPr>
+          </a:p>
+        </p:txBody>
+      </p:sp>
+      <p:sp>
+        <p:nvSpPr>
+          <p:cNvPr id="59" name="Rectangle 58">
+            <a:extLst>
+              <a:ext uri="{FF2B5EF4-FFF2-40B4-BE49-F238E27FC236}">
+                <a16:creationId xmlns:a16="http://schemas.microsoft.com/office/drawing/2014/main" id="{72596FA2-D580-EAD4-FEDC-D27F42013F89}"/>
+              </a:ext>
+            </a:extLst>
+          </p:cNvPr>
+          <p:cNvSpPr/>
+          <p:nvPr/>
+        </p:nvSpPr>
+        <p:spPr>
+          <a:xfrm>
+            <a:off x="4618723" y="4557508"/>
+            <a:ext cx="2678112" cy="381562"/>
+          </a:xfrm>
+          <a:prstGeom prst="rect">
+            <a:avLst/>
+          </a:prstGeom>
+          <a:solidFill>
+            <a:srgbClr val="00A960"/>
+          </a:solidFill>
+          <a:ln w="6350" cmpd="sng">
+            <a:noFill/>
+          </a:ln>
+          <a:effectLst/>
+        </p:spPr>
+        <p:style>
+          <a:lnRef idx="1">
+            <a:schemeClr val="accent1"/>
+          </a:lnRef>
+          <a:fillRef idx="3">
+            <a:schemeClr val="accent1"/>
+          </a:fillRef>
+          <a:effectRef idx="2">
+            <a:schemeClr val="accent1"/>
+          </a:effectRef>
+          <a:fontRef idx="minor">
+            <a:schemeClr val="lt1"/>
+          </a:fontRef>
+        </p:style>
+        <p:txBody>
+          <a:bodyPr rtlCol="0" anchor="ctr"/>
+          <a:lstStyle/>
+          <a:p>
+            <a:pPr algn="ctr">
+              <a:spcAft>
+                <a:spcPts val="600"/>
+              </a:spcAft>
+            </a:pPr>
+            <a:r>
+              <a:rPr lang="en-US" sz="1200" b="1" dirty="0">
+                <a:solidFill>
+                  <a:schemeClr val="bg1"/>
+                </a:solidFill>
+                <a:latin typeface="Courier New" panose="02070309020205020404" pitchFamily="49" charset="0"/>
+                <a:cs typeface="Courier New" panose="02070309020205020404" pitchFamily="49" charset="0"/>
+              </a:rPr>
+              <a:t>Event Buffer</a:t>
+            </a:r>
+          </a:p>
+        </p:txBody>
+      </p:sp>
+      <p:cxnSp>
+        <p:nvCxnSpPr>
+          <p:cNvPr id="60" name="Straight Arrow Connector 59">
+            <a:extLst>
+              <a:ext uri="{FF2B5EF4-FFF2-40B4-BE49-F238E27FC236}">
+                <a16:creationId xmlns:a16="http://schemas.microsoft.com/office/drawing/2014/main" id="{7DA20012-A8A0-B48F-2DFC-ACA06CC96766}"/>
+              </a:ext>
+            </a:extLst>
+          </p:cNvPr>
+          <p:cNvCxnSpPr>
+            <a:cxnSpLocks/>
+          </p:cNvCxnSpPr>
+          <p:nvPr/>
+        </p:nvCxnSpPr>
+        <p:spPr>
+          <a:xfrm>
+            <a:off x="3696647" y="4748611"/>
+            <a:ext cx="922076" cy="0"/>
+          </a:xfrm>
+          <a:prstGeom prst="straightConnector1">
+            <a:avLst/>
+          </a:prstGeom>
+          <a:ln w="28575">
+            <a:solidFill>
+              <a:schemeClr val="tx1">
+                <a:lumMod val="65000"/>
+                <a:lumOff val="35000"/>
+              </a:schemeClr>
+            </a:solidFill>
+            <a:tailEnd type="triangle"/>
+          </a:ln>
+        </p:spPr>
+        <p:style>
+          <a:lnRef idx="1">
+            <a:schemeClr val="accent1"/>
+          </a:lnRef>
+          <a:fillRef idx="0">
+            <a:schemeClr val="accent1"/>
+          </a:fillRef>
+          <a:effectRef idx="0">
+            <a:schemeClr val="accent1"/>
+          </a:effectRef>
+          <a:fontRef idx="minor">
+            <a:schemeClr val="tx1"/>
+          </a:fontRef>
+        </p:style>
+      </p:cxnSp>
+      <p:sp>
+        <p:nvSpPr>
+          <p:cNvPr id="61" name="TextBox 60">
+            <a:extLst>
+              <a:ext uri="{FF2B5EF4-FFF2-40B4-BE49-F238E27FC236}">
+                <a16:creationId xmlns:a16="http://schemas.microsoft.com/office/drawing/2014/main" id="{D79E28CC-41C9-2EF4-568B-8768D875DA21}"/>
+              </a:ext>
+            </a:extLst>
+          </p:cNvPr>
+          <p:cNvSpPr txBox="1"/>
+          <p:nvPr/>
+        </p:nvSpPr>
+        <p:spPr>
+          <a:xfrm>
+            <a:off x="4653282" y="4988537"/>
+            <a:ext cx="2721501" cy="387798"/>
+          </a:xfrm>
+          <a:prstGeom prst="rect">
+            <a:avLst/>
+          </a:prstGeom>
+          <a:noFill/>
+        </p:spPr>
+        <p:txBody>
+          <a:bodyPr wrap="square" lIns="0" tIns="0" rIns="0" bIns="0" rtlCol="0">
+            <a:spAutoFit/>
+          </a:bodyPr>
+          <a:lstStyle/>
+          <a:p>
+            <a:pPr marL="0" indent="0" algn="l" defTabSz="914400" rtl="0" eaLnBrk="1" latinLnBrk="0" hangingPunct="1">
+              <a:lnSpc>
+                <a:spcPct val="90000"/>
+              </a:lnSpc>
+              <a:spcBef>
+                <a:spcPts val="0"/>
+              </a:spcBef>
+              <a:spcAft>
+                <a:spcPts val="600"/>
+              </a:spcAft>
+              <a:buFont typeface="Arial" panose="020B0604020202020204" pitchFamily="34" charset="0"/>
+              <a:buNone/>
+            </a:pPr>
+            <a:r>
+              <a:rPr lang="en-US" sz="1200" b="1" kern="1200" dirty="0" err="1">
+                <a:solidFill>
+                  <a:schemeClr val="tx2"/>
+                </a:solidFill>
+                <a:latin typeface="Courier New" panose="02070309020205020404" pitchFamily="49" charset="0"/>
+                <a:cs typeface="Courier New" panose="02070309020205020404" pitchFamily="49" charset="0"/>
+              </a:rPr>
+              <a:t>ARM_FaultRecord</a:t>
+            </a:r>
+            <a:r>
+              <a:rPr lang="en-US" sz="1200" b="1" kern="1200" dirty="0">
+                <a:solidFill>
+                  <a:schemeClr val="tx2"/>
+                </a:solidFill>
+                <a:latin typeface="Courier New" panose="02070309020205020404" pitchFamily="49" charset="0"/>
+                <a:cs typeface="Courier New" panose="02070309020205020404" pitchFamily="49" charset="0"/>
+              </a:rPr>
+              <a:t>() </a:t>
+            </a:r>
+            <a:r>
+              <a:rPr lang="en-US" sz="1400" i="1" kern="1200" dirty="0">
+                <a:solidFill>
+                  <a:schemeClr val="tx2"/>
+                </a:solidFill>
+                <a:cs typeface="Courier New" panose="02070309020205020404" pitchFamily="49" charset="0"/>
+              </a:rPr>
+              <a:t>decode fault and store it using the </a:t>
+            </a:r>
+            <a:r>
+              <a:rPr lang="en-US" sz="1400" i="1" kern="1200" dirty="0" err="1">
+                <a:solidFill>
+                  <a:schemeClr val="tx2"/>
+                </a:solidFill>
+                <a:cs typeface="Courier New" panose="02070309020205020404" pitchFamily="49" charset="0"/>
+              </a:rPr>
+              <a:t>EventRecorder</a:t>
+            </a:r>
+            <a:endParaRPr lang="en-US" sz="1400" i="1" kern="1200" dirty="0">
+              <a:solidFill>
+                <a:schemeClr val="tx2"/>
+              </a:solidFill>
+              <a:cs typeface="Courier New" panose="02070309020205020404" pitchFamily="49" charset="0"/>
+            </a:endParaRPr>
+          </a:p>
+        </p:txBody>
+      </p:sp>
+      <p:sp>
+        <p:nvSpPr>
+          <p:cNvPr id="2" name="Arrow: Down 1">
+            <a:extLst>
+              <a:ext uri="{FF2B5EF4-FFF2-40B4-BE49-F238E27FC236}">
+                <a16:creationId xmlns:a16="http://schemas.microsoft.com/office/drawing/2014/main" id="{B6931B58-08DB-7417-B43C-6ACEB58AD7C5}"/>
+              </a:ext>
+            </a:extLst>
+          </p:cNvPr>
+          <p:cNvSpPr/>
+          <p:nvPr/>
+        </p:nvSpPr>
+        <p:spPr>
+          <a:xfrm>
+            <a:off x="5798133" y="1569476"/>
+            <a:ext cx="368300" cy="2988032"/>
+          </a:xfrm>
+          <a:prstGeom prst="downArrow">
+            <a:avLst/>
+          </a:prstGeom>
+          <a:solidFill>
+            <a:schemeClr val="bg2">
+              <a:lumMod val="50000"/>
+            </a:schemeClr>
+          </a:solidFill>
+          <a:ln>
+            <a:noFill/>
+          </a:ln>
+        </p:spPr>
+        <p:style>
+          <a:lnRef idx="2">
+            <a:schemeClr val="accent1">
+              <a:shade val="50000"/>
+            </a:schemeClr>
+          </a:lnRef>
+          <a:fillRef idx="1">
+            <a:schemeClr val="accent1"/>
+          </a:fillRef>
+          <a:effectRef idx="0">
+            <a:schemeClr val="accent1"/>
+          </a:effectRef>
+          <a:fontRef idx="minor">
+            <a:schemeClr val="lt1"/>
+          </a:fontRef>
+        </p:style>
+        <p:txBody>
+          <a:bodyPr rtlCol="0" anchor="ctr"/>
+          <a:lstStyle/>
+          <a:p>
+            <a:pPr algn="ctr"/>
+            <a:endParaRPr lang="en-US"/>
+          </a:p>
+        </p:txBody>
+      </p:sp>
+      <p:sp>
+        <p:nvSpPr>
+          <p:cNvPr id="7" name="Rectangle 6">
+            <a:extLst>
+              <a:ext uri="{FF2B5EF4-FFF2-40B4-BE49-F238E27FC236}">
+                <a16:creationId xmlns:a16="http://schemas.microsoft.com/office/drawing/2014/main" id="{FCAACA31-8076-53B9-2002-6BDEF459BEEE}"/>
+              </a:ext>
+            </a:extLst>
+          </p:cNvPr>
+          <p:cNvSpPr/>
+          <p:nvPr/>
+        </p:nvSpPr>
+        <p:spPr>
+          <a:xfrm>
+            <a:off x="4618723" y="1197016"/>
+            <a:ext cx="2678112" cy="381562"/>
+          </a:xfrm>
+          <a:prstGeom prst="rect">
+            <a:avLst/>
+          </a:prstGeom>
+          <a:solidFill>
+            <a:srgbClr val="00A960"/>
+          </a:solidFill>
+          <a:ln w="6350" cmpd="sng">
+            <a:noFill/>
+          </a:ln>
+          <a:effectLst/>
+        </p:spPr>
+        <p:style>
+          <a:lnRef idx="1">
+            <a:schemeClr val="accent1"/>
+          </a:lnRef>
+          <a:fillRef idx="3">
+            <a:schemeClr val="accent1"/>
+          </a:fillRef>
+          <a:effectRef idx="2">
+            <a:schemeClr val="accent1"/>
+          </a:effectRef>
+          <a:fontRef idx="minor">
+            <a:schemeClr val="lt1"/>
+          </a:fontRef>
+        </p:style>
+        <p:txBody>
+          <a:bodyPr rtlCol="0" anchor="ctr"/>
+          <a:lstStyle/>
+          <a:p>
+            <a:pPr algn="ctr">
+              <a:spcAft>
+                <a:spcPts val="600"/>
+              </a:spcAft>
+            </a:pPr>
+            <a:r>
+              <a:rPr lang="en-US" sz="1200" b="1" dirty="0" err="1">
+                <a:solidFill>
+                  <a:schemeClr val="bg1"/>
+                </a:solidFill>
+                <a:latin typeface="Courier New" panose="02070309020205020404" pitchFamily="49" charset="0"/>
+                <a:cs typeface="Courier New" panose="02070309020205020404" pitchFamily="49" charset="0"/>
+              </a:rPr>
+              <a:t>ARM_FaultStorage</a:t>
+            </a:r>
+            <a:endParaRPr lang="en-US" sz="1200" b="1" dirty="0">
+              <a:solidFill>
+                <a:schemeClr val="bg1"/>
+              </a:solidFill>
+              <a:latin typeface="Courier New" panose="02070309020205020404" pitchFamily="49" charset="0"/>
+              <a:cs typeface="Courier New" panose="02070309020205020404" pitchFamily="49" charset="0"/>
+            </a:endParaRPr>
+          </a:p>
+        </p:txBody>
+      </p:sp>
+    </p:spTree>
+    <p:extLst>
+      <p:ext uri="{BB962C8B-B14F-4D97-AF65-F5344CB8AC3E}">
+        <p14:creationId xmlns:p14="http://schemas.microsoft.com/office/powerpoint/2010/main" val="1858499130"/>
       </p:ext>
     </p:extLst>
   </p:cSld>
@@ -26159,6 +27667,73 @@
 </file>
 
 <file path=customXml/item1.xml><?xml version="1.0" encoding="utf-8"?>
+<?mso-contentType ?>
+<spe:Receivers xmlns:spe="http://schemas.microsoft.com/sharepoint/events">
+  <Receiver>
+    <Name>Document ID Generator</Name>
+    <Synchronization>Synchronous</Synchronization>
+    <Type>10001</Type>
+    <SequenceNumber>1000</SequenceNumber>
+    <Assembly>Microsoft.Office.DocumentManagement, Version=14.0.0.0, Culture=neutral, PublicKeyToken=71e9bce111e9429c</Assembly>
+    <Class>Microsoft.Office.DocumentManagement.Internal.DocIdHandler</Class>
+    <Data/>
+    <Filter/>
+  </Receiver>
+  <Receiver>
+    <Name>Document ID Generator</Name>
+    <Synchronization>Synchronous</Synchronization>
+    <Type>10002</Type>
+    <SequenceNumber>1001</SequenceNumber>
+    <Assembly>Microsoft.Office.DocumentManagement, Version=14.0.0.0, Culture=neutral, PublicKeyToken=71e9bce111e9429c</Assembly>
+    <Class>Microsoft.Office.DocumentManagement.Internal.DocIdHandler</Class>
+    <Data/>
+    <Filter/>
+  </Receiver>
+  <Receiver>
+    <Name>Document ID Generator</Name>
+    <Synchronization>Synchronous</Synchronization>
+    <Type>10004</Type>
+    <SequenceNumber>1002</SequenceNumber>
+    <Assembly>Microsoft.Office.DocumentManagement, Version=14.0.0.0, Culture=neutral, PublicKeyToken=71e9bce111e9429c</Assembly>
+    <Class>Microsoft.Office.DocumentManagement.Internal.DocIdHandler</Class>
+    <Data/>
+    <Filter/>
+  </Receiver>
+  <Receiver>
+    <Name>Document ID Generator</Name>
+    <Synchronization>Synchronous</Synchronization>
+    <Type>10006</Type>
+    <SequenceNumber>1003</SequenceNumber>
+    <Assembly>Microsoft.Office.DocumentManagement, Version=14.0.0.0, Culture=neutral, PublicKeyToken=71e9bce111e9429c</Assembly>
+    <Class>Microsoft.Office.DocumentManagement.Internal.DocIdHandler</Class>
+    <Data/>
+    <Filter/>
+  </Receiver>
+</spe:Receivers>
+</file>
+
+<file path=customXml/item2.xml><?xml version="1.0" encoding="utf-8"?>
+<?mso-contentType ?>
+<FormTemplates xmlns="http://schemas.microsoft.com/sharepoint/v3/contenttype/forms">
+  <Display>DocumentLibraryForm</Display>
+  <Edit>DocumentLibraryForm</Edit>
+  <New>DocumentLibraryForm</New>
+</FormTemplates>
+</file>
+
+<file path=customXml/item3.xml><?xml version="1.0" encoding="utf-8"?>
+<p:properties xmlns:p="http://schemas.microsoft.com/office/2006/metadata/properties" xmlns:xsi="http://www.w3.org/2001/XMLSchema-instance">
+  <documentManagement>
+    <_dlc_DocId xmlns="f2ad5090-61a8-4b8c-ab70-68f4ff4d1933">ARM-ECM-0559802</_dlc_DocId>
+    <_dlc_DocIdUrl xmlns="f2ad5090-61a8-4b8c-ab70-68f4ff4d1933">
+      <Url>http://teamsites.arm.com/sites/commops/_layouts/DocIdRedir.aspx?ID=ARM-ECM-0559802</Url>
+      <Description>ARM-ECM-0559802</Description>
+    </_dlc_DocIdUrl>
+  </documentManagement>
+</p:properties>
+</file>
+
+<file path=customXml/item4.xml><?xml version="1.0" encoding="utf-8"?>
 <ct:contentTypeSchema xmlns:ct="http://schemas.microsoft.com/office/2006/metadata/contentType" xmlns:ma="http://schemas.microsoft.com/office/2006/metadata/properties/metaAttributes" ct:_="" ma:_="" ma:contentTypeName="Document" ma:contentTypeID="0x0101003596DE54BEBB26489934FE71AEF742B7" ma:contentTypeVersion="5" ma:contentTypeDescription="Create a new document." ma:contentTypeScope="" ma:versionID="765b0a3a8b88cdd45245a2aefeebed24">
   <xsd:schema xmlns:xsd="http://www.w3.org/2001/XMLSchema" xmlns:xs="http://www.w3.org/2001/XMLSchema" xmlns:p="http://schemas.microsoft.com/office/2006/metadata/properties" xmlns:ns1="http://schemas.microsoft.com/sharepoint/v3" xmlns:ns2="f2ad5090-61a8-4b8c-ab70-68f4ff4d1933" targetNamespace="http://schemas.microsoft.com/office/2006/metadata/properties" ma:root="true" ma:fieldsID="4a66e8db2a8b512f684c81d8444a49c5" ns1:_="" ns2:_="">
     <xsd:import namespace="http://schemas.microsoft.com/sharepoint/v3"/>
@@ -26314,73 +27889,6 @@
 </ct:contentTypeSchema>
 </file>
 
-<file path=customXml/item2.xml><?xml version="1.0" encoding="utf-8"?>
-<p:properties xmlns:p="http://schemas.microsoft.com/office/2006/metadata/properties" xmlns:xsi="http://www.w3.org/2001/XMLSchema-instance">
-  <documentManagement>
-    <_dlc_DocId xmlns="f2ad5090-61a8-4b8c-ab70-68f4ff4d1933">ARM-ECM-0559802</_dlc_DocId>
-    <_dlc_DocIdUrl xmlns="f2ad5090-61a8-4b8c-ab70-68f4ff4d1933">
-      <Url>http://teamsites.arm.com/sites/commops/_layouts/DocIdRedir.aspx?ID=ARM-ECM-0559802</Url>
-      <Description>ARM-ECM-0559802</Description>
-    </_dlc_DocIdUrl>
-  </documentManagement>
-</p:properties>
-</file>
-
-<file path=customXml/item3.xml><?xml version="1.0" encoding="utf-8"?>
-<?mso-contentType ?>
-<FormTemplates xmlns="http://schemas.microsoft.com/sharepoint/v3/contenttype/forms">
-  <Display>DocumentLibraryForm</Display>
-  <Edit>DocumentLibraryForm</Edit>
-  <New>DocumentLibraryForm</New>
-</FormTemplates>
-</file>
-
-<file path=customXml/item4.xml><?xml version="1.0" encoding="utf-8"?>
-<?mso-contentType ?>
-<spe:Receivers xmlns:spe="http://schemas.microsoft.com/sharepoint/events">
-  <Receiver>
-    <Name>Document ID Generator</Name>
-    <Synchronization>Synchronous</Synchronization>
-    <Type>10001</Type>
-    <SequenceNumber>1000</SequenceNumber>
-    <Assembly>Microsoft.Office.DocumentManagement, Version=14.0.0.0, Culture=neutral, PublicKeyToken=71e9bce111e9429c</Assembly>
-    <Class>Microsoft.Office.DocumentManagement.Internal.DocIdHandler</Class>
-    <Data/>
-    <Filter/>
-  </Receiver>
-  <Receiver>
-    <Name>Document ID Generator</Name>
-    <Synchronization>Synchronous</Synchronization>
-    <Type>10002</Type>
-    <SequenceNumber>1001</SequenceNumber>
-    <Assembly>Microsoft.Office.DocumentManagement, Version=14.0.0.0, Culture=neutral, PublicKeyToken=71e9bce111e9429c</Assembly>
-    <Class>Microsoft.Office.DocumentManagement.Internal.DocIdHandler</Class>
-    <Data/>
-    <Filter/>
-  </Receiver>
-  <Receiver>
-    <Name>Document ID Generator</Name>
-    <Synchronization>Synchronous</Synchronization>
-    <Type>10004</Type>
-    <SequenceNumber>1002</SequenceNumber>
-    <Assembly>Microsoft.Office.DocumentManagement, Version=14.0.0.0, Culture=neutral, PublicKeyToken=71e9bce111e9429c</Assembly>
-    <Class>Microsoft.Office.DocumentManagement.Internal.DocIdHandler</Class>
-    <Data/>
-    <Filter/>
-  </Receiver>
-  <Receiver>
-    <Name>Document ID Generator</Name>
-    <Synchronization>Synchronous</Synchronization>
-    <Type>10006</Type>
-    <SequenceNumber>1003</SequenceNumber>
-    <Assembly>Microsoft.Office.DocumentManagement, Version=14.0.0.0, Culture=neutral, PublicKeyToken=71e9bce111e9429c</Assembly>
-    <Class>Microsoft.Office.DocumentManagement.Internal.DocIdHandler</Class>
-    <Data/>
-    <Filter/>
-  </Receiver>
-</spe:Receivers>
-</file>
-
 <file path=customXml/item5.xml><?xml version="1.0" encoding="utf-8"?>
 <?mso-contentType ?>
 <p:Policy xmlns:p="office.server.policy" id="" local="true">
@@ -26402,6 +27910,39 @@
 </file>
 
 <file path=customXml/itemProps1.xml><?xml version="1.0" encoding="utf-8"?>
+<ds:datastoreItem xmlns:ds="http://schemas.openxmlformats.org/officeDocument/2006/customXml" ds:itemID="{6D3E6A18-9A0A-4E27-8E6B-E388B8915A7F}">
+  <ds:schemaRefs>
+    <ds:schemaRef ds:uri="http://schemas.microsoft.com/sharepoint/events"/>
+  </ds:schemaRefs>
+</ds:datastoreItem>
+</file>
+
+<file path=customXml/itemProps2.xml><?xml version="1.0" encoding="utf-8"?>
+<ds:datastoreItem xmlns:ds="http://schemas.openxmlformats.org/officeDocument/2006/customXml" ds:itemID="{9C777C69-0744-4BF3-8514-FB149EBD2248}">
+  <ds:schemaRefs>
+    <ds:schemaRef ds:uri="http://schemas.microsoft.com/sharepoint/v3/contenttype/forms"/>
+  </ds:schemaRefs>
+</ds:datastoreItem>
+</file>
+
+<file path=customXml/itemProps3.xml><?xml version="1.0" encoding="utf-8"?>
+<ds:datastoreItem xmlns:ds="http://schemas.openxmlformats.org/officeDocument/2006/customXml" ds:itemID="{AE6E82D6-7FB8-4D99-A7B6-3C5BB1D894B9}">
+  <ds:schemaRefs>
+    <ds:schemaRef ds:uri="f2ad5090-61a8-4b8c-ab70-68f4ff4d1933"/>
+    <ds:schemaRef ds:uri="http://schemas.microsoft.com/sharepoint/v3"/>
+    <ds:schemaRef ds:uri="http://schemas.microsoft.com/office/2006/documentManagement/types"/>
+    <ds:schemaRef ds:uri="http://schemas.openxmlformats.org/package/2006/metadata/core-properties"/>
+    <ds:schemaRef ds:uri="http://purl.org/dc/dcmitype/"/>
+    <ds:schemaRef ds:uri="http://schemas.microsoft.com/office/infopath/2007/PartnerControls"/>
+    <ds:schemaRef ds:uri="http://purl.org/dc/elements/1.1/"/>
+    <ds:schemaRef ds:uri="http://schemas.microsoft.com/office/2006/metadata/properties"/>
+    <ds:schemaRef ds:uri="http://www.w3.org/XML/1998/namespace"/>
+    <ds:schemaRef ds:uri="http://purl.org/dc/terms/"/>
+  </ds:schemaRefs>
+</ds:datastoreItem>
+</file>
+
+<file path=customXml/itemProps4.xml><?xml version="1.0" encoding="utf-8"?>
 <ds:datastoreItem xmlns:ds="http://schemas.openxmlformats.org/officeDocument/2006/customXml" ds:itemID="{58CD83C5-EA29-465B-BCA3-9832A53A26C9}">
   <ds:schemaRefs>
     <ds:schemaRef ds:uri="http://schemas.microsoft.com/office/2006/metadata/contentType"/>
@@ -26420,39 +27961,6 @@
 </ds:datastoreItem>
 </file>
 
-<file path=customXml/itemProps2.xml><?xml version="1.0" encoding="utf-8"?>
-<ds:datastoreItem xmlns:ds="http://schemas.openxmlformats.org/officeDocument/2006/customXml" ds:itemID="{AE6E82D6-7FB8-4D99-A7B6-3C5BB1D894B9}">
-  <ds:schemaRefs>
-    <ds:schemaRef ds:uri="f2ad5090-61a8-4b8c-ab70-68f4ff4d1933"/>
-    <ds:schemaRef ds:uri="http://schemas.microsoft.com/sharepoint/v3"/>
-    <ds:schemaRef ds:uri="http://schemas.microsoft.com/office/2006/documentManagement/types"/>
-    <ds:schemaRef ds:uri="http://schemas.openxmlformats.org/package/2006/metadata/core-properties"/>
-    <ds:schemaRef ds:uri="http://purl.org/dc/dcmitype/"/>
-    <ds:schemaRef ds:uri="http://schemas.microsoft.com/office/infopath/2007/PartnerControls"/>
-    <ds:schemaRef ds:uri="http://purl.org/dc/elements/1.1/"/>
-    <ds:schemaRef ds:uri="http://schemas.microsoft.com/office/2006/metadata/properties"/>
-    <ds:schemaRef ds:uri="http://www.w3.org/XML/1998/namespace"/>
-    <ds:schemaRef ds:uri="http://purl.org/dc/terms/"/>
-  </ds:schemaRefs>
-</ds:datastoreItem>
-</file>
-
-<file path=customXml/itemProps3.xml><?xml version="1.0" encoding="utf-8"?>
-<ds:datastoreItem xmlns:ds="http://schemas.openxmlformats.org/officeDocument/2006/customXml" ds:itemID="{9C777C69-0744-4BF3-8514-FB149EBD2248}">
-  <ds:schemaRefs>
-    <ds:schemaRef ds:uri="http://schemas.microsoft.com/sharepoint/v3/contenttype/forms"/>
-  </ds:schemaRefs>
-</ds:datastoreItem>
-</file>
-
-<file path=customXml/itemProps4.xml><?xml version="1.0" encoding="utf-8"?>
-<ds:datastoreItem xmlns:ds="http://schemas.openxmlformats.org/officeDocument/2006/customXml" ds:itemID="{6D3E6A18-9A0A-4E27-8E6B-E388B8915A7F}">
-  <ds:schemaRefs>
-    <ds:schemaRef ds:uri="http://schemas.microsoft.com/sharepoint/events"/>
-  </ds:schemaRefs>
-</ds:datastoreItem>
-</file>
-
 <file path=customXml/itemProps5.xml><?xml version="1.0" encoding="utf-8"?>
 <ds:datastoreItem xmlns:ds="http://schemas.openxmlformats.org/officeDocument/2006/customXml" ds:itemID="{2E15F6D0-803B-49DB-883D-8BBF7D0952E6}">
   <ds:schemaRefs>

</xml_diff>

<commit_message>
Added documentation about Fault Exception Analysis
</commit_message>
<xml_diff>
--- a/Doxygen/src/images/EventRecorder.pptx
+++ b/Doxygen/src/images/EventRecorder.pptx
@@ -6,10 +6,10 @@
     <p:sldMasterId id="2147483775" r:id="rId7"/>
   </p:sldMasterIdLst>
   <p:notesMasterIdLst>
-    <p:notesMasterId r:id="rId14"/>
+    <p:notesMasterId r:id="rId15"/>
   </p:notesMasterIdLst>
   <p:handoutMasterIdLst>
-    <p:handoutMasterId r:id="rId15"/>
+    <p:handoutMasterId r:id="rId16"/>
   </p:handoutMasterIdLst>
   <p:sldIdLst>
     <p:sldId id="340" r:id="rId8"/>
@@ -18,6 +18,7 @@
     <p:sldId id="344" r:id="rId11"/>
     <p:sldId id="265" r:id="rId12"/>
     <p:sldId id="264" r:id="rId13"/>
+    <p:sldId id="345" r:id="rId14"/>
   </p:sldIdLst>
   <p:sldSz cx="12188825" cy="6858000"/>
   <p:notesSz cx="9926638" cy="6797675"/>
@@ -266,7 +267,7 @@
             <a:fld id="{E72D30EF-8F20-0B47-8B5D-39A8BC29E860}" type="datetimeFigureOut">
               <a:rPr lang="en-US" smtClean="0"/>
               <a:pPr/>
-              <a:t>2018-04-13</a:t>
+              <a:t>3/28/2023</a:t>
             </a:fld>
             <a:endParaRPr lang="en-US"/>
           </a:p>
@@ -434,7 +435,7 @@
             <a:fld id="{77EDD36E-1E02-F241-9611-1F1D9EAAD326}" type="datetimeFigureOut">
               <a:rPr lang="en-US" smtClean="0"/>
               <a:pPr/>
-              <a:t>2018-04-13</a:t>
+              <a:t>3/28/2023</a:t>
             </a:fld>
             <a:endParaRPr lang="en-US"/>
           </a:p>
@@ -4700,7 +4701,6 @@
           <a:ln>
             <a:noFill/>
           </a:ln>
-          <a:extLst/>
         </p:spPr>
         <p:txBody>
           <a:bodyPr lIns="0" tIns="0" rIns="0" bIns="0"/>
@@ -4856,7 +4856,6 @@
           <a:ln>
             <a:noFill/>
           </a:ln>
-          <a:extLst/>
         </p:spPr>
         <p:txBody>
           <a:bodyPr lIns="0" tIns="0" rIns="0" bIns="0"/>
@@ -5361,7 +5360,6 @@
           <a:ln>
             <a:noFill/>
           </a:ln>
-          <a:extLst/>
         </p:spPr>
         <p:txBody>
           <a:bodyPr lIns="0" tIns="0" rIns="0" bIns="0">
@@ -5559,9 +5557,7 @@
       </p:pic>
       <p:sp>
         <p:nvSpPr>
-          <p:cNvPr id="21" name="Text Placeholder 28">
-            <a:extLst/>
-          </p:cNvPr>
+          <p:cNvPr id="21" name="Text Placeholder 28"/>
           <p:cNvSpPr>
             <a:spLocks noGrp="1"/>
           </p:cNvSpPr>
@@ -5600,9 +5596,7 @@
       </p:sp>
       <p:sp>
         <p:nvSpPr>
-          <p:cNvPr id="22" name="Text Placeholder 28">
-            <a:extLst/>
-          </p:cNvPr>
+          <p:cNvPr id="22" name="Text Placeholder 28"/>
           <p:cNvSpPr>
             <a:spLocks noGrp="1"/>
           </p:cNvSpPr>
@@ -5641,9 +5635,7 @@
       </p:sp>
       <p:sp>
         <p:nvSpPr>
-          <p:cNvPr id="26" name="Title 1">
-            <a:extLst/>
-          </p:cNvPr>
+          <p:cNvPr id="26" name="Title 1"/>
           <p:cNvSpPr>
             <a:spLocks noGrp="1"/>
           </p:cNvSpPr>
@@ -5718,9 +5710,7 @@
       </p:sp>
       <p:sp>
         <p:nvSpPr>
-          <p:cNvPr id="20" name="Subtitle 2">
-            <a:extLst/>
-          </p:cNvPr>
+          <p:cNvPr id="20" name="Subtitle 2"/>
           <p:cNvSpPr>
             <a:spLocks noGrp="1"/>
           </p:cNvSpPr>
@@ -6000,7 +5990,6 @@
           <a:ln>
             <a:noFill/>
           </a:ln>
-          <a:extLst/>
         </p:spPr>
         <p:txBody>
           <a:bodyPr lIns="0" tIns="0" rIns="0" bIns="0"/>
@@ -6156,7 +6145,6 @@
           <a:ln>
             <a:noFill/>
           </a:ln>
-          <a:extLst/>
         </p:spPr>
         <p:txBody>
           <a:bodyPr lIns="0" tIns="0" rIns="0" bIns="0"/>
@@ -6661,7 +6649,6 @@
           <a:ln>
             <a:noFill/>
           </a:ln>
-          <a:extLst/>
         </p:spPr>
         <p:txBody>
           <a:bodyPr lIns="0" tIns="0" rIns="0" bIns="0">
@@ -6859,9 +6846,7 @@
       </p:pic>
       <p:sp>
         <p:nvSpPr>
-          <p:cNvPr id="21" name="Text Placeholder 28">
-            <a:extLst/>
-          </p:cNvPr>
+          <p:cNvPr id="21" name="Text Placeholder 28"/>
           <p:cNvSpPr>
             <a:spLocks noGrp="1"/>
           </p:cNvSpPr>
@@ -6900,9 +6885,7 @@
       </p:sp>
       <p:sp>
         <p:nvSpPr>
-          <p:cNvPr id="22" name="Text Placeholder 28">
-            <a:extLst/>
-          </p:cNvPr>
+          <p:cNvPr id="22" name="Text Placeholder 28"/>
           <p:cNvSpPr>
             <a:spLocks noGrp="1"/>
           </p:cNvSpPr>
@@ -6941,9 +6924,7 @@
       </p:sp>
       <p:sp>
         <p:nvSpPr>
-          <p:cNvPr id="26" name="Title 1">
-            <a:extLst/>
-          </p:cNvPr>
+          <p:cNvPr id="26" name="Title 1"/>
           <p:cNvSpPr>
             <a:spLocks noGrp="1"/>
           </p:cNvSpPr>
@@ -7018,9 +6999,7 @@
       </p:sp>
       <p:sp>
         <p:nvSpPr>
-          <p:cNvPr id="17" name="Subtitle 2">
-            <a:extLst/>
-          </p:cNvPr>
+          <p:cNvPr id="17" name="Subtitle 2"/>
           <p:cNvSpPr>
             <a:spLocks noGrp="1"/>
           </p:cNvSpPr>
@@ -7300,7 +7279,6 @@
           <a:ln>
             <a:noFill/>
           </a:ln>
-          <a:extLst/>
         </p:spPr>
         <p:txBody>
           <a:bodyPr lIns="0" tIns="0" rIns="0" bIns="0"/>
@@ -7456,7 +7434,6 @@
           <a:ln>
             <a:noFill/>
           </a:ln>
-          <a:extLst/>
         </p:spPr>
         <p:txBody>
           <a:bodyPr lIns="0" tIns="0" rIns="0" bIns="0"/>
@@ -7961,7 +7938,6 @@
           <a:ln>
             <a:noFill/>
           </a:ln>
-          <a:extLst/>
         </p:spPr>
         <p:txBody>
           <a:bodyPr lIns="0" tIns="0" rIns="0" bIns="0">
@@ -8159,9 +8135,7 @@
       </p:pic>
       <p:sp>
         <p:nvSpPr>
-          <p:cNvPr id="21" name="Text Placeholder 28">
-            <a:extLst/>
-          </p:cNvPr>
+          <p:cNvPr id="21" name="Text Placeholder 28"/>
           <p:cNvSpPr>
             <a:spLocks noGrp="1"/>
           </p:cNvSpPr>
@@ -8200,9 +8174,7 @@
       </p:sp>
       <p:sp>
         <p:nvSpPr>
-          <p:cNvPr id="22" name="Text Placeholder 28">
-            <a:extLst/>
-          </p:cNvPr>
+          <p:cNvPr id="22" name="Text Placeholder 28"/>
           <p:cNvSpPr>
             <a:spLocks noGrp="1"/>
           </p:cNvSpPr>
@@ -8241,9 +8213,7 @@
       </p:sp>
       <p:sp>
         <p:nvSpPr>
-          <p:cNvPr id="26" name="Title 1">
-            <a:extLst/>
-          </p:cNvPr>
+          <p:cNvPr id="26" name="Title 1"/>
           <p:cNvSpPr>
             <a:spLocks noGrp="1"/>
           </p:cNvSpPr>
@@ -8318,9 +8288,7 @@
       </p:sp>
       <p:sp>
         <p:nvSpPr>
-          <p:cNvPr id="20" name="Subtitle 2">
-            <a:extLst/>
-          </p:cNvPr>
+          <p:cNvPr id="20" name="Subtitle 2"/>
           <p:cNvSpPr>
             <a:spLocks noGrp="1"/>
           </p:cNvSpPr>
@@ -8486,7 +8454,6 @@
           <a:ln>
             <a:noFill/>
           </a:ln>
-          <a:extLst/>
         </p:spPr>
         <p:txBody>
           <a:bodyPr lIns="0" tIns="0" rIns="0" bIns="0"/>
@@ -8642,7 +8609,6 @@
           <a:ln>
             <a:noFill/>
           </a:ln>
-          <a:extLst/>
         </p:spPr>
         <p:txBody>
           <a:bodyPr lIns="0" tIns="0" rIns="0" bIns="0">
@@ -8840,9 +8806,7 @@
       </p:pic>
       <p:sp>
         <p:nvSpPr>
-          <p:cNvPr id="19" name="Title 1">
-            <a:extLst/>
-          </p:cNvPr>
+          <p:cNvPr id="19" name="Title 1"/>
           <p:cNvSpPr>
             <a:spLocks noGrp="1"/>
           </p:cNvSpPr>
@@ -8881,9 +8845,7 @@
       </p:sp>
       <p:sp>
         <p:nvSpPr>
-          <p:cNvPr id="20" name="Subtitle 2">
-            <a:extLst/>
-          </p:cNvPr>
+          <p:cNvPr id="20" name="Subtitle 2"/>
           <p:cNvSpPr>
             <a:spLocks noGrp="1"/>
           </p:cNvSpPr>
@@ -8986,9 +8948,7 @@
       </p:sp>
       <p:sp>
         <p:nvSpPr>
-          <p:cNvPr id="21" name="Text Placeholder 28">
-            <a:extLst/>
-          </p:cNvPr>
+          <p:cNvPr id="21" name="Text Placeholder 28"/>
           <p:cNvSpPr>
             <a:spLocks noGrp="1"/>
           </p:cNvSpPr>
@@ -9027,9 +8987,7 @@
       </p:sp>
       <p:sp>
         <p:nvSpPr>
-          <p:cNvPr id="22" name="Text Placeholder 28">
-            <a:extLst/>
-          </p:cNvPr>
+          <p:cNvPr id="22" name="Text Placeholder 28"/>
           <p:cNvSpPr>
             <a:spLocks noGrp="1"/>
           </p:cNvSpPr>
@@ -9413,7 +9371,6 @@
           <a:ln>
             <a:noFill/>
           </a:ln>
-          <a:extLst/>
         </p:spPr>
         <p:txBody>
           <a:bodyPr lIns="0" tIns="0" rIns="0" bIns="0">
@@ -9901,7 +9858,6 @@
           <a:ln>
             <a:noFill/>
           </a:ln>
-          <a:extLst/>
         </p:spPr>
         <p:txBody>
           <a:bodyPr lIns="0" tIns="0" rIns="0" bIns="0">
@@ -10387,7 +10343,6 @@
           <a:ln>
             <a:noFill/>
           </a:ln>
-          <a:extLst/>
         </p:spPr>
         <p:txBody>
           <a:bodyPr lIns="0" tIns="0" rIns="0" bIns="0">
@@ -10809,7 +10764,6 @@
           <a:ln>
             <a:noFill/>
           </a:ln>
-          <a:extLst/>
         </p:spPr>
         <p:txBody>
           <a:bodyPr lIns="0" tIns="0" rIns="0" bIns="0">
@@ -11261,9 +11215,7 @@
       </p:grpSpPr>
       <p:sp>
         <p:nvSpPr>
-          <p:cNvPr id="2" name="Title 1">
-            <a:extLst/>
-          </p:cNvPr>
+          <p:cNvPr id="2" name="Title 1"/>
           <p:cNvSpPr>
             <a:spLocks noGrp="1"/>
           </p:cNvSpPr>
@@ -11285,9 +11237,7 @@
       </p:sp>
       <p:sp>
         <p:nvSpPr>
-          <p:cNvPr id="4" name="Text Placeholder 2">
-            <a:extLst/>
-          </p:cNvPr>
+          <p:cNvPr id="4" name="Text Placeholder 2"/>
           <p:cNvSpPr>
             <a:spLocks noGrp="1"/>
           </p:cNvSpPr>
@@ -11644,9 +11594,7 @@
       </p:cxnSp>
       <p:sp>
         <p:nvSpPr>
-          <p:cNvPr id="2" name="Title 1">
-            <a:extLst/>
-          </p:cNvPr>
+          <p:cNvPr id="2" name="Title 1"/>
           <p:cNvSpPr>
             <a:spLocks noGrp="1"/>
           </p:cNvSpPr>
@@ -11668,9 +11616,7 @@
       </p:sp>
       <p:sp>
         <p:nvSpPr>
-          <p:cNvPr id="44" name="Text Placeholder 43">
-            <a:extLst/>
-          </p:cNvPr>
+          <p:cNvPr id="44" name="Text Placeholder 43"/>
           <p:cNvSpPr>
             <a:spLocks noGrp="1"/>
           </p:cNvSpPr>
@@ -11713,9 +11659,7 @@
       </p:sp>
       <p:sp>
         <p:nvSpPr>
-          <p:cNvPr id="9" name="Text Placeholder 131">
-            <a:extLst/>
-          </p:cNvPr>
+          <p:cNvPr id="9" name="Text Placeholder 131"/>
           <p:cNvSpPr>
             <a:spLocks noGrp="1"/>
           </p:cNvSpPr>
@@ -11765,9 +11709,7 @@
       </p:sp>
       <p:sp>
         <p:nvSpPr>
-          <p:cNvPr id="4" name="Content Placeholder 3">
-            <a:extLst/>
-          </p:cNvPr>
+          <p:cNvPr id="4" name="Content Placeholder 3"/>
           <p:cNvSpPr>
             <a:spLocks noGrp="1"/>
           </p:cNvSpPr>
@@ -11857,9 +11799,7 @@
       </p:sp>
       <p:sp>
         <p:nvSpPr>
-          <p:cNvPr id="10" name="Text Placeholder 131">
-            <a:extLst/>
-          </p:cNvPr>
+          <p:cNvPr id="10" name="Text Placeholder 131"/>
           <p:cNvSpPr>
             <a:spLocks noGrp="1"/>
           </p:cNvSpPr>
@@ -11909,9 +11849,7 @@
       </p:sp>
       <p:sp>
         <p:nvSpPr>
-          <p:cNvPr id="8" name="Content Placeholder 7">
-            <a:extLst/>
-          </p:cNvPr>
+          <p:cNvPr id="8" name="Content Placeholder 7"/>
           <p:cNvSpPr>
             <a:spLocks noGrp="1"/>
           </p:cNvSpPr>
@@ -12133,9 +12071,7 @@
       </p:grpSp>
       <p:sp>
         <p:nvSpPr>
-          <p:cNvPr id="2" name="Title 1">
-            <a:extLst/>
-          </p:cNvPr>
+          <p:cNvPr id="2" name="Title 1"/>
           <p:cNvSpPr>
             <a:spLocks noGrp="1"/>
           </p:cNvSpPr>
@@ -12157,9 +12093,7 @@
       </p:sp>
       <p:sp>
         <p:nvSpPr>
-          <p:cNvPr id="44" name="Text Placeholder 43">
-            <a:extLst/>
-          </p:cNvPr>
+          <p:cNvPr id="44" name="Text Placeholder 43"/>
           <p:cNvSpPr>
             <a:spLocks noGrp="1"/>
           </p:cNvSpPr>
@@ -12199,9 +12133,7 @@
       </p:sp>
       <p:sp>
         <p:nvSpPr>
-          <p:cNvPr id="7" name="Text Placeholder 2">
-            <a:extLst/>
-          </p:cNvPr>
+          <p:cNvPr id="7" name="Text Placeholder 2"/>
           <p:cNvSpPr>
             <a:spLocks noGrp="1"/>
           </p:cNvSpPr>
@@ -12272,9 +12204,7 @@
       </p:sp>
       <p:sp>
         <p:nvSpPr>
-          <p:cNvPr id="100" name="Text Placeholder 131">
-            <a:extLst/>
-          </p:cNvPr>
+          <p:cNvPr id="100" name="Text Placeholder 131"/>
           <p:cNvSpPr>
             <a:spLocks noGrp="1"/>
           </p:cNvSpPr>
@@ -12324,9 +12254,7 @@
       </p:sp>
       <p:sp>
         <p:nvSpPr>
-          <p:cNvPr id="13" name="Text Placeholder 2">
-            <a:extLst/>
-          </p:cNvPr>
+          <p:cNvPr id="13" name="Text Placeholder 2"/>
           <p:cNvSpPr>
             <a:spLocks noGrp="1"/>
           </p:cNvSpPr>
@@ -12369,9 +12297,7 @@
       </p:sp>
       <p:sp>
         <p:nvSpPr>
-          <p:cNvPr id="14" name="Text Placeholder 2">
-            <a:extLst/>
-          </p:cNvPr>
+          <p:cNvPr id="14" name="Text Placeholder 2"/>
           <p:cNvSpPr>
             <a:spLocks noGrp="1"/>
           </p:cNvSpPr>
@@ -12421,9 +12347,7 @@
       </p:sp>
       <p:sp>
         <p:nvSpPr>
-          <p:cNvPr id="15" name="Text Placeholder 131">
-            <a:extLst/>
-          </p:cNvPr>
+          <p:cNvPr id="15" name="Text Placeholder 131"/>
           <p:cNvSpPr>
             <a:spLocks noGrp="1"/>
           </p:cNvSpPr>
@@ -12473,9 +12397,7 @@
       </p:sp>
       <p:sp>
         <p:nvSpPr>
-          <p:cNvPr id="16" name="Text Placeholder 131">
-            <a:extLst/>
-          </p:cNvPr>
+          <p:cNvPr id="16" name="Text Placeholder 131"/>
           <p:cNvSpPr>
             <a:spLocks noGrp="1"/>
           </p:cNvSpPr>
@@ -12595,9 +12517,7 @@
       </p:cxnSp>
       <p:sp>
         <p:nvSpPr>
-          <p:cNvPr id="2" name="Title 1">
-            <a:extLst/>
-          </p:cNvPr>
+          <p:cNvPr id="2" name="Title 1"/>
           <p:cNvSpPr>
             <a:spLocks noGrp="1"/>
           </p:cNvSpPr>
@@ -12619,9 +12539,7 @@
       </p:sp>
       <p:sp>
         <p:nvSpPr>
-          <p:cNvPr id="44" name="Text Placeholder 43">
-            <a:extLst/>
-          </p:cNvPr>
+          <p:cNvPr id="44" name="Text Placeholder 43"/>
           <p:cNvSpPr>
             <a:spLocks noGrp="1"/>
           </p:cNvSpPr>
@@ -12661,9 +12579,7 @@
       </p:sp>
       <p:sp>
         <p:nvSpPr>
-          <p:cNvPr id="47" name="Text Placeholder 2">
-            <a:extLst/>
-          </p:cNvPr>
+          <p:cNvPr id="47" name="Text Placeholder 2"/>
           <p:cNvSpPr>
             <a:spLocks noGrp="1"/>
           </p:cNvSpPr>
@@ -12756,9 +12672,7 @@
       </p:sp>
       <p:sp>
         <p:nvSpPr>
-          <p:cNvPr id="18" name="Text Placeholder 2">
-            <a:extLst/>
-          </p:cNvPr>
+          <p:cNvPr id="18" name="Text Placeholder 2"/>
           <p:cNvSpPr>
             <a:spLocks noGrp="1"/>
           </p:cNvSpPr>
@@ -12878,9 +12792,7 @@
       </p:cxnSp>
       <p:sp>
         <p:nvSpPr>
-          <p:cNvPr id="2" name="Title 1">
-            <a:extLst/>
-          </p:cNvPr>
+          <p:cNvPr id="2" name="Title 1"/>
           <p:cNvSpPr>
             <a:spLocks noGrp="1"/>
           </p:cNvSpPr>
@@ -12902,9 +12814,7 @@
       </p:sp>
       <p:sp>
         <p:nvSpPr>
-          <p:cNvPr id="44" name="Text Placeholder 43">
-            <a:extLst/>
-          </p:cNvPr>
+          <p:cNvPr id="44" name="Text Placeholder 43"/>
           <p:cNvSpPr>
             <a:spLocks noGrp="1"/>
           </p:cNvSpPr>
@@ -12944,9 +12854,7 @@
       </p:sp>
       <p:sp>
         <p:nvSpPr>
-          <p:cNvPr id="4" name="Content Placeholder 3">
-            <a:extLst/>
-          </p:cNvPr>
+          <p:cNvPr id="4" name="Content Placeholder 3"/>
           <p:cNvSpPr>
             <a:spLocks noGrp="1"/>
           </p:cNvSpPr>
@@ -13036,9 +12944,7 @@
       </p:sp>
       <p:sp>
         <p:nvSpPr>
-          <p:cNvPr id="6" name="Content Placeholder 5">
-            <a:extLst/>
-          </p:cNvPr>
+          <p:cNvPr id="6" name="Content Placeholder 5"/>
           <p:cNvSpPr>
             <a:spLocks noGrp="1"/>
           </p:cNvSpPr>
@@ -13217,9 +13123,7 @@
       </p:grpSp>
       <p:sp>
         <p:nvSpPr>
-          <p:cNvPr id="2" name="Title 1">
-            <a:extLst/>
-          </p:cNvPr>
+          <p:cNvPr id="2" name="Title 1"/>
           <p:cNvSpPr>
             <a:spLocks noGrp="1"/>
           </p:cNvSpPr>
@@ -13241,9 +13145,7 @@
       </p:sp>
       <p:sp>
         <p:nvSpPr>
-          <p:cNvPr id="44" name="Text Placeholder 43">
-            <a:extLst/>
-          </p:cNvPr>
+          <p:cNvPr id="44" name="Text Placeholder 43"/>
           <p:cNvSpPr>
             <a:spLocks noGrp="1"/>
           </p:cNvSpPr>
@@ -13283,9 +13185,7 @@
       </p:sp>
       <p:sp>
         <p:nvSpPr>
-          <p:cNvPr id="18" name="Text Placeholder 131">
-            <a:extLst/>
-          </p:cNvPr>
+          <p:cNvPr id="18" name="Text Placeholder 131"/>
           <p:cNvSpPr>
             <a:spLocks noGrp="1"/>
           </p:cNvSpPr>
@@ -13335,9 +13235,7 @@
       </p:sp>
       <p:sp>
         <p:nvSpPr>
-          <p:cNvPr id="19" name="Text Placeholder 131">
-            <a:extLst/>
-          </p:cNvPr>
+          <p:cNvPr id="19" name="Text Placeholder 131"/>
           <p:cNvSpPr>
             <a:spLocks noGrp="1"/>
           </p:cNvSpPr>
@@ -13377,9 +13275,7 @@
       </p:sp>
       <p:sp>
         <p:nvSpPr>
-          <p:cNvPr id="20" name="Text Placeholder 131">
-            <a:extLst/>
-          </p:cNvPr>
+          <p:cNvPr id="20" name="Text Placeholder 131"/>
           <p:cNvSpPr>
             <a:spLocks noGrp="1"/>
           </p:cNvSpPr>
@@ -13419,9 +13315,7 @@
       </p:sp>
       <p:sp>
         <p:nvSpPr>
-          <p:cNvPr id="4" name="Content Placeholder 3">
-            <a:extLst/>
-          </p:cNvPr>
+          <p:cNvPr id="4" name="Content Placeholder 3"/>
           <p:cNvSpPr>
             <a:spLocks noGrp="1"/>
           </p:cNvSpPr>
@@ -13482,9 +13376,7 @@
       </p:sp>
       <p:sp>
         <p:nvSpPr>
-          <p:cNvPr id="6" name="Content Placeholder 5">
-            <a:extLst/>
-          </p:cNvPr>
+          <p:cNvPr id="6" name="Content Placeholder 5"/>
           <p:cNvSpPr>
             <a:spLocks noGrp="1"/>
           </p:cNvSpPr>
@@ -13545,9 +13437,7 @@
       </p:sp>
       <p:sp>
         <p:nvSpPr>
-          <p:cNvPr id="9" name="Content Placeholder 8">
-            <a:extLst/>
-          </p:cNvPr>
+          <p:cNvPr id="9" name="Content Placeholder 8"/>
           <p:cNvSpPr>
             <a:spLocks noGrp="1"/>
           </p:cNvSpPr>
@@ -13639,9 +13529,7 @@
       </p:grpSpPr>
       <p:sp>
         <p:nvSpPr>
-          <p:cNvPr id="2" name="Title 1">
-            <a:extLst/>
-          </p:cNvPr>
+          <p:cNvPr id="2" name="Title 1"/>
           <p:cNvSpPr>
             <a:spLocks noGrp="1"/>
           </p:cNvSpPr>
@@ -13663,9 +13551,7 @@
       </p:sp>
       <p:sp>
         <p:nvSpPr>
-          <p:cNvPr id="44" name="Text Placeholder 43">
-            <a:extLst/>
-          </p:cNvPr>
+          <p:cNvPr id="44" name="Text Placeholder 43"/>
           <p:cNvSpPr>
             <a:spLocks noGrp="1"/>
           </p:cNvSpPr>
@@ -13705,9 +13591,7 @@
       </p:sp>
       <p:sp>
         <p:nvSpPr>
-          <p:cNvPr id="6" name="Picture Placeholder 5">
-            <a:extLst/>
-          </p:cNvPr>
+          <p:cNvPr id="6" name="Picture Placeholder 5"/>
           <p:cNvSpPr>
             <a:spLocks noGrp="1"/>
           </p:cNvSpPr>
@@ -13741,9 +13625,7 @@
       </p:sp>
       <p:sp>
         <p:nvSpPr>
-          <p:cNvPr id="104" name="Picture Placeholder 5">
-            <a:extLst/>
-          </p:cNvPr>
+          <p:cNvPr id="104" name="Picture Placeholder 5"/>
           <p:cNvSpPr>
             <a:spLocks noGrp="1"/>
           </p:cNvSpPr>
@@ -13777,9 +13659,7 @@
       </p:sp>
       <p:sp>
         <p:nvSpPr>
-          <p:cNvPr id="105" name="Picture Placeholder 5">
-            <a:extLst/>
-          </p:cNvPr>
+          <p:cNvPr id="105" name="Picture Placeholder 5"/>
           <p:cNvSpPr>
             <a:spLocks noGrp="1"/>
           </p:cNvSpPr>
@@ -13813,9 +13693,7 @@
       </p:sp>
       <p:sp>
         <p:nvSpPr>
-          <p:cNvPr id="106" name="Picture Placeholder 5">
-            <a:extLst/>
-          </p:cNvPr>
+          <p:cNvPr id="106" name="Picture Placeholder 5"/>
           <p:cNvSpPr>
             <a:spLocks noGrp="1"/>
           </p:cNvSpPr>
@@ -13849,9 +13727,7 @@
       </p:sp>
       <p:sp>
         <p:nvSpPr>
-          <p:cNvPr id="14" name="Text Placeholder 7">
-            <a:extLst/>
-          </p:cNvPr>
+          <p:cNvPr id="14" name="Text Placeholder 7"/>
           <p:cNvSpPr>
             <a:spLocks noGrp="1"/>
           </p:cNvSpPr>
@@ -13945,9 +13821,7 @@
       </p:sp>
       <p:sp>
         <p:nvSpPr>
-          <p:cNvPr id="16" name="Text Placeholder 7">
-            <a:extLst/>
-          </p:cNvPr>
+          <p:cNvPr id="16" name="Text Placeholder 7"/>
           <p:cNvSpPr>
             <a:spLocks noGrp="1"/>
           </p:cNvSpPr>
@@ -14068,9 +13942,7 @@
       </p:grpSpPr>
       <p:sp>
         <p:nvSpPr>
-          <p:cNvPr id="2" name="Title 1">
-            <a:extLst/>
-          </p:cNvPr>
+          <p:cNvPr id="2" name="Title 1"/>
           <p:cNvSpPr>
             <a:spLocks noGrp="1"/>
           </p:cNvSpPr>
@@ -14092,9 +13964,7 @@
       </p:sp>
       <p:sp>
         <p:nvSpPr>
-          <p:cNvPr id="44" name="Text Placeholder 43">
-            <a:extLst/>
-          </p:cNvPr>
+          <p:cNvPr id="44" name="Text Placeholder 43"/>
           <p:cNvSpPr>
             <a:spLocks noGrp="1"/>
           </p:cNvSpPr>
@@ -14134,9 +14004,7 @@
       </p:sp>
       <p:sp>
         <p:nvSpPr>
-          <p:cNvPr id="7" name="Text Placeholder 2">
-            <a:extLst/>
-          </p:cNvPr>
+          <p:cNvPr id="7" name="Text Placeholder 2"/>
           <p:cNvSpPr>
             <a:spLocks noGrp="1"/>
           </p:cNvSpPr>
@@ -14200,9 +14068,7 @@
       </p:sp>
       <p:sp>
         <p:nvSpPr>
-          <p:cNvPr id="50" name="Picture Placeholder 5">
-            <a:extLst/>
-          </p:cNvPr>
+          <p:cNvPr id="50" name="Picture Placeholder 5"/>
           <p:cNvSpPr>
             <a:spLocks noGrp="1"/>
           </p:cNvSpPr>
@@ -14267,9 +14133,7 @@
       </p:grpSpPr>
       <p:sp>
         <p:nvSpPr>
-          <p:cNvPr id="2" name="Title 1">
-            <a:extLst/>
-          </p:cNvPr>
+          <p:cNvPr id="2" name="Title 1"/>
           <p:cNvSpPr>
             <a:spLocks noGrp="1"/>
           </p:cNvSpPr>
@@ -14298,9 +14162,7 @@
       </p:sp>
       <p:sp>
         <p:nvSpPr>
-          <p:cNvPr id="10" name="Table Placeholder 3">
-            <a:extLst/>
-          </p:cNvPr>
+          <p:cNvPr id="10" name="Table Placeholder 3"/>
           <p:cNvSpPr>
             <a:spLocks noGrp="1"/>
           </p:cNvSpPr>
@@ -14365,9 +14227,7 @@
       </p:grpSpPr>
       <p:sp>
         <p:nvSpPr>
-          <p:cNvPr id="2" name="Title 1">
-            <a:extLst/>
-          </p:cNvPr>
+          <p:cNvPr id="2" name="Title 1"/>
           <p:cNvSpPr>
             <a:spLocks noGrp="1"/>
           </p:cNvSpPr>
@@ -14389,9 +14249,7 @@
       </p:sp>
       <p:sp>
         <p:nvSpPr>
-          <p:cNvPr id="44" name="Text Placeholder 43">
-            <a:extLst/>
-          </p:cNvPr>
+          <p:cNvPr id="44" name="Text Placeholder 43"/>
           <p:cNvSpPr>
             <a:spLocks noGrp="1"/>
           </p:cNvSpPr>
@@ -14431,9 +14289,7 @@
       </p:sp>
       <p:sp>
         <p:nvSpPr>
-          <p:cNvPr id="7" name="Text Placeholder 2">
-            <a:extLst/>
-          </p:cNvPr>
+          <p:cNvPr id="7" name="Text Placeholder 2"/>
           <p:cNvSpPr>
             <a:spLocks noGrp="1"/>
           </p:cNvSpPr>
@@ -14612,9 +14468,7 @@
       </p:grpSpPr>
       <p:sp>
         <p:nvSpPr>
-          <p:cNvPr id="2" name="Title 1">
-            <a:extLst/>
-          </p:cNvPr>
+          <p:cNvPr id="2" name="Title 1"/>
           <p:cNvSpPr>
             <a:spLocks noGrp="1"/>
           </p:cNvSpPr>
@@ -14954,7 +14808,6 @@
           <a:ln>
             <a:noFill/>
           </a:ln>
-          <a:extLst/>
         </p:spPr>
         <p:txBody>
           <a:bodyPr lIns="0" tIns="0" rIns="0" bIns="0">
@@ -15192,7 +15045,6 @@
           <a:ln>
             <a:noFill/>
           </a:ln>
-          <a:extLst/>
         </p:spPr>
         <p:txBody>
           <a:bodyPr lIns="0" tIns="0" rIns="0" bIns="0">
@@ -15743,7 +15595,6 @@
           <a:ln>
             <a:noFill/>
           </a:ln>
-          <a:extLst/>
         </p:spPr>
         <p:txBody>
           <a:bodyPr lIns="0" tIns="0" rIns="0" bIns="0">
@@ -15944,7 +15795,6 @@
           <a:ln>
             <a:noFill/>
           </a:ln>
-          <a:extLst/>
         </p:spPr>
         <p:txBody>
           <a:bodyPr lIns="0" tIns="0" rIns="0" bIns="0">
@@ -16122,7 +15972,6 @@
           <a:ln>
             <a:noFill/>
           </a:ln>
-          <a:extLst/>
         </p:spPr>
         <p:txBody>
           <a:bodyPr lIns="0" tIns="0" rIns="0" bIns="0">
@@ -16360,7 +16209,6 @@
           <a:ln>
             <a:noFill/>
           </a:ln>
-          <a:extLst/>
         </p:spPr>
         <p:txBody>
           <a:bodyPr lIns="0" tIns="0" rIns="0" bIns="0">
@@ -16987,9 +16835,7 @@
       </p:pic>
       <p:sp>
         <p:nvSpPr>
-          <p:cNvPr id="2" name="Title 1">
-            <a:extLst/>
-          </p:cNvPr>
+          <p:cNvPr id="2" name="Title 1"/>
           <p:cNvSpPr>
             <a:spLocks noGrp="1"/>
           </p:cNvSpPr>
@@ -17020,9 +16866,7 @@
       </p:sp>
       <p:sp>
         <p:nvSpPr>
-          <p:cNvPr id="7" name="Text Placeholder 43">
-            <a:extLst/>
-          </p:cNvPr>
+          <p:cNvPr id="7" name="Text Placeholder 43"/>
           <p:cNvSpPr>
             <a:spLocks noGrp="1"/>
           </p:cNvSpPr>
@@ -17059,9 +16903,7 @@
       </p:sp>
       <p:sp>
         <p:nvSpPr>
-          <p:cNvPr id="8" name="Text Placeholder 2">
-            <a:extLst/>
-          </p:cNvPr>
+          <p:cNvPr id="8" name="Text Placeholder 2"/>
           <p:cNvSpPr>
             <a:spLocks noGrp="1"/>
           </p:cNvSpPr>
@@ -19786,7 +19628,6 @@
           <a:ln>
             <a:noFill/>
           </a:ln>
-          <a:extLst/>
         </p:spPr>
         <p:txBody>
           <a:bodyPr lIns="0" tIns="0" rIns="0" bIns="0">
@@ -19948,7 +19789,6 @@
           <a:ln>
             <a:noFill/>
           </a:ln>
-          <a:extLst/>
         </p:spPr>
         <p:txBody>
           <a:bodyPr lIns="0" tIns="0" rIns="0" bIns="0">
@@ -24773,6 +24613,1691 @@
     <p:extLst>
       <p:ext uri="{BB962C8B-B14F-4D97-AF65-F5344CB8AC3E}">
         <p14:creationId xmlns:p14="http://schemas.microsoft.com/office/powerpoint/2010/main" val="2508251978"/>
+      </p:ext>
+    </p:extLst>
+  </p:cSld>
+  <p:clrMapOvr>
+    <a:masterClrMapping/>
+  </p:clrMapOvr>
+</p:sld>
+</file>
+
+<file path=ppt/slides/slide7.xml><?xml version="1.0" encoding="utf-8"?>
+<p:sld xmlns:a="http://schemas.openxmlformats.org/drawingml/2006/main" xmlns:r="http://schemas.openxmlformats.org/officeDocument/2006/relationships" xmlns:p="http://schemas.openxmlformats.org/presentationml/2006/main">
+  <p:cSld>
+    <p:spTree>
+      <p:nvGrpSpPr>
+        <p:cNvPr id="1" name=""/>
+        <p:cNvGrpSpPr/>
+        <p:nvPr/>
+      </p:nvGrpSpPr>
+      <p:grpSpPr>
+        <a:xfrm>
+          <a:off x="0" y="0"/>
+          <a:ext cx="0" cy="0"/>
+          <a:chOff x="0" y="0"/>
+          <a:chExt cx="0" cy="0"/>
+        </a:xfrm>
+      </p:grpSpPr>
+      <p:sp>
+        <p:nvSpPr>
+          <p:cNvPr id="5" name="Rectangle 4">
+            <a:extLst>
+              <a:ext uri="{FF2B5EF4-FFF2-40B4-BE49-F238E27FC236}">
+                <a16:creationId xmlns:a16="http://schemas.microsoft.com/office/drawing/2014/main" id="{55357FC9-9A32-09E3-3D49-2B944964E476}"/>
+              </a:ext>
+            </a:extLst>
+          </p:cNvPr>
+          <p:cNvSpPr/>
+          <p:nvPr/>
+        </p:nvSpPr>
+        <p:spPr>
+          <a:xfrm>
+            <a:off x="470325" y="517726"/>
+            <a:ext cx="3226322" cy="378650"/>
+          </a:xfrm>
+          <a:prstGeom prst="rect">
+            <a:avLst/>
+          </a:prstGeom>
+          <a:solidFill>
+            <a:schemeClr val="bg1">
+              <a:lumMod val="50000"/>
+            </a:schemeClr>
+          </a:solidFill>
+          <a:ln w="6350" cmpd="sng">
+            <a:noFill/>
+          </a:ln>
+          <a:effectLst/>
+        </p:spPr>
+        <p:style>
+          <a:lnRef idx="1">
+            <a:schemeClr val="accent1"/>
+          </a:lnRef>
+          <a:fillRef idx="3">
+            <a:schemeClr val="accent1"/>
+          </a:fillRef>
+          <a:effectRef idx="2">
+            <a:schemeClr val="accent1"/>
+          </a:effectRef>
+          <a:fontRef idx="minor">
+            <a:schemeClr val="lt1"/>
+          </a:fontRef>
+        </p:style>
+        <p:txBody>
+          <a:bodyPr rtlCol="0" anchor="ctr"/>
+          <a:lstStyle/>
+          <a:p>
+            <a:pPr algn="ctr">
+              <a:spcAft>
+                <a:spcPts val="600"/>
+              </a:spcAft>
+            </a:pPr>
+            <a:r>
+              <a:rPr lang="en-US" sz="1600" b="1" dirty="0">
+                <a:solidFill>
+                  <a:schemeClr val="bg1"/>
+                </a:solidFill>
+              </a:rPr>
+              <a:t>Fault Exception</a:t>
+            </a:r>
+            <a:endParaRPr lang="en-US" sz="1600" b="1" dirty="0">
+              <a:solidFill>
+                <a:schemeClr val="bg1"/>
+              </a:solidFill>
+              <a:latin typeface="Courier New" panose="02070309020205020404" pitchFamily="49" charset="0"/>
+              <a:cs typeface="Courier New" panose="02070309020205020404" pitchFamily="49" charset="0"/>
+            </a:endParaRPr>
+          </a:p>
+        </p:txBody>
+      </p:sp>
+      <p:sp>
+        <p:nvSpPr>
+          <p:cNvPr id="6" name="Rectangle 5">
+            <a:extLst>
+              <a:ext uri="{FF2B5EF4-FFF2-40B4-BE49-F238E27FC236}">
+                <a16:creationId xmlns:a16="http://schemas.microsoft.com/office/drawing/2014/main" id="{669F36A3-B89D-1245-61B1-BC626F74CE96}"/>
+              </a:ext>
+            </a:extLst>
+          </p:cNvPr>
+          <p:cNvSpPr/>
+          <p:nvPr/>
+        </p:nvSpPr>
+        <p:spPr>
+          <a:xfrm>
+            <a:off x="4523213" y="517725"/>
+            <a:ext cx="2869135" cy="5759873"/>
+          </a:xfrm>
+          <a:prstGeom prst="rect">
+            <a:avLst/>
+          </a:prstGeom>
+          <a:solidFill>
+            <a:srgbClr val="00A960">
+              <a:alpha val="40000"/>
+            </a:srgbClr>
+          </a:solidFill>
+          <a:ln w="6350" cmpd="sng">
+            <a:noFill/>
+          </a:ln>
+          <a:effectLst/>
+        </p:spPr>
+        <p:style>
+          <a:lnRef idx="1">
+            <a:schemeClr val="accent1"/>
+          </a:lnRef>
+          <a:fillRef idx="3">
+            <a:schemeClr val="accent1"/>
+          </a:fillRef>
+          <a:effectRef idx="2">
+            <a:schemeClr val="accent1"/>
+          </a:effectRef>
+          <a:fontRef idx="minor">
+            <a:schemeClr val="lt1"/>
+          </a:fontRef>
+        </p:style>
+        <p:txBody>
+          <a:bodyPr rtlCol="0" anchor="t" anchorCtr="0"/>
+          <a:lstStyle/>
+          <a:p>
+            <a:pPr algn="ctr">
+              <a:spcAft>
+                <a:spcPts val="600"/>
+              </a:spcAft>
+            </a:pPr>
+            <a:r>
+              <a:rPr lang="en-US" sz="1800" b="1" dirty="0">
+                <a:solidFill>
+                  <a:schemeClr val="bg1">
+                    <a:lumMod val="50000"/>
+                  </a:schemeClr>
+                </a:solidFill>
+                <a:cs typeface="Courier New" panose="02070309020205020404" pitchFamily="49" charset="0"/>
+              </a:rPr>
+              <a:t>Memory (uninitialized)</a:t>
+            </a:r>
+          </a:p>
+        </p:txBody>
+      </p:sp>
+      <p:sp>
+        <p:nvSpPr>
+          <p:cNvPr id="19" name="Rectangle 18">
+            <a:extLst>
+              <a:ext uri="{FF2B5EF4-FFF2-40B4-BE49-F238E27FC236}">
+                <a16:creationId xmlns:a16="http://schemas.microsoft.com/office/drawing/2014/main" id="{85695119-F823-C8F5-F057-C2CBA16317D8}"/>
+              </a:ext>
+            </a:extLst>
+          </p:cNvPr>
+          <p:cNvSpPr/>
+          <p:nvPr/>
+        </p:nvSpPr>
+        <p:spPr>
+          <a:xfrm>
+            <a:off x="470325" y="1190826"/>
+            <a:ext cx="3226322" cy="378650"/>
+          </a:xfrm>
+          <a:prstGeom prst="rect">
+            <a:avLst/>
+          </a:prstGeom>
+          <a:solidFill>
+            <a:srgbClr val="128CAB"/>
+          </a:solidFill>
+          <a:ln w="6350" cmpd="sng">
+            <a:noFill/>
+          </a:ln>
+          <a:effectLst/>
+        </p:spPr>
+        <p:style>
+          <a:lnRef idx="1">
+            <a:schemeClr val="accent1"/>
+          </a:lnRef>
+          <a:fillRef idx="3">
+            <a:schemeClr val="accent1"/>
+          </a:fillRef>
+          <a:effectRef idx="2">
+            <a:schemeClr val="accent1"/>
+          </a:effectRef>
+          <a:fontRef idx="minor">
+            <a:schemeClr val="lt1"/>
+          </a:fontRef>
+        </p:style>
+        <p:txBody>
+          <a:bodyPr rtlCol="0" anchor="ctr"/>
+          <a:lstStyle/>
+          <a:p>
+            <a:pPr algn="ctr">
+              <a:spcAft>
+                <a:spcPts val="600"/>
+              </a:spcAft>
+            </a:pPr>
+            <a:r>
+              <a:rPr lang="en-US" sz="1200" b="1" dirty="0" err="1">
+                <a:solidFill>
+                  <a:schemeClr val="bg1"/>
+                </a:solidFill>
+                <a:latin typeface="Courier New" panose="02070309020205020404" pitchFamily="49" charset="0"/>
+                <a:cs typeface="Courier New" panose="02070309020205020404" pitchFamily="49" charset="0"/>
+              </a:rPr>
+              <a:t>ARM_FaultSave</a:t>
+            </a:r>
+            <a:r>
+              <a:rPr lang="en-US" sz="1200" b="1" dirty="0">
+                <a:solidFill>
+                  <a:schemeClr val="bg1"/>
+                </a:solidFill>
+                <a:latin typeface="Courier New" panose="02070309020205020404" pitchFamily="49" charset="0"/>
+                <a:cs typeface="Courier New" panose="02070309020205020404" pitchFamily="49" charset="0"/>
+              </a:rPr>
+              <a:t>()</a:t>
+            </a:r>
+          </a:p>
+        </p:txBody>
+      </p:sp>
+      <p:cxnSp>
+        <p:nvCxnSpPr>
+          <p:cNvPr id="21" name="Straight Arrow Connector 20">
+            <a:extLst>
+              <a:ext uri="{FF2B5EF4-FFF2-40B4-BE49-F238E27FC236}">
+                <a16:creationId xmlns:a16="http://schemas.microsoft.com/office/drawing/2014/main" id="{C5CCBE0B-CAC6-2D0F-E78A-5D39846BDF5E}"/>
+              </a:ext>
+            </a:extLst>
+          </p:cNvPr>
+          <p:cNvCxnSpPr>
+            <a:cxnSpLocks/>
+            <a:stCxn id="5" idx="2"/>
+          </p:cNvCxnSpPr>
+          <p:nvPr/>
+        </p:nvCxnSpPr>
+        <p:spPr>
+          <a:xfrm>
+            <a:off x="2083486" y="896376"/>
+            <a:ext cx="0" cy="300387"/>
+          </a:xfrm>
+          <a:prstGeom prst="straightConnector1">
+            <a:avLst/>
+          </a:prstGeom>
+          <a:ln w="28575">
+            <a:solidFill>
+              <a:schemeClr val="tx1">
+                <a:lumMod val="65000"/>
+                <a:lumOff val="35000"/>
+              </a:schemeClr>
+            </a:solidFill>
+            <a:tailEnd type="triangle"/>
+          </a:ln>
+        </p:spPr>
+        <p:style>
+          <a:lnRef idx="1">
+            <a:schemeClr val="accent1"/>
+          </a:lnRef>
+          <a:fillRef idx="0">
+            <a:schemeClr val="accent1"/>
+          </a:fillRef>
+          <a:effectRef idx="0">
+            <a:schemeClr val="accent1"/>
+          </a:effectRef>
+          <a:fontRef idx="minor">
+            <a:schemeClr val="tx1"/>
+          </a:fontRef>
+        </p:style>
+      </p:cxnSp>
+      <p:cxnSp>
+        <p:nvCxnSpPr>
+          <p:cNvPr id="23" name="Straight Arrow Connector 22">
+            <a:extLst>
+              <a:ext uri="{FF2B5EF4-FFF2-40B4-BE49-F238E27FC236}">
+                <a16:creationId xmlns:a16="http://schemas.microsoft.com/office/drawing/2014/main" id="{08D420A0-245A-8C0C-CB01-BD7DDF8B0919}"/>
+              </a:ext>
+            </a:extLst>
+          </p:cNvPr>
+          <p:cNvCxnSpPr>
+            <a:cxnSpLocks/>
+            <a:stCxn id="19" idx="3"/>
+          </p:cNvCxnSpPr>
+          <p:nvPr/>
+        </p:nvCxnSpPr>
+        <p:spPr>
+          <a:xfrm>
+            <a:off x="3696647" y="1380151"/>
+            <a:ext cx="922076" cy="0"/>
+          </a:xfrm>
+          <a:prstGeom prst="straightConnector1">
+            <a:avLst/>
+          </a:prstGeom>
+          <a:ln w="28575">
+            <a:solidFill>
+              <a:schemeClr val="tx1">
+                <a:lumMod val="65000"/>
+                <a:lumOff val="35000"/>
+              </a:schemeClr>
+            </a:solidFill>
+            <a:tailEnd type="triangle"/>
+          </a:ln>
+        </p:spPr>
+        <p:style>
+          <a:lnRef idx="1">
+            <a:schemeClr val="accent1"/>
+          </a:lnRef>
+          <a:fillRef idx="0">
+            <a:schemeClr val="accent1"/>
+          </a:fillRef>
+          <a:effectRef idx="0">
+            <a:schemeClr val="accent1"/>
+          </a:effectRef>
+          <a:fontRef idx="minor">
+            <a:schemeClr val="tx1"/>
+          </a:fontRef>
+        </p:style>
+      </p:cxnSp>
+      <p:sp>
+        <p:nvSpPr>
+          <p:cNvPr id="27" name="Rectangle 26">
+            <a:extLst>
+              <a:ext uri="{FF2B5EF4-FFF2-40B4-BE49-F238E27FC236}">
+                <a16:creationId xmlns:a16="http://schemas.microsoft.com/office/drawing/2014/main" id="{7DB74C61-D274-6D51-9C96-40ABF878CB98}"/>
+              </a:ext>
+            </a:extLst>
+          </p:cNvPr>
+          <p:cNvSpPr/>
+          <p:nvPr/>
+        </p:nvSpPr>
+        <p:spPr>
+          <a:xfrm>
+            <a:off x="470325" y="1864517"/>
+            <a:ext cx="3226322" cy="378650"/>
+          </a:xfrm>
+          <a:prstGeom prst="rect">
+            <a:avLst/>
+          </a:prstGeom>
+          <a:solidFill>
+            <a:srgbClr val="128CAB"/>
+          </a:solidFill>
+          <a:ln w="6350" cmpd="sng">
+            <a:noFill/>
+          </a:ln>
+          <a:effectLst/>
+        </p:spPr>
+        <p:style>
+          <a:lnRef idx="1">
+            <a:schemeClr val="accent1"/>
+          </a:lnRef>
+          <a:fillRef idx="3">
+            <a:schemeClr val="accent1"/>
+          </a:fillRef>
+          <a:effectRef idx="2">
+            <a:schemeClr val="accent1"/>
+          </a:effectRef>
+          <a:fontRef idx="minor">
+            <a:schemeClr val="lt1"/>
+          </a:fontRef>
+        </p:style>
+        <p:txBody>
+          <a:bodyPr rtlCol="0" anchor="ctr"/>
+          <a:lstStyle/>
+          <a:p>
+            <a:pPr algn="ctr">
+              <a:spcAft>
+                <a:spcPts val="600"/>
+              </a:spcAft>
+            </a:pPr>
+            <a:r>
+              <a:rPr lang="en-US" sz="1200" b="1" dirty="0" err="1">
+                <a:solidFill>
+                  <a:schemeClr val="bg1"/>
+                </a:solidFill>
+                <a:latin typeface="Courier New" panose="02070309020205020404" pitchFamily="49" charset="0"/>
+                <a:cs typeface="Courier New" panose="02070309020205020404" pitchFamily="49" charset="0"/>
+              </a:rPr>
+              <a:t>ARM_FaultExit</a:t>
+            </a:r>
+            <a:r>
+              <a:rPr lang="en-US" sz="1200" b="1" dirty="0">
+                <a:solidFill>
+                  <a:schemeClr val="bg1"/>
+                </a:solidFill>
+                <a:latin typeface="Courier New" panose="02070309020205020404" pitchFamily="49" charset="0"/>
+                <a:cs typeface="Courier New" panose="02070309020205020404" pitchFamily="49" charset="0"/>
+              </a:rPr>
+              <a:t>()</a:t>
+            </a:r>
+          </a:p>
+        </p:txBody>
+      </p:sp>
+      <p:sp>
+        <p:nvSpPr>
+          <p:cNvPr id="31" name="Rectangle 30">
+            <a:extLst>
+              <a:ext uri="{FF2B5EF4-FFF2-40B4-BE49-F238E27FC236}">
+                <a16:creationId xmlns:a16="http://schemas.microsoft.com/office/drawing/2014/main" id="{9BEB5540-7860-823D-2D3F-3AB8F7A48693}"/>
+              </a:ext>
+            </a:extLst>
+          </p:cNvPr>
+          <p:cNvSpPr/>
+          <p:nvPr/>
+        </p:nvSpPr>
+        <p:spPr>
+          <a:xfrm>
+            <a:off x="470325" y="2538208"/>
+            <a:ext cx="3226322" cy="378650"/>
+          </a:xfrm>
+          <a:prstGeom prst="rect">
+            <a:avLst/>
+          </a:prstGeom>
+          <a:solidFill>
+            <a:schemeClr val="bg1">
+              <a:lumMod val="50000"/>
+            </a:schemeClr>
+          </a:solidFill>
+          <a:ln w="6350" cmpd="sng">
+            <a:noFill/>
+          </a:ln>
+          <a:effectLst/>
+        </p:spPr>
+        <p:style>
+          <a:lnRef idx="1">
+            <a:schemeClr val="accent1"/>
+          </a:lnRef>
+          <a:fillRef idx="3">
+            <a:schemeClr val="accent1"/>
+          </a:fillRef>
+          <a:effectRef idx="2">
+            <a:schemeClr val="accent1"/>
+          </a:effectRef>
+          <a:fontRef idx="minor">
+            <a:schemeClr val="lt1"/>
+          </a:fontRef>
+        </p:style>
+        <p:txBody>
+          <a:bodyPr rtlCol="0" anchor="ctr"/>
+          <a:lstStyle/>
+          <a:p>
+            <a:pPr algn="ctr">
+              <a:spcAft>
+                <a:spcPts val="600"/>
+              </a:spcAft>
+            </a:pPr>
+            <a:r>
+              <a:rPr lang="en-US" sz="1600" b="1" dirty="0">
+                <a:solidFill>
+                  <a:schemeClr val="bg1"/>
+                </a:solidFill>
+              </a:rPr>
+              <a:t>System Restart</a:t>
+            </a:r>
+            <a:endParaRPr lang="en-US" sz="1600" b="1" dirty="0">
+              <a:solidFill>
+                <a:schemeClr val="bg1"/>
+              </a:solidFill>
+              <a:latin typeface="Courier New" panose="02070309020205020404" pitchFamily="49" charset="0"/>
+              <a:cs typeface="Courier New" panose="02070309020205020404" pitchFamily="49" charset="0"/>
+            </a:endParaRPr>
+          </a:p>
+        </p:txBody>
+      </p:sp>
+      <p:cxnSp>
+        <p:nvCxnSpPr>
+          <p:cNvPr id="36" name="Straight Arrow Connector 35">
+            <a:extLst>
+              <a:ext uri="{FF2B5EF4-FFF2-40B4-BE49-F238E27FC236}">
+                <a16:creationId xmlns:a16="http://schemas.microsoft.com/office/drawing/2014/main" id="{838E65CB-EC80-4B76-0B1F-1BA70E1EB824}"/>
+              </a:ext>
+            </a:extLst>
+          </p:cNvPr>
+          <p:cNvCxnSpPr>
+            <a:cxnSpLocks/>
+          </p:cNvCxnSpPr>
+          <p:nvPr/>
+        </p:nvCxnSpPr>
+        <p:spPr>
+          <a:xfrm>
+            <a:off x="2077398" y="1569476"/>
+            <a:ext cx="0" cy="300387"/>
+          </a:xfrm>
+          <a:prstGeom prst="straightConnector1">
+            <a:avLst/>
+          </a:prstGeom>
+          <a:ln w="28575">
+            <a:solidFill>
+              <a:schemeClr val="tx1">
+                <a:lumMod val="65000"/>
+                <a:lumOff val="35000"/>
+              </a:schemeClr>
+            </a:solidFill>
+            <a:tailEnd type="triangle"/>
+          </a:ln>
+        </p:spPr>
+        <p:style>
+          <a:lnRef idx="1">
+            <a:schemeClr val="accent1"/>
+          </a:lnRef>
+          <a:fillRef idx="0">
+            <a:schemeClr val="accent1"/>
+          </a:fillRef>
+          <a:effectRef idx="0">
+            <a:schemeClr val="accent1"/>
+          </a:effectRef>
+          <a:fontRef idx="minor">
+            <a:schemeClr val="tx1"/>
+          </a:fontRef>
+        </p:style>
+      </p:cxnSp>
+      <p:cxnSp>
+        <p:nvCxnSpPr>
+          <p:cNvPr id="37" name="Straight Arrow Connector 36">
+            <a:extLst>
+              <a:ext uri="{FF2B5EF4-FFF2-40B4-BE49-F238E27FC236}">
+                <a16:creationId xmlns:a16="http://schemas.microsoft.com/office/drawing/2014/main" id="{146659F1-89E1-A7D8-F5A7-1B0BB4405463}"/>
+              </a:ext>
+            </a:extLst>
+          </p:cNvPr>
+          <p:cNvCxnSpPr>
+            <a:cxnSpLocks/>
+          </p:cNvCxnSpPr>
+          <p:nvPr/>
+        </p:nvCxnSpPr>
+        <p:spPr>
+          <a:xfrm>
+            <a:off x="2077922" y="2243167"/>
+            <a:ext cx="0" cy="300387"/>
+          </a:xfrm>
+          <a:prstGeom prst="straightConnector1">
+            <a:avLst/>
+          </a:prstGeom>
+          <a:ln w="28575">
+            <a:solidFill>
+              <a:schemeClr val="tx1">
+                <a:lumMod val="65000"/>
+                <a:lumOff val="35000"/>
+              </a:schemeClr>
+            </a:solidFill>
+            <a:tailEnd type="triangle"/>
+          </a:ln>
+        </p:spPr>
+        <p:style>
+          <a:lnRef idx="1">
+            <a:schemeClr val="accent1"/>
+          </a:lnRef>
+          <a:fillRef idx="0">
+            <a:schemeClr val="accent1"/>
+          </a:fillRef>
+          <a:effectRef idx="0">
+            <a:schemeClr val="accent1"/>
+          </a:effectRef>
+          <a:fontRef idx="minor">
+            <a:schemeClr val="tx1"/>
+          </a:fontRef>
+        </p:style>
+      </p:cxnSp>
+      <p:cxnSp>
+        <p:nvCxnSpPr>
+          <p:cNvPr id="39" name="Straight Arrow Connector 38">
+            <a:extLst>
+              <a:ext uri="{FF2B5EF4-FFF2-40B4-BE49-F238E27FC236}">
+                <a16:creationId xmlns:a16="http://schemas.microsoft.com/office/drawing/2014/main" id="{730D394D-6787-A09F-D447-3F0143047109}"/>
+              </a:ext>
+            </a:extLst>
+          </p:cNvPr>
+          <p:cNvCxnSpPr>
+            <a:cxnSpLocks/>
+          </p:cNvCxnSpPr>
+          <p:nvPr/>
+        </p:nvCxnSpPr>
+        <p:spPr>
+          <a:xfrm>
+            <a:off x="2077398" y="2916858"/>
+            <a:ext cx="0" cy="300387"/>
+          </a:xfrm>
+          <a:prstGeom prst="straightConnector1">
+            <a:avLst/>
+          </a:prstGeom>
+          <a:ln w="28575">
+            <a:solidFill>
+              <a:schemeClr val="tx1">
+                <a:lumMod val="65000"/>
+                <a:lumOff val="35000"/>
+              </a:schemeClr>
+            </a:solidFill>
+            <a:tailEnd type="triangle"/>
+          </a:ln>
+        </p:spPr>
+        <p:style>
+          <a:lnRef idx="1">
+            <a:schemeClr val="accent1"/>
+          </a:lnRef>
+          <a:fillRef idx="0">
+            <a:schemeClr val="accent1"/>
+          </a:fillRef>
+          <a:effectRef idx="0">
+            <a:schemeClr val="accent1"/>
+          </a:effectRef>
+          <a:fontRef idx="minor">
+            <a:schemeClr val="tx1"/>
+          </a:fontRef>
+        </p:style>
+      </p:cxnSp>
+      <p:sp>
+        <p:nvSpPr>
+          <p:cNvPr id="41" name="Rectangle 40">
+            <a:extLst>
+              <a:ext uri="{FF2B5EF4-FFF2-40B4-BE49-F238E27FC236}">
+                <a16:creationId xmlns:a16="http://schemas.microsoft.com/office/drawing/2014/main" id="{40563FFA-CBF0-943D-8089-4A771FA3ECA0}"/>
+              </a:ext>
+            </a:extLst>
+          </p:cNvPr>
+          <p:cNvSpPr/>
+          <p:nvPr/>
+        </p:nvSpPr>
+        <p:spPr>
+          <a:xfrm>
+            <a:off x="470325" y="3211308"/>
+            <a:ext cx="3226322" cy="378650"/>
+          </a:xfrm>
+          <a:prstGeom prst="rect">
+            <a:avLst/>
+          </a:prstGeom>
+          <a:solidFill>
+            <a:srgbClr val="128CAB"/>
+          </a:solidFill>
+          <a:ln w="6350" cmpd="sng">
+            <a:noFill/>
+          </a:ln>
+          <a:effectLst/>
+        </p:spPr>
+        <p:style>
+          <a:lnRef idx="1">
+            <a:schemeClr val="accent1"/>
+          </a:lnRef>
+          <a:fillRef idx="3">
+            <a:schemeClr val="accent1"/>
+          </a:fillRef>
+          <a:effectRef idx="2">
+            <a:schemeClr val="accent1"/>
+          </a:effectRef>
+          <a:fontRef idx="minor">
+            <a:schemeClr val="lt1"/>
+          </a:fontRef>
+        </p:style>
+        <p:txBody>
+          <a:bodyPr rtlCol="0" anchor="ctr"/>
+          <a:lstStyle/>
+          <a:p>
+            <a:pPr algn="ctr">
+              <a:spcAft>
+                <a:spcPts val="600"/>
+              </a:spcAft>
+            </a:pPr>
+            <a:r>
+              <a:rPr lang="en-US" sz="1200" b="1" dirty="0" err="1">
+                <a:solidFill>
+                  <a:schemeClr val="bg1"/>
+                </a:solidFill>
+                <a:latin typeface="Courier New" panose="02070309020205020404" pitchFamily="49" charset="0"/>
+                <a:cs typeface="Courier New" panose="02070309020205020404" pitchFamily="49" charset="0"/>
+              </a:rPr>
+              <a:t>EventRecorderInitialize</a:t>
+            </a:r>
+            <a:r>
+              <a:rPr lang="en-US" sz="1200" b="1" dirty="0">
+                <a:solidFill>
+                  <a:schemeClr val="bg1"/>
+                </a:solidFill>
+                <a:latin typeface="Courier New" panose="02070309020205020404" pitchFamily="49" charset="0"/>
+                <a:cs typeface="Courier New" panose="02070309020205020404" pitchFamily="49" charset="0"/>
+              </a:rPr>
+              <a:t>()</a:t>
+            </a:r>
+          </a:p>
+        </p:txBody>
+      </p:sp>
+      <p:sp>
+        <p:nvSpPr>
+          <p:cNvPr id="42" name="Rectangle 41">
+            <a:extLst>
+              <a:ext uri="{FF2B5EF4-FFF2-40B4-BE49-F238E27FC236}">
+                <a16:creationId xmlns:a16="http://schemas.microsoft.com/office/drawing/2014/main" id="{9FB855B7-B3ED-00B1-E5EC-0AF80B1C42AD}"/>
+              </a:ext>
+            </a:extLst>
+          </p:cNvPr>
+          <p:cNvSpPr/>
+          <p:nvPr/>
+        </p:nvSpPr>
+        <p:spPr>
+          <a:xfrm>
+            <a:off x="470325" y="3884408"/>
+            <a:ext cx="3226322" cy="378650"/>
+          </a:xfrm>
+          <a:prstGeom prst="rect">
+            <a:avLst/>
+          </a:prstGeom>
+          <a:solidFill>
+            <a:srgbClr val="128CAB"/>
+          </a:solidFill>
+          <a:ln w="6350" cmpd="sng">
+            <a:noFill/>
+          </a:ln>
+          <a:effectLst/>
+        </p:spPr>
+        <p:style>
+          <a:lnRef idx="1">
+            <a:schemeClr val="accent1"/>
+          </a:lnRef>
+          <a:fillRef idx="3">
+            <a:schemeClr val="accent1"/>
+          </a:fillRef>
+          <a:effectRef idx="2">
+            <a:schemeClr val="accent1"/>
+          </a:effectRef>
+          <a:fontRef idx="minor">
+            <a:schemeClr val="lt1"/>
+          </a:fontRef>
+        </p:style>
+        <p:txBody>
+          <a:bodyPr rtlCol="0" anchor="ctr"/>
+          <a:lstStyle/>
+          <a:p>
+            <a:pPr algn="ctr">
+              <a:spcAft>
+                <a:spcPts val="600"/>
+              </a:spcAft>
+            </a:pPr>
+            <a:r>
+              <a:rPr lang="en-US" sz="1200" b="1" dirty="0" err="1">
+                <a:solidFill>
+                  <a:schemeClr val="bg1"/>
+                </a:solidFill>
+                <a:latin typeface="Courier New" panose="02070309020205020404" pitchFamily="49" charset="0"/>
+                <a:cs typeface="Courier New" panose="02070309020205020404" pitchFamily="49" charset="0"/>
+              </a:rPr>
+              <a:t>ARM</a:t>
+            </a:r>
+            <a:r>
+              <a:rPr lang="en-US" sz="1200" b="1" err="1">
+                <a:solidFill>
+                  <a:schemeClr val="bg1"/>
+                </a:solidFill>
+                <a:latin typeface="Courier New" panose="02070309020205020404" pitchFamily="49" charset="0"/>
+                <a:cs typeface="Courier New" panose="02070309020205020404" pitchFamily="49" charset="0"/>
+              </a:rPr>
+              <a:t>_</a:t>
+            </a:r>
+            <a:r>
+              <a:rPr lang="en-US" sz="1200" b="1">
+                <a:solidFill>
+                  <a:schemeClr val="bg1"/>
+                </a:solidFill>
+                <a:latin typeface="Courier New" panose="02070309020205020404" pitchFamily="49" charset="0"/>
+                <a:cs typeface="Courier New" panose="02070309020205020404" pitchFamily="49" charset="0"/>
+              </a:rPr>
+              <a:t>FaultOccured()</a:t>
+            </a:r>
+            <a:endParaRPr lang="en-US" sz="1200" b="1" dirty="0">
+              <a:solidFill>
+                <a:schemeClr val="bg1"/>
+              </a:solidFill>
+              <a:latin typeface="Courier New" panose="02070309020205020404" pitchFamily="49" charset="0"/>
+              <a:cs typeface="Courier New" panose="02070309020205020404" pitchFamily="49" charset="0"/>
+            </a:endParaRPr>
+          </a:p>
+        </p:txBody>
+      </p:sp>
+      <p:cxnSp>
+        <p:nvCxnSpPr>
+          <p:cNvPr id="43" name="Straight Arrow Connector 42">
+            <a:extLst>
+              <a:ext uri="{FF2B5EF4-FFF2-40B4-BE49-F238E27FC236}">
+                <a16:creationId xmlns:a16="http://schemas.microsoft.com/office/drawing/2014/main" id="{8CD786A5-E1ED-A918-4A5C-01AD4B7BF9C9}"/>
+              </a:ext>
+            </a:extLst>
+          </p:cNvPr>
+          <p:cNvCxnSpPr>
+            <a:cxnSpLocks/>
+          </p:cNvCxnSpPr>
+          <p:nvPr/>
+        </p:nvCxnSpPr>
+        <p:spPr>
+          <a:xfrm>
+            <a:off x="2077398" y="3589958"/>
+            <a:ext cx="0" cy="300387"/>
+          </a:xfrm>
+          <a:prstGeom prst="straightConnector1">
+            <a:avLst/>
+          </a:prstGeom>
+          <a:ln w="28575">
+            <a:solidFill>
+              <a:schemeClr val="tx1">
+                <a:lumMod val="65000"/>
+                <a:lumOff val="35000"/>
+              </a:schemeClr>
+            </a:solidFill>
+            <a:tailEnd type="triangle"/>
+          </a:ln>
+        </p:spPr>
+        <p:style>
+          <a:lnRef idx="1">
+            <a:schemeClr val="accent1"/>
+          </a:lnRef>
+          <a:fillRef idx="0">
+            <a:schemeClr val="accent1"/>
+          </a:fillRef>
+          <a:effectRef idx="0">
+            <a:schemeClr val="accent1"/>
+          </a:effectRef>
+          <a:fontRef idx="minor">
+            <a:schemeClr val="tx1"/>
+          </a:fontRef>
+        </p:style>
+      </p:cxnSp>
+      <p:sp>
+        <p:nvSpPr>
+          <p:cNvPr id="44" name="Rectangle 43">
+            <a:extLst>
+              <a:ext uri="{FF2B5EF4-FFF2-40B4-BE49-F238E27FC236}">
+                <a16:creationId xmlns:a16="http://schemas.microsoft.com/office/drawing/2014/main" id="{1804A18C-11EF-0A6A-929B-5D0C542D81F5}"/>
+              </a:ext>
+            </a:extLst>
+          </p:cNvPr>
+          <p:cNvSpPr/>
+          <p:nvPr/>
+        </p:nvSpPr>
+        <p:spPr>
+          <a:xfrm>
+            <a:off x="1190645" y="4557508"/>
+            <a:ext cx="2506002" cy="378650"/>
+          </a:xfrm>
+          <a:prstGeom prst="rect">
+            <a:avLst/>
+          </a:prstGeom>
+          <a:solidFill>
+            <a:srgbClr val="128CAB"/>
+          </a:solidFill>
+          <a:ln w="6350" cmpd="sng">
+            <a:noFill/>
+          </a:ln>
+          <a:effectLst/>
+        </p:spPr>
+        <p:style>
+          <a:lnRef idx="1">
+            <a:schemeClr val="accent1"/>
+          </a:lnRef>
+          <a:fillRef idx="3">
+            <a:schemeClr val="accent1"/>
+          </a:fillRef>
+          <a:effectRef idx="2">
+            <a:schemeClr val="accent1"/>
+          </a:effectRef>
+          <a:fontRef idx="minor">
+            <a:schemeClr val="lt1"/>
+          </a:fontRef>
+        </p:style>
+        <p:txBody>
+          <a:bodyPr rtlCol="0" anchor="ctr"/>
+          <a:lstStyle/>
+          <a:p>
+            <a:pPr algn="ctr">
+              <a:spcAft>
+                <a:spcPts val="600"/>
+              </a:spcAft>
+            </a:pPr>
+            <a:r>
+              <a:rPr lang="en-US" sz="1200" b="1" dirty="0" err="1">
+                <a:solidFill>
+                  <a:schemeClr val="bg1"/>
+                </a:solidFill>
+                <a:latin typeface="Courier New" panose="02070309020205020404" pitchFamily="49" charset="0"/>
+                <a:cs typeface="Courier New" panose="02070309020205020404" pitchFamily="49" charset="0"/>
+              </a:rPr>
+              <a:t>ARM_FaultRecord</a:t>
+            </a:r>
+            <a:r>
+              <a:rPr lang="en-US" sz="1200" b="1" dirty="0">
+                <a:solidFill>
+                  <a:schemeClr val="bg1"/>
+                </a:solidFill>
+                <a:latin typeface="Courier New" panose="02070309020205020404" pitchFamily="49" charset="0"/>
+                <a:cs typeface="Courier New" panose="02070309020205020404" pitchFamily="49" charset="0"/>
+              </a:rPr>
+              <a:t>()</a:t>
+            </a:r>
+          </a:p>
+        </p:txBody>
+      </p:sp>
+      <p:cxnSp>
+        <p:nvCxnSpPr>
+          <p:cNvPr id="47" name="Straight Arrow Connector 46">
+            <a:extLst>
+              <a:ext uri="{FF2B5EF4-FFF2-40B4-BE49-F238E27FC236}">
+                <a16:creationId xmlns:a16="http://schemas.microsoft.com/office/drawing/2014/main" id="{DB603D5F-3BFE-882F-7CA7-97C98A1CE294}"/>
+              </a:ext>
+            </a:extLst>
+          </p:cNvPr>
+          <p:cNvCxnSpPr>
+            <a:cxnSpLocks/>
+          </p:cNvCxnSpPr>
+          <p:nvPr/>
+        </p:nvCxnSpPr>
+        <p:spPr>
+          <a:xfrm>
+            <a:off x="2421726" y="4263058"/>
+            <a:ext cx="0" cy="300387"/>
+          </a:xfrm>
+          <a:prstGeom prst="straightConnector1">
+            <a:avLst/>
+          </a:prstGeom>
+          <a:ln w="28575">
+            <a:solidFill>
+              <a:schemeClr val="tx1">
+                <a:lumMod val="65000"/>
+                <a:lumOff val="35000"/>
+              </a:schemeClr>
+            </a:solidFill>
+            <a:tailEnd type="triangle"/>
+          </a:ln>
+        </p:spPr>
+        <p:style>
+          <a:lnRef idx="1">
+            <a:schemeClr val="accent1"/>
+          </a:lnRef>
+          <a:fillRef idx="0">
+            <a:schemeClr val="accent1"/>
+          </a:fillRef>
+          <a:effectRef idx="0">
+            <a:schemeClr val="accent1"/>
+          </a:effectRef>
+          <a:fontRef idx="minor">
+            <a:schemeClr val="tx1"/>
+          </a:fontRef>
+        </p:style>
+      </p:cxnSp>
+      <p:sp>
+        <p:nvSpPr>
+          <p:cNvPr id="48" name="Rectangle 47">
+            <a:extLst>
+              <a:ext uri="{FF2B5EF4-FFF2-40B4-BE49-F238E27FC236}">
+                <a16:creationId xmlns:a16="http://schemas.microsoft.com/office/drawing/2014/main" id="{7D64E217-CA0E-5749-144C-AB6FC0E67072}"/>
+              </a:ext>
+            </a:extLst>
+          </p:cNvPr>
+          <p:cNvSpPr/>
+          <p:nvPr/>
+        </p:nvSpPr>
+        <p:spPr>
+          <a:xfrm>
+            <a:off x="1190645" y="5231198"/>
+            <a:ext cx="2506002" cy="378650"/>
+          </a:xfrm>
+          <a:prstGeom prst="rect">
+            <a:avLst/>
+          </a:prstGeom>
+          <a:solidFill>
+            <a:srgbClr val="128CAB"/>
+          </a:solidFill>
+          <a:ln w="6350" cmpd="sng">
+            <a:noFill/>
+          </a:ln>
+          <a:effectLst/>
+        </p:spPr>
+        <p:style>
+          <a:lnRef idx="1">
+            <a:schemeClr val="accent1"/>
+          </a:lnRef>
+          <a:fillRef idx="3">
+            <a:schemeClr val="accent1"/>
+          </a:fillRef>
+          <a:effectRef idx="2">
+            <a:schemeClr val="accent1"/>
+          </a:effectRef>
+          <a:fontRef idx="minor">
+            <a:schemeClr val="lt1"/>
+          </a:fontRef>
+        </p:style>
+        <p:txBody>
+          <a:bodyPr rtlCol="0" anchor="ctr"/>
+          <a:lstStyle/>
+          <a:p>
+            <a:pPr algn="ctr">
+              <a:spcAft>
+                <a:spcPts val="600"/>
+              </a:spcAft>
+            </a:pPr>
+            <a:r>
+              <a:rPr lang="en-US" sz="1200" b="1" dirty="0" err="1">
+                <a:solidFill>
+                  <a:schemeClr val="bg1"/>
+                </a:solidFill>
+                <a:latin typeface="Courier New" panose="02070309020205020404" pitchFamily="49" charset="0"/>
+                <a:cs typeface="Courier New" panose="02070309020205020404" pitchFamily="49" charset="0"/>
+              </a:rPr>
+              <a:t>EventRecorderStop</a:t>
+            </a:r>
+            <a:r>
+              <a:rPr lang="en-US" sz="1200" b="1" dirty="0">
+                <a:solidFill>
+                  <a:schemeClr val="bg1"/>
+                </a:solidFill>
+                <a:latin typeface="Courier New" panose="02070309020205020404" pitchFamily="49" charset="0"/>
+                <a:cs typeface="Courier New" panose="02070309020205020404" pitchFamily="49" charset="0"/>
+              </a:rPr>
+              <a:t>()</a:t>
+            </a:r>
+          </a:p>
+        </p:txBody>
+      </p:sp>
+      <p:cxnSp>
+        <p:nvCxnSpPr>
+          <p:cNvPr id="49" name="Straight Arrow Connector 48">
+            <a:extLst>
+              <a:ext uri="{FF2B5EF4-FFF2-40B4-BE49-F238E27FC236}">
+                <a16:creationId xmlns:a16="http://schemas.microsoft.com/office/drawing/2014/main" id="{C29264C7-2233-868B-86CF-B005817BA4DA}"/>
+              </a:ext>
+            </a:extLst>
+          </p:cNvPr>
+          <p:cNvCxnSpPr>
+            <a:cxnSpLocks/>
+          </p:cNvCxnSpPr>
+          <p:nvPr/>
+        </p:nvCxnSpPr>
+        <p:spPr>
+          <a:xfrm>
+            <a:off x="2421726" y="4930811"/>
+            <a:ext cx="0" cy="300387"/>
+          </a:xfrm>
+          <a:prstGeom prst="straightConnector1">
+            <a:avLst/>
+          </a:prstGeom>
+          <a:ln w="28575">
+            <a:solidFill>
+              <a:schemeClr val="tx1">
+                <a:lumMod val="65000"/>
+                <a:lumOff val="35000"/>
+              </a:schemeClr>
+            </a:solidFill>
+            <a:tailEnd type="triangle"/>
+          </a:ln>
+        </p:spPr>
+        <p:style>
+          <a:lnRef idx="1">
+            <a:schemeClr val="accent1"/>
+          </a:lnRef>
+          <a:fillRef idx="0">
+            <a:schemeClr val="accent1"/>
+          </a:fillRef>
+          <a:effectRef idx="0">
+            <a:schemeClr val="accent1"/>
+          </a:effectRef>
+          <a:fontRef idx="minor">
+            <a:schemeClr val="tx1"/>
+          </a:fontRef>
+        </p:style>
+      </p:cxnSp>
+      <p:sp>
+        <p:nvSpPr>
+          <p:cNvPr id="50" name="TextBox 49">
+            <a:extLst>
+              <a:ext uri="{FF2B5EF4-FFF2-40B4-BE49-F238E27FC236}">
+                <a16:creationId xmlns:a16="http://schemas.microsoft.com/office/drawing/2014/main" id="{06824781-009B-C0A3-5417-4F7DAC7EC3EA}"/>
+              </a:ext>
+            </a:extLst>
+          </p:cNvPr>
+          <p:cNvSpPr txBox="1"/>
+          <p:nvPr/>
+        </p:nvSpPr>
+        <p:spPr>
+          <a:xfrm>
+            <a:off x="2492586" y="4293372"/>
+            <a:ext cx="264159" cy="193899"/>
+          </a:xfrm>
+          <a:prstGeom prst="rect">
+            <a:avLst/>
+          </a:prstGeom>
+          <a:noFill/>
+        </p:spPr>
+        <p:txBody>
+          <a:bodyPr wrap="square" lIns="0" tIns="0" rIns="0" bIns="0" rtlCol="0">
+            <a:spAutoFit/>
+          </a:bodyPr>
+          <a:lstStyle/>
+          <a:p>
+            <a:pPr marL="0" indent="0" algn="l" defTabSz="914400" rtl="0" eaLnBrk="1" latinLnBrk="0" hangingPunct="1">
+              <a:lnSpc>
+                <a:spcPct val="90000"/>
+              </a:lnSpc>
+              <a:spcBef>
+                <a:spcPts val="0"/>
+              </a:spcBef>
+              <a:spcAft>
+                <a:spcPts val="600"/>
+              </a:spcAft>
+              <a:buFont typeface="Arial" panose="020B0604020202020204" pitchFamily="34" charset="0"/>
+              <a:buNone/>
+            </a:pPr>
+            <a:r>
+              <a:rPr lang="en-US" sz="1400" i="1" dirty="0">
+                <a:solidFill>
+                  <a:schemeClr val="tx2"/>
+                </a:solidFill>
+              </a:rPr>
+              <a:t>y</a:t>
+            </a:r>
+            <a:r>
+              <a:rPr lang="en-US" sz="1400" i="1" kern="1200" dirty="0">
+                <a:solidFill>
+                  <a:schemeClr val="tx2"/>
+                </a:solidFill>
+                <a:latin typeface="+mn-lt"/>
+                <a:ea typeface="+mn-ea"/>
+                <a:cs typeface="+mn-cs"/>
+              </a:rPr>
+              <a:t>es</a:t>
+            </a:r>
+          </a:p>
+        </p:txBody>
+      </p:sp>
+      <p:cxnSp>
+        <p:nvCxnSpPr>
+          <p:cNvPr id="51" name="Straight Arrow Connector 50">
+            <a:extLst>
+              <a:ext uri="{FF2B5EF4-FFF2-40B4-BE49-F238E27FC236}">
+                <a16:creationId xmlns:a16="http://schemas.microsoft.com/office/drawing/2014/main" id="{03A1740E-D58A-01CF-4484-4872034290E7}"/>
+              </a:ext>
+            </a:extLst>
+          </p:cNvPr>
+          <p:cNvCxnSpPr>
+            <a:cxnSpLocks/>
+          </p:cNvCxnSpPr>
+          <p:nvPr/>
+        </p:nvCxnSpPr>
+        <p:spPr>
+          <a:xfrm>
+            <a:off x="833380" y="4263058"/>
+            <a:ext cx="0" cy="1647177"/>
+          </a:xfrm>
+          <a:prstGeom prst="straightConnector1">
+            <a:avLst/>
+          </a:prstGeom>
+          <a:ln w="28575">
+            <a:solidFill>
+              <a:schemeClr val="tx1">
+                <a:lumMod val="65000"/>
+                <a:lumOff val="35000"/>
+              </a:schemeClr>
+            </a:solidFill>
+            <a:tailEnd type="triangle"/>
+          </a:ln>
+        </p:spPr>
+        <p:style>
+          <a:lnRef idx="1">
+            <a:schemeClr val="accent1"/>
+          </a:lnRef>
+          <a:fillRef idx="0">
+            <a:schemeClr val="accent1"/>
+          </a:fillRef>
+          <a:effectRef idx="0">
+            <a:schemeClr val="accent1"/>
+          </a:effectRef>
+          <a:fontRef idx="minor">
+            <a:schemeClr val="tx1"/>
+          </a:fontRef>
+        </p:style>
+      </p:cxnSp>
+      <p:sp>
+        <p:nvSpPr>
+          <p:cNvPr id="52" name="TextBox 51">
+            <a:extLst>
+              <a:ext uri="{FF2B5EF4-FFF2-40B4-BE49-F238E27FC236}">
+                <a16:creationId xmlns:a16="http://schemas.microsoft.com/office/drawing/2014/main" id="{9E8FE99E-2119-9376-6C9B-05FB263B6C60}"/>
+              </a:ext>
+            </a:extLst>
+          </p:cNvPr>
+          <p:cNvSpPr txBox="1"/>
+          <p:nvPr/>
+        </p:nvSpPr>
+        <p:spPr>
+          <a:xfrm>
+            <a:off x="916063" y="4316850"/>
+            <a:ext cx="264159" cy="193899"/>
+          </a:xfrm>
+          <a:prstGeom prst="rect">
+            <a:avLst/>
+          </a:prstGeom>
+          <a:noFill/>
+        </p:spPr>
+        <p:txBody>
+          <a:bodyPr wrap="square" lIns="0" tIns="0" rIns="0" bIns="0" rtlCol="0">
+            <a:spAutoFit/>
+          </a:bodyPr>
+          <a:lstStyle/>
+          <a:p>
+            <a:pPr marL="0" indent="0" algn="l" defTabSz="914400" rtl="0" eaLnBrk="1" latinLnBrk="0" hangingPunct="1">
+              <a:lnSpc>
+                <a:spcPct val="90000"/>
+              </a:lnSpc>
+              <a:spcBef>
+                <a:spcPts val="0"/>
+              </a:spcBef>
+              <a:spcAft>
+                <a:spcPts val="600"/>
+              </a:spcAft>
+              <a:buFont typeface="Arial" panose="020B0604020202020204" pitchFamily="34" charset="0"/>
+              <a:buNone/>
+            </a:pPr>
+            <a:r>
+              <a:rPr lang="en-US" sz="1400" i="1" kern="1200" dirty="0">
+                <a:solidFill>
+                  <a:schemeClr val="tx2"/>
+                </a:solidFill>
+                <a:latin typeface="+mn-lt"/>
+                <a:ea typeface="+mn-ea"/>
+                <a:cs typeface="+mn-cs"/>
+              </a:rPr>
+              <a:t>no</a:t>
+            </a:r>
+          </a:p>
+        </p:txBody>
+      </p:sp>
+      <p:cxnSp>
+        <p:nvCxnSpPr>
+          <p:cNvPr id="55" name="Straight Arrow Connector 54">
+            <a:extLst>
+              <a:ext uri="{FF2B5EF4-FFF2-40B4-BE49-F238E27FC236}">
+                <a16:creationId xmlns:a16="http://schemas.microsoft.com/office/drawing/2014/main" id="{FF723D88-7856-8D87-E530-418BFF36AFE3}"/>
+              </a:ext>
+            </a:extLst>
+          </p:cNvPr>
+          <p:cNvCxnSpPr>
+            <a:cxnSpLocks/>
+          </p:cNvCxnSpPr>
+          <p:nvPr/>
+        </p:nvCxnSpPr>
+        <p:spPr>
+          <a:xfrm>
+            <a:off x="2421726" y="5609848"/>
+            <a:ext cx="0" cy="300387"/>
+          </a:xfrm>
+          <a:prstGeom prst="straightConnector1">
+            <a:avLst/>
+          </a:prstGeom>
+          <a:ln w="28575">
+            <a:solidFill>
+              <a:schemeClr val="tx1">
+                <a:lumMod val="65000"/>
+                <a:lumOff val="35000"/>
+              </a:schemeClr>
+            </a:solidFill>
+            <a:tailEnd type="triangle"/>
+          </a:ln>
+        </p:spPr>
+        <p:style>
+          <a:lnRef idx="1">
+            <a:schemeClr val="accent1"/>
+          </a:lnRef>
+          <a:fillRef idx="0">
+            <a:schemeClr val="accent1"/>
+          </a:fillRef>
+          <a:effectRef idx="0">
+            <a:schemeClr val="accent1"/>
+          </a:effectRef>
+          <a:fontRef idx="minor">
+            <a:schemeClr val="tx1"/>
+          </a:fontRef>
+        </p:style>
+      </p:cxnSp>
+      <p:sp>
+        <p:nvSpPr>
+          <p:cNvPr id="58" name="Rectangle 57">
+            <a:extLst>
+              <a:ext uri="{FF2B5EF4-FFF2-40B4-BE49-F238E27FC236}">
+                <a16:creationId xmlns:a16="http://schemas.microsoft.com/office/drawing/2014/main" id="{52072EBA-BF6A-B0E5-01EA-9C1DB3AF239A}"/>
+              </a:ext>
+            </a:extLst>
+          </p:cNvPr>
+          <p:cNvSpPr/>
+          <p:nvPr/>
+        </p:nvSpPr>
+        <p:spPr>
+          <a:xfrm>
+            <a:off x="470325" y="5898951"/>
+            <a:ext cx="3226322" cy="378650"/>
+          </a:xfrm>
+          <a:prstGeom prst="rect">
+            <a:avLst/>
+          </a:prstGeom>
+          <a:solidFill>
+            <a:schemeClr val="bg1">
+              <a:lumMod val="50000"/>
+            </a:schemeClr>
+          </a:solidFill>
+          <a:ln w="6350" cmpd="sng">
+            <a:noFill/>
+          </a:ln>
+          <a:effectLst/>
+        </p:spPr>
+        <p:style>
+          <a:lnRef idx="1">
+            <a:schemeClr val="accent1"/>
+          </a:lnRef>
+          <a:fillRef idx="3">
+            <a:schemeClr val="accent1"/>
+          </a:fillRef>
+          <a:effectRef idx="2">
+            <a:schemeClr val="accent1"/>
+          </a:effectRef>
+          <a:fontRef idx="minor">
+            <a:schemeClr val="lt1"/>
+          </a:fontRef>
+        </p:style>
+        <p:txBody>
+          <a:bodyPr rtlCol="0" anchor="ctr"/>
+          <a:lstStyle/>
+          <a:p>
+            <a:pPr algn="ctr">
+              <a:spcAft>
+                <a:spcPts val="600"/>
+              </a:spcAft>
+            </a:pPr>
+            <a:r>
+              <a:rPr lang="en-US" sz="1600" b="1" dirty="0">
+                <a:solidFill>
+                  <a:schemeClr val="bg1"/>
+                </a:solidFill>
+              </a:rPr>
+              <a:t>Resume Normal Operation</a:t>
+            </a:r>
+            <a:endParaRPr lang="en-US" sz="1600" b="1" dirty="0">
+              <a:solidFill>
+                <a:schemeClr val="bg1"/>
+              </a:solidFill>
+              <a:latin typeface="Courier New" panose="02070309020205020404" pitchFamily="49" charset="0"/>
+              <a:cs typeface="Courier New" panose="02070309020205020404" pitchFamily="49" charset="0"/>
+            </a:endParaRPr>
+          </a:p>
+        </p:txBody>
+      </p:sp>
+      <p:sp>
+        <p:nvSpPr>
+          <p:cNvPr id="59" name="Rectangle 58">
+            <a:extLst>
+              <a:ext uri="{FF2B5EF4-FFF2-40B4-BE49-F238E27FC236}">
+                <a16:creationId xmlns:a16="http://schemas.microsoft.com/office/drawing/2014/main" id="{72596FA2-D580-EAD4-FEDC-D27F42013F89}"/>
+              </a:ext>
+            </a:extLst>
+          </p:cNvPr>
+          <p:cNvSpPr/>
+          <p:nvPr/>
+        </p:nvSpPr>
+        <p:spPr>
+          <a:xfrm>
+            <a:off x="4618723" y="4557508"/>
+            <a:ext cx="2678112" cy="381562"/>
+          </a:xfrm>
+          <a:prstGeom prst="rect">
+            <a:avLst/>
+          </a:prstGeom>
+          <a:solidFill>
+            <a:srgbClr val="00A960"/>
+          </a:solidFill>
+          <a:ln w="6350" cmpd="sng">
+            <a:noFill/>
+          </a:ln>
+          <a:effectLst/>
+        </p:spPr>
+        <p:style>
+          <a:lnRef idx="1">
+            <a:schemeClr val="accent1"/>
+          </a:lnRef>
+          <a:fillRef idx="3">
+            <a:schemeClr val="accent1"/>
+          </a:fillRef>
+          <a:effectRef idx="2">
+            <a:schemeClr val="accent1"/>
+          </a:effectRef>
+          <a:fontRef idx="minor">
+            <a:schemeClr val="lt1"/>
+          </a:fontRef>
+        </p:style>
+        <p:txBody>
+          <a:bodyPr rtlCol="0" anchor="ctr"/>
+          <a:lstStyle/>
+          <a:p>
+            <a:pPr algn="ctr">
+              <a:spcAft>
+                <a:spcPts val="600"/>
+              </a:spcAft>
+            </a:pPr>
+            <a:r>
+              <a:rPr lang="en-US" sz="1200" b="1" dirty="0">
+                <a:solidFill>
+                  <a:schemeClr val="bg1"/>
+                </a:solidFill>
+                <a:latin typeface="Courier New" panose="02070309020205020404" pitchFamily="49" charset="0"/>
+                <a:cs typeface="Courier New" panose="02070309020205020404" pitchFamily="49" charset="0"/>
+              </a:rPr>
+              <a:t>Event Buffer</a:t>
+            </a:r>
+          </a:p>
+        </p:txBody>
+      </p:sp>
+      <p:cxnSp>
+        <p:nvCxnSpPr>
+          <p:cNvPr id="60" name="Straight Arrow Connector 59">
+            <a:extLst>
+              <a:ext uri="{FF2B5EF4-FFF2-40B4-BE49-F238E27FC236}">
+                <a16:creationId xmlns:a16="http://schemas.microsoft.com/office/drawing/2014/main" id="{7DA20012-A8A0-B48F-2DFC-ACA06CC96766}"/>
+              </a:ext>
+            </a:extLst>
+          </p:cNvPr>
+          <p:cNvCxnSpPr>
+            <a:cxnSpLocks/>
+          </p:cNvCxnSpPr>
+          <p:nvPr/>
+        </p:nvCxnSpPr>
+        <p:spPr>
+          <a:xfrm>
+            <a:off x="3696647" y="4748611"/>
+            <a:ext cx="922076" cy="0"/>
+          </a:xfrm>
+          <a:prstGeom prst="straightConnector1">
+            <a:avLst/>
+          </a:prstGeom>
+          <a:ln w="28575">
+            <a:solidFill>
+              <a:schemeClr val="tx1">
+                <a:lumMod val="65000"/>
+                <a:lumOff val="35000"/>
+              </a:schemeClr>
+            </a:solidFill>
+            <a:tailEnd type="triangle"/>
+          </a:ln>
+        </p:spPr>
+        <p:style>
+          <a:lnRef idx="1">
+            <a:schemeClr val="accent1"/>
+          </a:lnRef>
+          <a:fillRef idx="0">
+            <a:schemeClr val="accent1"/>
+          </a:fillRef>
+          <a:effectRef idx="0">
+            <a:schemeClr val="accent1"/>
+          </a:effectRef>
+          <a:fontRef idx="minor">
+            <a:schemeClr val="tx1"/>
+          </a:fontRef>
+        </p:style>
+      </p:cxnSp>
+      <p:sp>
+        <p:nvSpPr>
+          <p:cNvPr id="61" name="TextBox 60">
+            <a:extLst>
+              <a:ext uri="{FF2B5EF4-FFF2-40B4-BE49-F238E27FC236}">
+                <a16:creationId xmlns:a16="http://schemas.microsoft.com/office/drawing/2014/main" id="{D79E28CC-41C9-2EF4-568B-8768D875DA21}"/>
+              </a:ext>
+            </a:extLst>
+          </p:cNvPr>
+          <p:cNvSpPr txBox="1"/>
+          <p:nvPr/>
+        </p:nvSpPr>
+        <p:spPr>
+          <a:xfrm>
+            <a:off x="4653282" y="4988537"/>
+            <a:ext cx="2721501" cy="387798"/>
+          </a:xfrm>
+          <a:prstGeom prst="rect">
+            <a:avLst/>
+          </a:prstGeom>
+          <a:noFill/>
+        </p:spPr>
+        <p:txBody>
+          <a:bodyPr wrap="square" lIns="0" tIns="0" rIns="0" bIns="0" rtlCol="0">
+            <a:spAutoFit/>
+          </a:bodyPr>
+          <a:lstStyle/>
+          <a:p>
+            <a:pPr marL="0" indent="0" algn="l" defTabSz="914400" rtl="0" eaLnBrk="1" latinLnBrk="0" hangingPunct="1">
+              <a:lnSpc>
+                <a:spcPct val="90000"/>
+              </a:lnSpc>
+              <a:spcBef>
+                <a:spcPts val="0"/>
+              </a:spcBef>
+              <a:spcAft>
+                <a:spcPts val="600"/>
+              </a:spcAft>
+              <a:buFont typeface="Arial" panose="020B0604020202020204" pitchFamily="34" charset="0"/>
+              <a:buNone/>
+            </a:pPr>
+            <a:r>
+              <a:rPr lang="en-US" sz="1200" b="1" kern="1200" dirty="0" err="1">
+                <a:solidFill>
+                  <a:schemeClr val="tx2"/>
+                </a:solidFill>
+                <a:latin typeface="Courier New" panose="02070309020205020404" pitchFamily="49" charset="0"/>
+                <a:cs typeface="Courier New" panose="02070309020205020404" pitchFamily="49" charset="0"/>
+              </a:rPr>
+              <a:t>ARM_FaultRecord</a:t>
+            </a:r>
+            <a:r>
+              <a:rPr lang="en-US" sz="1200" b="1" kern="1200" dirty="0">
+                <a:solidFill>
+                  <a:schemeClr val="tx2"/>
+                </a:solidFill>
+                <a:latin typeface="Courier New" panose="02070309020205020404" pitchFamily="49" charset="0"/>
+                <a:cs typeface="Courier New" panose="02070309020205020404" pitchFamily="49" charset="0"/>
+              </a:rPr>
+              <a:t>() </a:t>
+            </a:r>
+            <a:r>
+              <a:rPr lang="en-US" sz="1400" i="1" kern="1200" dirty="0">
+                <a:solidFill>
+                  <a:schemeClr val="tx2"/>
+                </a:solidFill>
+                <a:cs typeface="Courier New" panose="02070309020205020404" pitchFamily="49" charset="0"/>
+              </a:rPr>
+              <a:t>decode fault and store it using the </a:t>
+            </a:r>
+            <a:r>
+              <a:rPr lang="en-US" sz="1400" i="1" kern="1200" dirty="0" err="1">
+                <a:solidFill>
+                  <a:schemeClr val="tx2"/>
+                </a:solidFill>
+                <a:cs typeface="Courier New" panose="02070309020205020404" pitchFamily="49" charset="0"/>
+              </a:rPr>
+              <a:t>EventRecorder</a:t>
+            </a:r>
+            <a:endParaRPr lang="en-US" sz="1400" i="1" kern="1200" dirty="0">
+              <a:solidFill>
+                <a:schemeClr val="tx2"/>
+              </a:solidFill>
+              <a:cs typeface="Courier New" panose="02070309020205020404" pitchFamily="49" charset="0"/>
+            </a:endParaRPr>
+          </a:p>
+        </p:txBody>
+      </p:sp>
+      <p:sp>
+        <p:nvSpPr>
+          <p:cNvPr id="2" name="Arrow: Down 1">
+            <a:extLst>
+              <a:ext uri="{FF2B5EF4-FFF2-40B4-BE49-F238E27FC236}">
+                <a16:creationId xmlns:a16="http://schemas.microsoft.com/office/drawing/2014/main" id="{B6931B58-08DB-7417-B43C-6ACEB58AD7C5}"/>
+              </a:ext>
+            </a:extLst>
+          </p:cNvPr>
+          <p:cNvSpPr/>
+          <p:nvPr/>
+        </p:nvSpPr>
+        <p:spPr>
+          <a:xfrm>
+            <a:off x="5798133" y="1569476"/>
+            <a:ext cx="368300" cy="2988032"/>
+          </a:xfrm>
+          <a:prstGeom prst="downArrow">
+            <a:avLst/>
+          </a:prstGeom>
+          <a:solidFill>
+            <a:schemeClr val="bg2">
+              <a:lumMod val="50000"/>
+            </a:schemeClr>
+          </a:solidFill>
+          <a:ln>
+            <a:noFill/>
+          </a:ln>
+        </p:spPr>
+        <p:style>
+          <a:lnRef idx="2">
+            <a:schemeClr val="accent1">
+              <a:shade val="50000"/>
+            </a:schemeClr>
+          </a:lnRef>
+          <a:fillRef idx="1">
+            <a:schemeClr val="accent1"/>
+          </a:fillRef>
+          <a:effectRef idx="0">
+            <a:schemeClr val="accent1"/>
+          </a:effectRef>
+          <a:fontRef idx="minor">
+            <a:schemeClr val="lt1"/>
+          </a:fontRef>
+        </p:style>
+        <p:txBody>
+          <a:bodyPr rtlCol="0" anchor="ctr"/>
+          <a:lstStyle/>
+          <a:p>
+            <a:pPr algn="ctr"/>
+            <a:endParaRPr lang="en-US"/>
+          </a:p>
+        </p:txBody>
+      </p:sp>
+      <p:sp>
+        <p:nvSpPr>
+          <p:cNvPr id="7" name="Rectangle 6">
+            <a:extLst>
+              <a:ext uri="{FF2B5EF4-FFF2-40B4-BE49-F238E27FC236}">
+                <a16:creationId xmlns:a16="http://schemas.microsoft.com/office/drawing/2014/main" id="{FCAACA31-8076-53B9-2002-6BDEF459BEEE}"/>
+              </a:ext>
+            </a:extLst>
+          </p:cNvPr>
+          <p:cNvSpPr/>
+          <p:nvPr/>
+        </p:nvSpPr>
+        <p:spPr>
+          <a:xfrm>
+            <a:off x="4618723" y="1197016"/>
+            <a:ext cx="2678112" cy="381562"/>
+          </a:xfrm>
+          <a:prstGeom prst="rect">
+            <a:avLst/>
+          </a:prstGeom>
+          <a:solidFill>
+            <a:srgbClr val="00A960"/>
+          </a:solidFill>
+          <a:ln w="6350" cmpd="sng">
+            <a:noFill/>
+          </a:ln>
+          <a:effectLst/>
+        </p:spPr>
+        <p:style>
+          <a:lnRef idx="1">
+            <a:schemeClr val="accent1"/>
+          </a:lnRef>
+          <a:fillRef idx="3">
+            <a:schemeClr val="accent1"/>
+          </a:fillRef>
+          <a:effectRef idx="2">
+            <a:schemeClr val="accent1"/>
+          </a:effectRef>
+          <a:fontRef idx="minor">
+            <a:schemeClr val="lt1"/>
+          </a:fontRef>
+        </p:style>
+        <p:txBody>
+          <a:bodyPr rtlCol="0" anchor="ctr"/>
+          <a:lstStyle/>
+          <a:p>
+            <a:pPr algn="ctr">
+              <a:spcAft>
+                <a:spcPts val="600"/>
+              </a:spcAft>
+            </a:pPr>
+            <a:r>
+              <a:rPr lang="en-US" sz="1200" b="1" dirty="0" err="1">
+                <a:solidFill>
+                  <a:schemeClr val="bg1"/>
+                </a:solidFill>
+                <a:latin typeface="Courier New" panose="02070309020205020404" pitchFamily="49" charset="0"/>
+                <a:cs typeface="Courier New" panose="02070309020205020404" pitchFamily="49" charset="0"/>
+              </a:rPr>
+              <a:t>ARM_FaultInfo</a:t>
+            </a:r>
+            <a:endParaRPr lang="en-US" sz="1200" b="1" dirty="0">
+              <a:solidFill>
+                <a:schemeClr val="bg1"/>
+              </a:solidFill>
+              <a:latin typeface="Courier New" panose="02070309020205020404" pitchFamily="49" charset="0"/>
+              <a:cs typeface="Courier New" panose="02070309020205020404" pitchFamily="49" charset="0"/>
+            </a:endParaRPr>
+          </a:p>
+        </p:txBody>
+      </p:sp>
+    </p:spTree>
+    <p:extLst>
+      <p:ext uri="{BB962C8B-B14F-4D97-AF65-F5344CB8AC3E}">
+        <p14:creationId xmlns:p14="http://schemas.microsoft.com/office/powerpoint/2010/main" val="1858499130"/>
       </p:ext>
     </p:extLst>
   </p:cSld>
@@ -26159,6 +27684,93 @@
 </file>
 
 <file path=customXml/item1.xml><?xml version="1.0" encoding="utf-8"?>
+<p:properties xmlns:p="http://schemas.microsoft.com/office/2006/metadata/properties" xmlns:xsi="http://www.w3.org/2001/XMLSchema-instance">
+  <documentManagement>
+    <_dlc_DocId xmlns="f2ad5090-61a8-4b8c-ab70-68f4ff4d1933">ARM-ECM-0559802</_dlc_DocId>
+    <_dlc_DocIdUrl xmlns="f2ad5090-61a8-4b8c-ab70-68f4ff4d1933">
+      <Url>http://teamsites.arm.com/sites/commops/_layouts/DocIdRedir.aspx?ID=ARM-ECM-0559802</Url>
+      <Description>ARM-ECM-0559802</Description>
+    </_dlc_DocIdUrl>
+  </documentManagement>
+</p:properties>
+</file>
+
+<file path=customXml/item2.xml><?xml version="1.0" encoding="utf-8"?>
+<?mso-contentType ?>
+<FormTemplates xmlns="http://schemas.microsoft.com/sharepoint/v3/contenttype/forms">
+  <Display>DocumentLibraryForm</Display>
+  <Edit>DocumentLibraryForm</Edit>
+  <New>DocumentLibraryForm</New>
+</FormTemplates>
+</file>
+
+<file path=customXml/item3.xml><?xml version="1.0" encoding="utf-8"?>
+<?mso-contentType ?>
+<spe:Receivers xmlns:spe="http://schemas.microsoft.com/sharepoint/events">
+  <Receiver>
+    <Name>Document ID Generator</Name>
+    <Synchronization>Synchronous</Synchronization>
+    <Type>10001</Type>
+    <SequenceNumber>1000</SequenceNumber>
+    <Assembly>Microsoft.Office.DocumentManagement, Version=14.0.0.0, Culture=neutral, PublicKeyToken=71e9bce111e9429c</Assembly>
+    <Class>Microsoft.Office.DocumentManagement.Internal.DocIdHandler</Class>
+    <Data/>
+    <Filter/>
+  </Receiver>
+  <Receiver>
+    <Name>Document ID Generator</Name>
+    <Synchronization>Synchronous</Synchronization>
+    <Type>10002</Type>
+    <SequenceNumber>1001</SequenceNumber>
+    <Assembly>Microsoft.Office.DocumentManagement, Version=14.0.0.0, Culture=neutral, PublicKeyToken=71e9bce111e9429c</Assembly>
+    <Class>Microsoft.Office.DocumentManagement.Internal.DocIdHandler</Class>
+    <Data/>
+    <Filter/>
+  </Receiver>
+  <Receiver>
+    <Name>Document ID Generator</Name>
+    <Synchronization>Synchronous</Synchronization>
+    <Type>10004</Type>
+    <SequenceNumber>1002</SequenceNumber>
+    <Assembly>Microsoft.Office.DocumentManagement, Version=14.0.0.0, Culture=neutral, PublicKeyToken=71e9bce111e9429c</Assembly>
+    <Class>Microsoft.Office.DocumentManagement.Internal.DocIdHandler</Class>
+    <Data/>
+    <Filter/>
+  </Receiver>
+  <Receiver>
+    <Name>Document ID Generator</Name>
+    <Synchronization>Synchronous</Synchronization>
+    <Type>10006</Type>
+    <SequenceNumber>1003</SequenceNumber>
+    <Assembly>Microsoft.Office.DocumentManagement, Version=14.0.0.0, Culture=neutral, PublicKeyToken=71e9bce111e9429c</Assembly>
+    <Class>Microsoft.Office.DocumentManagement.Internal.DocIdHandler</Class>
+    <Data/>
+    <Filter/>
+  </Receiver>
+</spe:Receivers>
+</file>
+
+<file path=customXml/item4.xml><?xml version="1.0" encoding="utf-8"?>
+<?mso-contentType ?>
+<p:Policy xmlns:p="office.server.policy" id="" local="true">
+  <p:Name>Document</p:Name>
+  <p:Description/>
+  <p:Statement/>
+  <p:PolicyItems>
+    <p:PolicyItem featureId="Microsoft.Office.RecordsManagement.PolicyFeatures.PolicyAudit" staticId="0x0101003596DE54BEBB26489934FE71AEF742B7|937198175" UniqueId="1e4c585b-7e46-4aa8-8487-786b980c56ea">
+      <p:Name>Auditing</p:Name>
+      <p:Description>Audits user actions on documents and list items to the Audit Log.</p:Description>
+      <p:CustomData>
+        <Audit>
+          <View/>
+        </Audit>
+      </p:CustomData>
+    </p:PolicyItem>
+  </p:PolicyItems>
+</p:Policy>
+</file>
+
+<file path=customXml/item5.xml><?xml version="1.0" encoding="utf-8"?>
 <ct:contentTypeSchema xmlns:ct="http://schemas.microsoft.com/office/2006/metadata/contentType" xmlns:ma="http://schemas.microsoft.com/office/2006/metadata/properties/metaAttributes" ct:_="" ma:_="" ma:contentTypeName="Document" ma:contentTypeID="0x0101003596DE54BEBB26489934FE71AEF742B7" ma:contentTypeVersion="5" ma:contentTypeDescription="Create a new document." ma:contentTypeScope="" ma:versionID="765b0a3a8b88cdd45245a2aefeebed24">
   <xsd:schema xmlns:xsd="http://www.w3.org/2001/XMLSchema" xmlns:xs="http://www.w3.org/2001/XMLSchema" xmlns:p="http://schemas.microsoft.com/office/2006/metadata/properties" xmlns:ns1="http://schemas.microsoft.com/sharepoint/v3" xmlns:ns2="f2ad5090-61a8-4b8c-ab70-68f4ff4d1933" targetNamespace="http://schemas.microsoft.com/office/2006/metadata/properties" ma:root="true" ma:fieldsID="4a66e8db2a8b512f684c81d8444a49c5" ns1:_="" ns2:_="">
     <xsd:import namespace="http://schemas.microsoft.com/sharepoint/v3"/>
@@ -26314,94 +27926,48 @@
 </ct:contentTypeSchema>
 </file>
 
-<file path=customXml/item2.xml><?xml version="1.0" encoding="utf-8"?>
-<p:properties xmlns:p="http://schemas.microsoft.com/office/2006/metadata/properties" xmlns:xsi="http://www.w3.org/2001/XMLSchema-instance">
-  <documentManagement>
-    <_dlc_DocId xmlns="f2ad5090-61a8-4b8c-ab70-68f4ff4d1933">ARM-ECM-0559802</_dlc_DocId>
-    <_dlc_DocIdUrl xmlns="f2ad5090-61a8-4b8c-ab70-68f4ff4d1933">
-      <Url>http://teamsites.arm.com/sites/commops/_layouts/DocIdRedir.aspx?ID=ARM-ECM-0559802</Url>
-      <Description>ARM-ECM-0559802</Description>
-    </_dlc_DocIdUrl>
-  </documentManagement>
-</p:properties>
+<file path=customXml/itemProps1.xml><?xml version="1.0" encoding="utf-8"?>
+<ds:datastoreItem xmlns:ds="http://schemas.openxmlformats.org/officeDocument/2006/customXml" ds:itemID="{AE6E82D6-7FB8-4D99-A7B6-3C5BB1D894B9}">
+  <ds:schemaRefs>
+    <ds:schemaRef ds:uri="f2ad5090-61a8-4b8c-ab70-68f4ff4d1933"/>
+    <ds:schemaRef ds:uri="http://schemas.microsoft.com/sharepoint/v3"/>
+    <ds:schemaRef ds:uri="http://schemas.microsoft.com/office/2006/documentManagement/types"/>
+    <ds:schemaRef ds:uri="http://schemas.openxmlformats.org/package/2006/metadata/core-properties"/>
+    <ds:schemaRef ds:uri="http://purl.org/dc/dcmitype/"/>
+    <ds:schemaRef ds:uri="http://schemas.microsoft.com/office/infopath/2007/PartnerControls"/>
+    <ds:schemaRef ds:uri="http://purl.org/dc/elements/1.1/"/>
+    <ds:schemaRef ds:uri="http://schemas.microsoft.com/office/2006/metadata/properties"/>
+    <ds:schemaRef ds:uri="http://www.w3.org/XML/1998/namespace"/>
+    <ds:schemaRef ds:uri="http://purl.org/dc/terms/"/>
+  </ds:schemaRefs>
+</ds:datastoreItem>
 </file>
 
-<file path=customXml/item3.xml><?xml version="1.0" encoding="utf-8"?>
-<?mso-contentType ?>
-<FormTemplates xmlns="http://schemas.microsoft.com/sharepoint/v3/contenttype/forms">
-  <Display>DocumentLibraryForm</Display>
-  <Edit>DocumentLibraryForm</Edit>
-  <New>DocumentLibraryForm</New>
-</FormTemplates>
+<file path=customXml/itemProps2.xml><?xml version="1.0" encoding="utf-8"?>
+<ds:datastoreItem xmlns:ds="http://schemas.openxmlformats.org/officeDocument/2006/customXml" ds:itemID="{9C777C69-0744-4BF3-8514-FB149EBD2248}">
+  <ds:schemaRefs>
+    <ds:schemaRef ds:uri="http://schemas.microsoft.com/sharepoint/v3/contenttype/forms"/>
+  </ds:schemaRefs>
+</ds:datastoreItem>
 </file>
 
-<file path=customXml/item4.xml><?xml version="1.0" encoding="utf-8"?>
-<?mso-contentType ?>
-<spe:Receivers xmlns:spe="http://schemas.microsoft.com/sharepoint/events">
-  <Receiver>
-    <Name>Document ID Generator</Name>
-    <Synchronization>Synchronous</Synchronization>
-    <Type>10001</Type>
-    <SequenceNumber>1000</SequenceNumber>
-    <Assembly>Microsoft.Office.DocumentManagement, Version=14.0.0.0, Culture=neutral, PublicKeyToken=71e9bce111e9429c</Assembly>
-    <Class>Microsoft.Office.DocumentManagement.Internal.DocIdHandler</Class>
-    <Data/>
-    <Filter/>
-  </Receiver>
-  <Receiver>
-    <Name>Document ID Generator</Name>
-    <Synchronization>Synchronous</Synchronization>
-    <Type>10002</Type>
-    <SequenceNumber>1001</SequenceNumber>
-    <Assembly>Microsoft.Office.DocumentManagement, Version=14.0.0.0, Culture=neutral, PublicKeyToken=71e9bce111e9429c</Assembly>
-    <Class>Microsoft.Office.DocumentManagement.Internal.DocIdHandler</Class>
-    <Data/>
-    <Filter/>
-  </Receiver>
-  <Receiver>
-    <Name>Document ID Generator</Name>
-    <Synchronization>Synchronous</Synchronization>
-    <Type>10004</Type>
-    <SequenceNumber>1002</SequenceNumber>
-    <Assembly>Microsoft.Office.DocumentManagement, Version=14.0.0.0, Culture=neutral, PublicKeyToken=71e9bce111e9429c</Assembly>
-    <Class>Microsoft.Office.DocumentManagement.Internal.DocIdHandler</Class>
-    <Data/>
-    <Filter/>
-  </Receiver>
-  <Receiver>
-    <Name>Document ID Generator</Name>
-    <Synchronization>Synchronous</Synchronization>
-    <Type>10006</Type>
-    <SequenceNumber>1003</SequenceNumber>
-    <Assembly>Microsoft.Office.DocumentManagement, Version=14.0.0.0, Culture=neutral, PublicKeyToken=71e9bce111e9429c</Assembly>
-    <Class>Microsoft.Office.DocumentManagement.Internal.DocIdHandler</Class>
-    <Data/>
-    <Filter/>
-  </Receiver>
-</spe:Receivers>
+<file path=customXml/itemProps3.xml><?xml version="1.0" encoding="utf-8"?>
+<ds:datastoreItem xmlns:ds="http://schemas.openxmlformats.org/officeDocument/2006/customXml" ds:itemID="{6D3E6A18-9A0A-4E27-8E6B-E388B8915A7F}">
+  <ds:schemaRefs>
+    <ds:schemaRef ds:uri="http://schemas.microsoft.com/sharepoint/events"/>
+  </ds:schemaRefs>
+</ds:datastoreItem>
 </file>
 
-<file path=customXml/item5.xml><?xml version="1.0" encoding="utf-8"?>
-<?mso-contentType ?>
-<p:Policy xmlns:p="office.server.policy" id="" local="true">
-  <p:Name>Document</p:Name>
-  <p:Description/>
-  <p:Statement/>
-  <p:PolicyItems>
-    <p:PolicyItem featureId="Microsoft.Office.RecordsManagement.PolicyFeatures.PolicyAudit" staticId="0x0101003596DE54BEBB26489934FE71AEF742B7|937198175" UniqueId="1e4c585b-7e46-4aa8-8487-786b980c56ea">
-      <p:Name>Auditing</p:Name>
-      <p:Description>Audits user actions on documents and list items to the Audit Log.</p:Description>
-      <p:CustomData>
-        <Audit>
-          <View/>
-        </Audit>
-      </p:CustomData>
-    </p:PolicyItem>
-  </p:PolicyItems>
-</p:Policy>
+<file path=customXml/itemProps4.xml><?xml version="1.0" encoding="utf-8"?>
+<ds:datastoreItem xmlns:ds="http://schemas.openxmlformats.org/officeDocument/2006/customXml" ds:itemID="{2E15F6D0-803B-49DB-883D-8BBF7D0952E6}">
+  <ds:schemaRefs>
+    <ds:schemaRef ds:uri="office.server.policy"/>
+  </ds:schemaRefs>
+</ds:datastoreItem>
 </file>
 
-<file path=customXml/itemProps1.xml><?xml version="1.0" encoding="utf-8"?>
+<file path=customXml/itemProps5.xml><?xml version="1.0" encoding="utf-8"?>
 <ds:datastoreItem xmlns:ds="http://schemas.openxmlformats.org/officeDocument/2006/customXml" ds:itemID="{58CD83C5-EA29-465B-BCA3-9832A53A26C9}">
   <ds:schemaRefs>
     <ds:schemaRef ds:uri="http://schemas.microsoft.com/office/2006/metadata/contentType"/>
@@ -26418,45 +27984,4 @@
     <ds:schemaRef ds:uri="http://schemas.microsoft.com/internal/obd"/>
   </ds:schemaRefs>
 </ds:datastoreItem>
-</file>
-
-<file path=customXml/itemProps2.xml><?xml version="1.0" encoding="utf-8"?>
-<ds:datastoreItem xmlns:ds="http://schemas.openxmlformats.org/officeDocument/2006/customXml" ds:itemID="{AE6E82D6-7FB8-4D99-A7B6-3C5BB1D894B9}">
-  <ds:schemaRefs>
-    <ds:schemaRef ds:uri="f2ad5090-61a8-4b8c-ab70-68f4ff4d1933"/>
-    <ds:schemaRef ds:uri="http://schemas.microsoft.com/sharepoint/v3"/>
-    <ds:schemaRef ds:uri="http://schemas.microsoft.com/office/2006/documentManagement/types"/>
-    <ds:schemaRef ds:uri="http://schemas.openxmlformats.org/package/2006/metadata/core-properties"/>
-    <ds:schemaRef ds:uri="http://purl.org/dc/dcmitype/"/>
-    <ds:schemaRef ds:uri="http://schemas.microsoft.com/office/infopath/2007/PartnerControls"/>
-    <ds:schemaRef ds:uri="http://purl.org/dc/elements/1.1/"/>
-    <ds:schemaRef ds:uri="http://schemas.microsoft.com/office/2006/metadata/properties"/>
-    <ds:schemaRef ds:uri="http://www.w3.org/XML/1998/namespace"/>
-    <ds:schemaRef ds:uri="http://purl.org/dc/terms/"/>
-  </ds:schemaRefs>
-</ds:datastoreItem>
-</file>
-
-<file path=customXml/itemProps3.xml><?xml version="1.0" encoding="utf-8"?>
-<ds:datastoreItem xmlns:ds="http://schemas.openxmlformats.org/officeDocument/2006/customXml" ds:itemID="{9C777C69-0744-4BF3-8514-FB149EBD2248}">
-  <ds:schemaRefs>
-    <ds:schemaRef ds:uri="http://schemas.microsoft.com/sharepoint/v3/contenttype/forms"/>
-  </ds:schemaRefs>
-</ds:datastoreItem>
-</file>
-
-<file path=customXml/itemProps4.xml><?xml version="1.0" encoding="utf-8"?>
-<ds:datastoreItem xmlns:ds="http://schemas.openxmlformats.org/officeDocument/2006/customXml" ds:itemID="{6D3E6A18-9A0A-4E27-8E6B-E388B8915A7F}">
-  <ds:schemaRefs>
-    <ds:schemaRef ds:uri="http://schemas.microsoft.com/sharepoint/events"/>
-  </ds:schemaRefs>
-</ds:datastoreItem>
-</file>
-
-<file path=customXml/itemProps5.xml><?xml version="1.0" encoding="utf-8"?>
-<ds:datastoreItem xmlns:ds="http://schemas.openxmlformats.org/officeDocument/2006/customXml" ds:itemID="{2E15F6D0-803B-49DB-883D-8BBF7D0952E6}">
-  <ds:schemaRefs>
-    <ds:schemaRef ds:uri="office.server.policy"/>
-  </ds:schemaRefs>
-</ds:datastoreItem>
 </file>
</xml_diff>